<commit_message>
se cambia nombre de test a arbolesDeDesiciones
</commit_message>
<xml_diff>
--- a/presentación/presentaciónDosMineriaDeDatos.pptx
+++ b/presentación/presentaciónDosMineriaDeDatos.pptx
@@ -5,24 +5,25 @@
     <p:sldMasterId id="2147483660" r:id="rId1"/>
   </p:sldMasterIdLst>
   <p:notesMasterIdLst>
-    <p:notesMasterId r:id="rId17"/>
+    <p:notesMasterId r:id="rId18"/>
   </p:notesMasterIdLst>
   <p:sldIdLst>
     <p:sldId id="262" r:id="rId2"/>
-    <p:sldId id="303" r:id="rId3"/>
-    <p:sldId id="304" r:id="rId4"/>
-    <p:sldId id="305" r:id="rId5"/>
+    <p:sldId id="305" r:id="rId3"/>
+    <p:sldId id="303" r:id="rId4"/>
+    <p:sldId id="317" r:id="rId5"/>
     <p:sldId id="307" r:id="rId6"/>
-    <p:sldId id="312" r:id="rId7"/>
-    <p:sldId id="311" r:id="rId8"/>
-    <p:sldId id="310" r:id="rId9"/>
-    <p:sldId id="309" r:id="rId10"/>
-    <p:sldId id="316" r:id="rId11"/>
-    <p:sldId id="315" r:id="rId12"/>
-    <p:sldId id="314" r:id="rId13"/>
-    <p:sldId id="313" r:id="rId14"/>
-    <p:sldId id="306" r:id="rId15"/>
-    <p:sldId id="308" r:id="rId16"/>
+    <p:sldId id="304" r:id="rId7"/>
+    <p:sldId id="312" r:id="rId8"/>
+    <p:sldId id="311" r:id="rId9"/>
+    <p:sldId id="310" r:id="rId10"/>
+    <p:sldId id="309" r:id="rId11"/>
+    <p:sldId id="316" r:id="rId12"/>
+    <p:sldId id="315" r:id="rId13"/>
+    <p:sldId id="314" r:id="rId14"/>
+    <p:sldId id="313" r:id="rId15"/>
+    <p:sldId id="306" r:id="rId16"/>
+    <p:sldId id="308" r:id="rId17"/>
   </p:sldIdLst>
   <p:sldSz cx="9144000" cy="6858000" type="letter"/>
   <p:notesSz cx="6858000" cy="9144000"/>
@@ -132,53 +133,14 @@
 <file path=ppt/revisionInfo.xml><?xml version="1.0" encoding="utf-8"?>
 <p1510:revInfo xmlns:a="http://schemas.openxmlformats.org/drawingml/2006/main" xmlns:r="http://schemas.openxmlformats.org/officeDocument/2006/relationships" xmlns:p1510="http://schemas.microsoft.com/office/powerpoint/2015/10/main">
   <p1510:revLst>
-    <p1510:client id="{8CBB8C90-6B1F-4992-B562-0E68CFD0F3DC}" v="3" dt="2024-05-25T22:51:46.018"/>
+    <p1510:client id="{0C7D88AA-1E6B-DAD5-588B-E8E99FD28D85}" v="2694" dt="2024-05-26T22:01:25.942"/>
+    <p1510:client id="{8CBB8C90-6B1F-4992-B562-0E68CFD0F3DC}" v="5" dt="2024-05-26T21:24:52.958"/>
   </p1510:revLst>
 </p1510:revInfo>
 </file>
 
 <file path=ppt/changesInfos/changesInfo1.xml><?xml version="1.0" encoding="utf-8"?>
 <pc:chgInfo xmlns:a="http://schemas.openxmlformats.org/drawingml/2006/main" xmlns:r="http://schemas.openxmlformats.org/officeDocument/2006/relationships" xmlns:ac="http://schemas.microsoft.com/office/drawing/2013/main/command" xmlns:pc="http://schemas.microsoft.com/office/powerpoint/2013/main/command">
-  <pc:docChgLst>
-    <pc:chgData name="Usuario invitado" userId="S::urn:spo:anon#eb2a7d79476950051e46bb22be043da915db42be12fcf09fa5fbcbdfd1e1932b::" providerId="AD" clId="Web-{06BA73ED-A061-6375-8FFE-D5F796DAB0DE}"/>
-    <pc:docChg chg="modSld">
-      <pc:chgData name="Usuario invitado" userId="S::urn:spo:anon#eb2a7d79476950051e46bb22be043da915db42be12fcf09fa5fbcbdfd1e1932b::" providerId="AD" clId="Web-{06BA73ED-A061-6375-8FFE-D5F796DAB0DE}" dt="2018-08-28T18:40:40.402" v="2" actId="1076"/>
-      <pc:docMkLst>
-        <pc:docMk/>
-      </pc:docMkLst>
-      <pc:sldChg chg="delSp modSp">
-        <pc:chgData name="Usuario invitado" userId="S::urn:spo:anon#eb2a7d79476950051e46bb22be043da915db42be12fcf09fa5fbcbdfd1e1932b::" providerId="AD" clId="Web-{06BA73ED-A061-6375-8FFE-D5F796DAB0DE}" dt="2018-08-28T18:40:40.402" v="2" actId="1076"/>
-        <pc:sldMkLst>
-          <pc:docMk/>
-          <pc:sldMk cId="1957369981" sldId="262"/>
-        </pc:sldMkLst>
-        <pc:spChg chg="del">
-          <ac:chgData name="Usuario invitado" userId="S::urn:spo:anon#eb2a7d79476950051e46bb22be043da915db42be12fcf09fa5fbcbdfd1e1932b::" providerId="AD" clId="Web-{06BA73ED-A061-6375-8FFE-D5F796DAB0DE}" dt="2018-08-28T18:39:21.057" v="1"/>
-          <ac:spMkLst>
-            <pc:docMk/>
-            <pc:sldMk cId="1957369981" sldId="262"/>
-            <ac:spMk id="7" creationId="{C85DB8C4-FFB0-4CA0-AC46-2DA3367DA6D7}"/>
-          </ac:spMkLst>
-        </pc:spChg>
-        <pc:spChg chg="del">
-          <ac:chgData name="Usuario invitado" userId="S::urn:spo:anon#eb2a7d79476950051e46bb22be043da915db42be12fcf09fa5fbcbdfd1e1932b::" providerId="AD" clId="Web-{06BA73ED-A061-6375-8FFE-D5F796DAB0DE}" dt="2018-08-28T18:39:18.916" v="0"/>
-          <ac:spMkLst>
-            <pc:docMk/>
-            <pc:sldMk cId="1957369981" sldId="262"/>
-            <ac:spMk id="11" creationId="{00000000-0000-0000-0000-000000000000}"/>
-          </ac:spMkLst>
-        </pc:spChg>
-        <pc:picChg chg="mod">
-          <ac:chgData name="Usuario invitado" userId="S::urn:spo:anon#eb2a7d79476950051e46bb22be043da915db42be12fcf09fa5fbcbdfd1e1932b::" providerId="AD" clId="Web-{06BA73ED-A061-6375-8FFE-D5F796DAB0DE}" dt="2018-08-28T18:40:40.402" v="2" actId="1076"/>
-          <ac:picMkLst>
-            <pc:docMk/>
-            <pc:sldMk cId="1957369981" sldId="262"/>
-            <ac:picMk id="10" creationId="{00000000-0000-0000-0000-000000000000}"/>
-          </ac:picMkLst>
-        </pc:picChg>
-      </pc:sldChg>
-    </pc:docChg>
-  </pc:docChgLst>
   <pc:docChgLst>
     <pc:chgData name="Paola Alejandra Jarur Chamy" userId="90bb2a2d-fae6-4337-8a41-cfbd67e07fdf" providerId="ADAL" clId="{A088AB18-C673-4A2D-B55A-F7E1AA141CD7}"/>
     <pc:docChg chg="undo custSel addSld delSld modSld">
@@ -1957,6 +1919,194 @@
     </pc:docChg>
   </pc:docChgLst>
   <pc:docChgLst>
+    <pc:chgData name="PEREZ VERGARA MELANY" userId="S::m.perezvergara@uandresbello.edu::d95698a7-632e-4c03-ab0f-564477513d69" providerId="AD" clId="Web-{0C7D88AA-1E6B-DAD5-588B-E8E99FD28D85}"/>
+    <pc:docChg chg="addSld modSld sldOrd">
+      <pc:chgData name="PEREZ VERGARA MELANY" userId="S::m.perezvergara@uandresbello.edu::d95698a7-632e-4c03-ab0f-564477513d69" providerId="AD" clId="Web-{0C7D88AA-1E6B-DAD5-588B-E8E99FD28D85}" dt="2024-05-26T22:01:25.911" v="1639" actId="20577"/>
+      <pc:docMkLst>
+        <pc:docMk/>
+      </pc:docMkLst>
+      <pc:sldChg chg="addSp delSp modSp">
+        <pc:chgData name="PEREZ VERGARA MELANY" userId="S::m.perezvergara@uandresbello.edu::d95698a7-632e-4c03-ab0f-564477513d69" providerId="AD" clId="Web-{0C7D88AA-1E6B-DAD5-588B-E8E99FD28D85}" dt="2024-05-26T21:45:55.467" v="1465" actId="1076"/>
+        <pc:sldMkLst>
+          <pc:docMk/>
+          <pc:sldMk cId="1761978179" sldId="303"/>
+        </pc:sldMkLst>
+        <pc:spChg chg="add mod">
+          <ac:chgData name="PEREZ VERGARA MELANY" userId="S::m.perezvergara@uandresbello.edu::d95698a7-632e-4c03-ab0f-564477513d69" providerId="AD" clId="Web-{0C7D88AA-1E6B-DAD5-588B-E8E99FD28D85}" dt="2024-05-26T21:45:43.544" v="1457" actId="1076"/>
+          <ac:spMkLst>
+            <pc:docMk/>
+            <pc:sldMk cId="1761978179" sldId="303"/>
+            <ac:spMk id="2" creationId="{BCB3922B-C2DC-EB08-0E39-D79B2646FD4D}"/>
+          </ac:spMkLst>
+        </pc:spChg>
+        <pc:spChg chg="add mod">
+          <ac:chgData name="PEREZ VERGARA MELANY" userId="S::m.perezvergara@uandresbello.edu::d95698a7-632e-4c03-ab0f-564477513d69" providerId="AD" clId="Web-{0C7D88AA-1E6B-DAD5-588B-E8E99FD28D85}" dt="2024-05-26T21:45:43.575" v="1458" actId="1076"/>
+          <ac:spMkLst>
+            <pc:docMk/>
+            <pc:sldMk cId="1761978179" sldId="303"/>
+            <ac:spMk id="3" creationId="{53A07681-A1E1-2E20-06A1-7D9C8965BE78}"/>
+          </ac:spMkLst>
+        </pc:spChg>
+        <pc:spChg chg="add mod">
+          <ac:chgData name="PEREZ VERGARA MELANY" userId="S::m.perezvergara@uandresbello.edu::d95698a7-632e-4c03-ab0f-564477513d69" providerId="AD" clId="Web-{0C7D88AA-1E6B-DAD5-588B-E8E99FD28D85}" dt="2024-05-26T21:45:55.467" v="1465" actId="1076"/>
+          <ac:spMkLst>
+            <pc:docMk/>
+            <pc:sldMk cId="1761978179" sldId="303"/>
+            <ac:spMk id="4" creationId="{B420626F-7183-5B69-CC17-50E83C0AF8B0}"/>
+          </ac:spMkLst>
+        </pc:spChg>
+        <pc:spChg chg="mod">
+          <ac:chgData name="PEREZ VERGARA MELANY" userId="S::m.perezvergara@uandresbello.edu::d95698a7-632e-4c03-ab0f-564477513d69" providerId="AD" clId="Web-{0C7D88AA-1E6B-DAD5-588B-E8E99FD28D85}" dt="2024-05-26T21:45:30.794" v="1454" actId="20577"/>
+          <ac:spMkLst>
+            <pc:docMk/>
+            <pc:sldMk cId="1761978179" sldId="303"/>
+            <ac:spMk id="5" creationId="{699E2788-EBE2-45DF-9C0B-D666080A46A9}"/>
+          </ac:spMkLst>
+        </pc:spChg>
+        <pc:spChg chg="add mod">
+          <ac:chgData name="PEREZ VERGARA MELANY" userId="S::m.perezvergara@uandresbello.edu::d95698a7-632e-4c03-ab0f-564477513d69" providerId="AD" clId="Web-{0C7D88AA-1E6B-DAD5-588B-E8E99FD28D85}" dt="2024-05-26T21:45:43.607" v="1460" actId="1076"/>
+          <ac:spMkLst>
+            <pc:docMk/>
+            <pc:sldMk cId="1761978179" sldId="303"/>
+            <ac:spMk id="7" creationId="{AFFEA349-59DA-112C-3E6F-80A06484C65C}"/>
+          </ac:spMkLst>
+        </pc:spChg>
+        <pc:spChg chg="add del mod">
+          <ac:chgData name="PEREZ VERGARA MELANY" userId="S::m.perezvergara@uandresbello.edu::d95698a7-632e-4c03-ab0f-564477513d69" providerId="AD" clId="Web-{0C7D88AA-1E6B-DAD5-588B-E8E99FD28D85}" dt="2024-05-26T21:41:41.519" v="1420" actId="20577"/>
+          <ac:spMkLst>
+            <pc:docMk/>
+            <pc:sldMk cId="1761978179" sldId="303"/>
+            <ac:spMk id="8" creationId="{8E5AB793-981F-4F0C-993F-B574912D895B}"/>
+          </ac:spMkLst>
+        </pc:spChg>
+        <pc:spChg chg="mod">
+          <ac:chgData name="PEREZ VERGARA MELANY" userId="S::m.perezvergara@uandresbello.edu::d95698a7-632e-4c03-ab0f-564477513d69" providerId="AD" clId="Web-{0C7D88AA-1E6B-DAD5-588B-E8E99FD28D85}" dt="2024-05-26T20:50:49.352" v="362" actId="20577"/>
+          <ac:spMkLst>
+            <pc:docMk/>
+            <pc:sldMk cId="1761978179" sldId="303"/>
+            <ac:spMk id="11" creationId="{ACB6F962-DADC-4482-8A69-766A19968AF5}"/>
+          </ac:spMkLst>
+        </pc:spChg>
+        <pc:spChg chg="mod">
+          <ac:chgData name="PEREZ VERGARA MELANY" userId="S::m.perezvergara@uandresbello.edu::d95698a7-632e-4c03-ab0f-564477513d69" providerId="AD" clId="Web-{0C7D88AA-1E6B-DAD5-588B-E8E99FD28D85}" dt="2024-05-26T20:51:03.447" v="377" actId="20577"/>
+          <ac:spMkLst>
+            <pc:docMk/>
+            <pc:sldMk cId="1761978179" sldId="303"/>
+            <ac:spMk id="12" creationId="{A3A365B2-B2DE-4D2C-92CE-32C0611969DB}"/>
+          </ac:spMkLst>
+        </pc:spChg>
+        <pc:spChg chg="add mod">
+          <ac:chgData name="PEREZ VERGARA MELANY" userId="S::m.perezvergara@uandresbello.edu::d95698a7-632e-4c03-ab0f-564477513d69" providerId="AD" clId="Web-{0C7D88AA-1E6B-DAD5-588B-E8E99FD28D85}" dt="2024-05-26T21:45:43.622" v="1461" actId="1076"/>
+          <ac:spMkLst>
+            <pc:docMk/>
+            <pc:sldMk cId="1761978179" sldId="303"/>
+            <ac:spMk id="17" creationId="{58C34E86-807D-A536-4841-E34D9BE399E2}"/>
+          </ac:spMkLst>
+        </pc:spChg>
+        <pc:spChg chg="mod">
+          <ac:chgData name="PEREZ VERGARA MELANY" userId="S::m.perezvergara@uandresbello.edu::d95698a7-632e-4c03-ab0f-564477513d69" providerId="AD" clId="Web-{0C7D88AA-1E6B-DAD5-588B-E8E99FD28D85}" dt="2024-05-26T21:45:47.419" v="1464" actId="1076"/>
+          <ac:spMkLst>
+            <pc:docMk/>
+            <pc:sldMk cId="1761978179" sldId="303"/>
+            <ac:spMk id="23" creationId="{73182A38-D6DF-453D-921E-315EFA20E2ED}"/>
+          </ac:spMkLst>
+        </pc:spChg>
+        <pc:spChg chg="add mod">
+          <ac:chgData name="PEREZ VERGARA MELANY" userId="S::m.perezvergara@uandresbello.edu::d95698a7-632e-4c03-ab0f-564477513d69" providerId="AD" clId="Web-{0C7D88AA-1E6B-DAD5-588B-E8E99FD28D85}" dt="2024-05-26T21:45:43.654" v="1462" actId="1076"/>
+          <ac:spMkLst>
+            <pc:docMk/>
+            <pc:sldMk cId="1761978179" sldId="303"/>
+            <ac:spMk id="24" creationId="{B558E4C3-58FD-2962-9E56-66C0A77F77A5}"/>
+          </ac:spMkLst>
+        </pc:spChg>
+        <pc:spChg chg="add mod">
+          <ac:chgData name="PEREZ VERGARA MELANY" userId="S::m.perezvergara@uandresbello.edu::d95698a7-632e-4c03-ab0f-564477513d69" providerId="AD" clId="Web-{0C7D88AA-1E6B-DAD5-588B-E8E99FD28D85}" dt="2024-05-26T21:45:43.669" v="1463" actId="1076"/>
+          <ac:spMkLst>
+            <pc:docMk/>
+            <pc:sldMk cId="1761978179" sldId="303"/>
+            <ac:spMk id="25" creationId="{A8B32074-C045-5934-176F-E42A90AFDD47}"/>
+          </ac:spMkLst>
+        </pc:spChg>
+        <pc:cxnChg chg="mod">
+          <ac:chgData name="PEREZ VERGARA MELANY" userId="S::m.perezvergara@uandresbello.edu::d95698a7-632e-4c03-ab0f-564477513d69" providerId="AD" clId="Web-{0C7D88AA-1E6B-DAD5-588B-E8E99FD28D85}" dt="2024-05-26T21:45:43.529" v="1456" actId="1076"/>
+          <ac:cxnSpMkLst>
+            <pc:docMk/>
+            <pc:sldMk cId="1761978179" sldId="303"/>
+            <ac:cxnSpMk id="14" creationId="{1585265B-4E00-434F-A644-ADFF1F48468A}"/>
+          </ac:cxnSpMkLst>
+        </pc:cxnChg>
+      </pc:sldChg>
+      <pc:sldChg chg="addSp modSp">
+        <pc:chgData name="PEREZ VERGARA MELANY" userId="S::m.perezvergara@uandresbello.edu::d95698a7-632e-4c03-ab0f-564477513d69" providerId="AD" clId="Web-{0C7D88AA-1E6B-DAD5-588B-E8E99FD28D85}" dt="2024-05-26T19:46:54.425" v="10" actId="1076"/>
+        <pc:sldMkLst>
+          <pc:docMk/>
+          <pc:sldMk cId="3105322462" sldId="304"/>
+        </pc:sldMkLst>
+        <pc:spChg chg="add mod">
+          <ac:chgData name="PEREZ VERGARA MELANY" userId="S::m.perezvergara@uandresbello.edu::d95698a7-632e-4c03-ab0f-564477513d69" providerId="AD" clId="Web-{0C7D88AA-1E6B-DAD5-588B-E8E99FD28D85}" dt="2024-05-26T19:46:54.425" v="10" actId="1076"/>
+          <ac:spMkLst>
+            <pc:docMk/>
+            <pc:sldMk cId="3105322462" sldId="304"/>
+            <ac:spMk id="3" creationId="{70866F9F-102C-0AFC-BCE5-4E8C73321E74}"/>
+          </ac:spMkLst>
+        </pc:spChg>
+      </pc:sldChg>
+      <pc:sldChg chg="addSp delSp modSp ord">
+        <pc:chgData name="PEREZ VERGARA MELANY" userId="S::m.perezvergara@uandresbello.edu::d95698a7-632e-4c03-ab0f-564477513d69" providerId="AD" clId="Web-{0C7D88AA-1E6B-DAD5-588B-E8E99FD28D85}" dt="2024-05-26T21:43:58.509" v="1435" actId="20577"/>
+        <pc:sldMkLst>
+          <pc:docMk/>
+          <pc:sldMk cId="743564996" sldId="305"/>
+        </pc:sldMkLst>
+        <pc:spChg chg="add mod">
+          <ac:chgData name="PEREZ VERGARA MELANY" userId="S::m.perezvergara@uandresbello.edu::d95698a7-632e-4c03-ab0f-564477513d69" providerId="AD" clId="Web-{0C7D88AA-1E6B-DAD5-588B-E8E99FD28D85}" dt="2024-05-26T21:43:58.509" v="1435" actId="20577"/>
+          <ac:spMkLst>
+            <pc:docMk/>
+            <pc:sldMk cId="743564996" sldId="305"/>
+            <ac:spMk id="3" creationId="{23480A74-8042-3918-FB57-0ABA427747B4}"/>
+          </ac:spMkLst>
+        </pc:spChg>
+        <pc:spChg chg="add del mod">
+          <ac:chgData name="PEREZ VERGARA MELANY" userId="S::m.perezvergara@uandresbello.edu::d95698a7-632e-4c03-ab0f-564477513d69" providerId="AD" clId="Web-{0C7D88AA-1E6B-DAD5-588B-E8E99FD28D85}" dt="2024-05-26T20:42:20.425" v="227"/>
+          <ac:spMkLst>
+            <pc:docMk/>
+            <pc:sldMk cId="743564996" sldId="305"/>
+            <ac:spMk id="4" creationId="{0BAEEE35-569A-C1B1-3DE8-7187348AFB7D}"/>
+          </ac:spMkLst>
+        </pc:spChg>
+        <pc:spChg chg="add del mod">
+          <ac:chgData name="PEREZ VERGARA MELANY" userId="S::m.perezvergara@uandresbello.edu::d95698a7-632e-4c03-ab0f-564477513d69" providerId="AD" clId="Web-{0C7D88AA-1E6B-DAD5-588B-E8E99FD28D85}" dt="2024-05-26T20:58:17.407" v="487"/>
+          <ac:spMkLst>
+            <pc:docMk/>
+            <pc:sldMk cId="743564996" sldId="305"/>
+            <ac:spMk id="5" creationId="{433DB7EB-7290-9321-AB65-AD0581FDF5EA}"/>
+          </ac:spMkLst>
+        </pc:spChg>
+      </pc:sldChg>
+      <pc:sldChg chg="addSp modSp ord">
+        <pc:chgData name="PEREZ VERGARA MELANY" userId="S::m.perezvergara@uandresbello.edu::d95698a7-632e-4c03-ab0f-564477513d69" providerId="AD" clId="Web-{0C7D88AA-1E6B-DAD5-588B-E8E99FD28D85}" dt="2024-05-26T22:01:25.911" v="1639" actId="20577"/>
+        <pc:sldMkLst>
+          <pc:docMk/>
+          <pc:sldMk cId="2146413309" sldId="307"/>
+        </pc:sldMkLst>
+        <pc:spChg chg="add mod">
+          <ac:chgData name="PEREZ VERGARA MELANY" userId="S::m.perezvergara@uandresbello.edu::d95698a7-632e-4c03-ab0f-564477513d69" providerId="AD" clId="Web-{0C7D88AA-1E6B-DAD5-588B-E8E99FD28D85}" dt="2024-05-26T22:01:25.911" v="1639" actId="20577"/>
+          <ac:spMkLst>
+            <pc:docMk/>
+            <pc:sldMk cId="2146413309" sldId="307"/>
+            <ac:spMk id="3" creationId="{0BAEEE35-569A-C1B1-3DE8-7187348AFB7D}"/>
+          </ac:spMkLst>
+        </pc:spChg>
+      </pc:sldChg>
+      <pc:sldChg chg="add ord replId">
+        <pc:chgData name="PEREZ VERGARA MELANY" userId="S::m.perezvergara@uandresbello.edu::d95698a7-632e-4c03-ab0f-564477513d69" providerId="AD" clId="Web-{0C7D88AA-1E6B-DAD5-588B-E8E99FD28D85}" dt="2024-05-26T20:58:09.266" v="486"/>
+        <pc:sldMkLst>
+          <pc:docMk/>
+          <pc:sldMk cId="923601911" sldId="317"/>
+        </pc:sldMkLst>
+      </pc:sldChg>
+    </pc:docChg>
+  </pc:docChgLst>
+  <pc:docChgLst>
     <pc:chgData name="Paola Alejandra Jarur Chamy" userId="90bb2a2d-fae6-4337-8a41-cfbd67e07fdf" providerId="ADAL" clId="{354B2BE5-76A1-4874-B3F7-330C8C0669A1}"/>
     <pc:docChg chg="undo custSel modSld">
       <pc:chgData name="Paola Alejandra Jarur Chamy" userId="90bb2a2d-fae6-4337-8a41-cfbd67e07fdf" providerId="ADAL" clId="{354B2BE5-76A1-4874-B3F7-330C8C0669A1}" dt="2022-01-31T15:19:10.830" v="762" actId="20577"/>
@@ -2420,6 +2570,233 @@
             <pc:docMk/>
             <pc:sldMk cId="2779685119" sldId="306"/>
             <ac:picMk id="28" creationId="{77795404-A2C2-4B03-8F96-7FBA7A67E7DE}"/>
+          </ac:picMkLst>
+        </pc:picChg>
+      </pc:sldChg>
+    </pc:docChg>
+  </pc:docChgLst>
+  <pc:docChgLst>
+    <pc:chgData name="GAMBOA ALVARADO IGNACIO G" userId="d3d0d4b5-30dd-46e6-93bb-837ddea6ad49" providerId="ADAL" clId="{8CBB8C90-6B1F-4992-B562-0E68CFD0F3DC}"/>
+    <pc:docChg chg="undo custSel addSld delSld modSld">
+      <pc:chgData name="GAMBOA ALVARADO IGNACIO G" userId="d3d0d4b5-30dd-46e6-93bb-837ddea6ad49" providerId="ADAL" clId="{8CBB8C90-6B1F-4992-B562-0E68CFD0F3DC}" dt="2024-05-26T21:24:52.958" v="1430" actId="22"/>
+      <pc:docMkLst>
+        <pc:docMk/>
+      </pc:docMkLst>
+      <pc:sldChg chg="addSp delSp modSp mod modNotesTx">
+        <pc:chgData name="GAMBOA ALVARADO IGNACIO G" userId="d3d0d4b5-30dd-46e6-93bb-837ddea6ad49" providerId="ADAL" clId="{8CBB8C90-6B1F-4992-B562-0E68CFD0F3DC}" dt="2024-05-25T22:53:27.534" v="155" actId="20577"/>
+        <pc:sldMkLst>
+          <pc:docMk/>
+          <pc:sldMk cId="1957369981" sldId="262"/>
+        </pc:sldMkLst>
+        <pc:spChg chg="add mod">
+          <ac:chgData name="GAMBOA ALVARADO IGNACIO G" userId="d3d0d4b5-30dd-46e6-93bb-837ddea6ad49" providerId="ADAL" clId="{8CBB8C90-6B1F-4992-B562-0E68CFD0F3DC}" dt="2024-05-25T22:51:06.440" v="51" actId="1076"/>
+          <ac:spMkLst>
+            <pc:docMk/>
+            <pc:sldMk cId="1957369981" sldId="262"/>
+            <ac:spMk id="3" creationId="{14CE27E0-12EF-847D-668C-1C37A72AC54A}"/>
+          </ac:spMkLst>
+        </pc:spChg>
+        <pc:spChg chg="add mod">
+          <ac:chgData name="GAMBOA ALVARADO IGNACIO G" userId="d3d0d4b5-30dd-46e6-93bb-837ddea6ad49" providerId="ADAL" clId="{8CBB8C90-6B1F-4992-B562-0E68CFD0F3DC}" dt="2024-05-25T22:53:08.941" v="125" actId="115"/>
+          <ac:spMkLst>
+            <pc:docMk/>
+            <pc:sldMk cId="1957369981" sldId="262"/>
+            <ac:spMk id="4" creationId="{2A5B1E45-4D0E-297A-AB3D-9607063D7ABF}"/>
+          </ac:spMkLst>
+        </pc:spChg>
+        <pc:spChg chg="mod">
+          <ac:chgData name="GAMBOA ALVARADO IGNACIO G" userId="d3d0d4b5-30dd-46e6-93bb-837ddea6ad49" providerId="ADAL" clId="{8CBB8C90-6B1F-4992-B562-0E68CFD0F3DC}" dt="2024-05-25T22:49:46.327" v="22" actId="1076"/>
+          <ac:spMkLst>
+            <pc:docMk/>
+            <pc:sldMk cId="1957369981" sldId="262"/>
+            <ac:spMk id="13" creationId="{00000000-0000-0000-0000-000000000000}"/>
+          </ac:spMkLst>
+        </pc:spChg>
+        <pc:picChg chg="add mod">
+          <ac:chgData name="GAMBOA ALVARADO IGNACIO G" userId="d3d0d4b5-30dd-46e6-93bb-837ddea6ad49" providerId="ADAL" clId="{8CBB8C90-6B1F-4992-B562-0E68CFD0F3DC}" dt="2024-05-25T22:49:39.514" v="21" actId="1076"/>
+          <ac:picMkLst>
+            <pc:docMk/>
+            <pc:sldMk cId="1957369981" sldId="262"/>
+            <ac:picMk id="2" creationId="{AB648918-9FDB-46EB-F89C-E9D3FFF1273B}"/>
+          </ac:picMkLst>
+        </pc:picChg>
+        <pc:picChg chg="del">
+          <ac:chgData name="GAMBOA ALVARADO IGNACIO G" userId="d3d0d4b5-30dd-46e6-93bb-837ddea6ad49" providerId="ADAL" clId="{8CBB8C90-6B1F-4992-B562-0E68CFD0F3DC}" dt="2024-05-25T22:45:54.098" v="0" actId="478"/>
+          <ac:picMkLst>
+            <pc:docMk/>
+            <pc:sldMk cId="1957369981" sldId="262"/>
+            <ac:picMk id="8" creationId="{00000000-0000-0000-0000-000000000000}"/>
+          </ac:picMkLst>
+        </pc:picChg>
+        <pc:picChg chg="mod">
+          <ac:chgData name="GAMBOA ALVARADO IGNACIO G" userId="d3d0d4b5-30dd-46e6-93bb-837ddea6ad49" providerId="ADAL" clId="{8CBB8C90-6B1F-4992-B562-0E68CFD0F3DC}" dt="2024-05-25T22:48:55.182" v="17" actId="1076"/>
+          <ac:picMkLst>
+            <pc:docMk/>
+            <pc:sldMk cId="1957369981" sldId="262"/>
+            <ac:picMk id="9" creationId="{00000000-0000-0000-0000-000000000000}"/>
+          </ac:picMkLst>
+        </pc:picChg>
+        <pc:picChg chg="mod">
+          <ac:chgData name="GAMBOA ALVARADO IGNACIO G" userId="d3d0d4b5-30dd-46e6-93bb-837ddea6ad49" providerId="ADAL" clId="{8CBB8C90-6B1F-4992-B562-0E68CFD0F3DC}" dt="2024-05-25T22:49:24.864" v="20" actId="1076"/>
+          <ac:picMkLst>
+            <pc:docMk/>
+            <pc:sldMk cId="1957369981" sldId="262"/>
+            <ac:picMk id="10" creationId="{00000000-0000-0000-0000-000000000000}"/>
+          </ac:picMkLst>
+        </pc:picChg>
+      </pc:sldChg>
+      <pc:sldChg chg="addSp delSp modSp mod modNotesTx">
+        <pc:chgData name="GAMBOA ALVARADO IGNACIO G" userId="d3d0d4b5-30dd-46e6-93bb-837ddea6ad49" providerId="ADAL" clId="{8CBB8C90-6B1F-4992-B562-0E68CFD0F3DC}" dt="2024-05-25T23:12:26.814" v="1428" actId="20577"/>
+        <pc:sldMkLst>
+          <pc:docMk/>
+          <pc:sldMk cId="1761978179" sldId="303"/>
+        </pc:sldMkLst>
+        <pc:spChg chg="mod">
+          <ac:chgData name="GAMBOA ALVARADO IGNACIO G" userId="d3d0d4b5-30dd-46e6-93bb-837ddea6ad49" providerId="ADAL" clId="{8CBB8C90-6B1F-4992-B562-0E68CFD0F3DC}" dt="2024-05-25T23:01:26.637" v="850" actId="313"/>
+          <ac:spMkLst>
+            <pc:docMk/>
+            <pc:sldMk cId="1761978179" sldId="303"/>
+            <ac:spMk id="5" creationId="{699E2788-EBE2-45DF-9C0B-D666080A46A9}"/>
+          </ac:spMkLst>
+        </pc:spChg>
+        <pc:spChg chg="mod">
+          <ac:chgData name="GAMBOA ALVARADO IGNACIO G" userId="d3d0d4b5-30dd-46e6-93bb-837ddea6ad49" providerId="ADAL" clId="{8CBB8C90-6B1F-4992-B562-0E68CFD0F3DC}" dt="2024-05-25T23:05:17.306" v="1108" actId="20577"/>
+          <ac:spMkLst>
+            <pc:docMk/>
+            <pc:sldMk cId="1761978179" sldId="303"/>
+            <ac:spMk id="6" creationId="{9DEC9D77-6AA7-4B6B-881C-F31DAAE1DB2A}"/>
+          </ac:spMkLst>
+        </pc:spChg>
+        <pc:spChg chg="mod">
+          <ac:chgData name="GAMBOA ALVARADO IGNACIO G" userId="d3d0d4b5-30dd-46e6-93bb-837ddea6ad49" providerId="ADAL" clId="{8CBB8C90-6B1F-4992-B562-0E68CFD0F3DC}" dt="2024-05-25T23:12:26.814" v="1428" actId="20577"/>
+          <ac:spMkLst>
+            <pc:docMk/>
+            <pc:sldMk cId="1761978179" sldId="303"/>
+            <ac:spMk id="8" creationId="{8E5AB793-981F-4F0C-993F-B574912D895B}"/>
+          </ac:spMkLst>
+        </pc:spChg>
+        <pc:spChg chg="mod">
+          <ac:chgData name="GAMBOA ALVARADO IGNACIO G" userId="d3d0d4b5-30dd-46e6-93bb-837ddea6ad49" providerId="ADAL" clId="{8CBB8C90-6B1F-4992-B562-0E68CFD0F3DC}" dt="2024-05-25T22:59:54.044" v="747" actId="20577"/>
+          <ac:spMkLst>
+            <pc:docMk/>
+            <pc:sldMk cId="1761978179" sldId="303"/>
+            <ac:spMk id="10" creationId="{DC1D303F-E600-4ACE-9AB7-C6AEB05050D4}"/>
+          </ac:spMkLst>
+        </pc:spChg>
+        <pc:spChg chg="mod">
+          <ac:chgData name="GAMBOA ALVARADO IGNACIO G" userId="d3d0d4b5-30dd-46e6-93bb-837ddea6ad49" providerId="ADAL" clId="{8CBB8C90-6B1F-4992-B562-0E68CFD0F3DC}" dt="2024-05-25T23:03:38.271" v="875" actId="20577"/>
+          <ac:spMkLst>
+            <pc:docMk/>
+            <pc:sldMk cId="1761978179" sldId="303"/>
+            <ac:spMk id="11" creationId="{ACB6F962-DADC-4482-8A69-766A19968AF5}"/>
+          </ac:spMkLst>
+        </pc:spChg>
+        <pc:spChg chg="add del mod">
+          <ac:chgData name="GAMBOA ALVARADO IGNACIO G" userId="d3d0d4b5-30dd-46e6-93bb-837ddea6ad49" providerId="ADAL" clId="{8CBB8C90-6B1F-4992-B562-0E68CFD0F3DC}" dt="2024-05-25T23:10:21.783" v="1180" actId="20577"/>
+          <ac:spMkLst>
+            <pc:docMk/>
+            <pc:sldMk cId="1761978179" sldId="303"/>
+            <ac:spMk id="12" creationId="{A3A365B2-B2DE-4D2C-92CE-32C0611969DB}"/>
+          </ac:spMkLst>
+        </pc:spChg>
+        <pc:spChg chg="mod">
+          <ac:chgData name="GAMBOA ALVARADO IGNACIO G" userId="d3d0d4b5-30dd-46e6-93bb-837ddea6ad49" providerId="ADAL" clId="{8CBB8C90-6B1F-4992-B562-0E68CFD0F3DC}" dt="2024-05-25T23:05:32.844" v="1111" actId="1076"/>
+          <ac:spMkLst>
+            <pc:docMk/>
+            <pc:sldMk cId="1761978179" sldId="303"/>
+            <ac:spMk id="21" creationId="{6A548F58-8CF8-4D0C-8871-44C1700A4D4B}"/>
+          </ac:spMkLst>
+        </pc:spChg>
+        <pc:spChg chg="mod">
+          <ac:chgData name="GAMBOA ALVARADO IGNACIO G" userId="d3d0d4b5-30dd-46e6-93bb-837ddea6ad49" providerId="ADAL" clId="{8CBB8C90-6B1F-4992-B562-0E68CFD0F3DC}" dt="2024-05-25T23:11:36.767" v="1182" actId="1076"/>
+          <ac:spMkLst>
+            <pc:docMk/>
+            <pc:sldMk cId="1761978179" sldId="303"/>
+            <ac:spMk id="23" creationId="{73182A38-D6DF-453D-921E-315EFA20E2ED}"/>
+          </ac:spMkLst>
+        </pc:spChg>
+        <pc:cxnChg chg="mod">
+          <ac:chgData name="GAMBOA ALVARADO IGNACIO G" userId="d3d0d4b5-30dd-46e6-93bb-837ddea6ad49" providerId="ADAL" clId="{8CBB8C90-6B1F-4992-B562-0E68CFD0F3DC}" dt="2024-05-25T23:05:28.013" v="1110" actId="1076"/>
+          <ac:cxnSpMkLst>
+            <pc:docMk/>
+            <pc:sldMk cId="1761978179" sldId="303"/>
+            <ac:cxnSpMk id="22" creationId="{6A7DB234-E311-4E3B-AE05-EF5CB163CB48}"/>
+          </ac:cxnSpMkLst>
+        </pc:cxnChg>
+      </pc:sldChg>
+      <pc:sldChg chg="modNotesTx">
+        <pc:chgData name="GAMBOA ALVARADO IGNACIO G" userId="d3d0d4b5-30dd-46e6-93bb-837ddea6ad49" providerId="ADAL" clId="{8CBB8C90-6B1F-4992-B562-0E68CFD0F3DC}" dt="2024-05-25T22:55:01.615" v="462" actId="313"/>
+        <pc:sldMkLst>
+          <pc:docMk/>
+          <pc:sldMk cId="3105322462" sldId="304"/>
+        </pc:sldMkLst>
+      </pc:sldChg>
+      <pc:sldChg chg="addSp delSp mod modNotesTx">
+        <pc:chgData name="GAMBOA ALVARADO IGNACIO G" userId="d3d0d4b5-30dd-46e6-93bb-837ddea6ad49" providerId="ADAL" clId="{8CBB8C90-6B1F-4992-B562-0E68CFD0F3DC}" dt="2024-05-26T21:24:52.958" v="1430" actId="22"/>
+        <pc:sldMkLst>
+          <pc:docMk/>
+          <pc:sldMk cId="743564996" sldId="305"/>
+        </pc:sldMkLst>
+        <pc:spChg chg="add del">
+          <ac:chgData name="GAMBOA ALVARADO IGNACIO G" userId="d3d0d4b5-30dd-46e6-93bb-837ddea6ad49" providerId="ADAL" clId="{8CBB8C90-6B1F-4992-B562-0E68CFD0F3DC}" dt="2024-05-26T21:24:52.958" v="1430" actId="22"/>
+          <ac:spMkLst>
+            <pc:docMk/>
+            <pc:sldMk cId="743564996" sldId="305"/>
+            <ac:spMk id="8" creationId="{9087CC75-65C4-2427-163E-A49E235D6F83}"/>
+          </ac:spMkLst>
+        </pc:spChg>
+      </pc:sldChg>
+      <pc:sldChg chg="modNotesTx">
+        <pc:chgData name="GAMBOA ALVARADO IGNACIO G" userId="d3d0d4b5-30dd-46e6-93bb-837ddea6ad49" providerId="ADAL" clId="{8CBB8C90-6B1F-4992-B562-0E68CFD0F3DC}" dt="2024-05-25T22:58:38.633" v="727" actId="5793"/>
+        <pc:sldMkLst>
+          <pc:docMk/>
+          <pc:sldMk cId="2146413309" sldId="307"/>
+        </pc:sldMkLst>
+      </pc:sldChg>
+      <pc:sldChg chg="add del">
+        <pc:chgData name="GAMBOA ALVARADO IGNACIO G" userId="d3d0d4b5-30dd-46e6-93bb-837ddea6ad49" providerId="ADAL" clId="{8CBB8C90-6B1F-4992-B562-0E68CFD0F3DC}" dt="2024-05-25T23:00:35.106" v="784" actId="2890"/>
+        <pc:sldMkLst>
+          <pc:docMk/>
+          <pc:sldMk cId="3835194171" sldId="317"/>
+        </pc:sldMkLst>
+      </pc:sldChg>
+    </pc:docChg>
+  </pc:docChgLst>
+  <pc:docChgLst>
+    <pc:chgData name="Usuario invitado" userId="S::urn:spo:anon#eb2a7d79476950051e46bb22be043da915db42be12fcf09fa5fbcbdfd1e1932b::" providerId="AD" clId="Web-{06BA73ED-A061-6375-8FFE-D5F796DAB0DE}"/>
+    <pc:docChg chg="modSld">
+      <pc:chgData name="Usuario invitado" userId="S::urn:spo:anon#eb2a7d79476950051e46bb22be043da915db42be12fcf09fa5fbcbdfd1e1932b::" providerId="AD" clId="Web-{06BA73ED-A061-6375-8FFE-D5F796DAB0DE}" dt="2018-08-28T18:40:40.402" v="2" actId="1076"/>
+      <pc:docMkLst>
+        <pc:docMk/>
+      </pc:docMkLst>
+      <pc:sldChg chg="delSp modSp">
+        <pc:chgData name="Usuario invitado" userId="S::urn:spo:anon#eb2a7d79476950051e46bb22be043da915db42be12fcf09fa5fbcbdfd1e1932b::" providerId="AD" clId="Web-{06BA73ED-A061-6375-8FFE-D5F796DAB0DE}" dt="2018-08-28T18:40:40.402" v="2" actId="1076"/>
+        <pc:sldMkLst>
+          <pc:docMk/>
+          <pc:sldMk cId="1957369981" sldId="262"/>
+        </pc:sldMkLst>
+        <pc:spChg chg="del">
+          <ac:chgData name="Usuario invitado" userId="S::urn:spo:anon#eb2a7d79476950051e46bb22be043da915db42be12fcf09fa5fbcbdfd1e1932b::" providerId="AD" clId="Web-{06BA73ED-A061-6375-8FFE-D5F796DAB0DE}" dt="2018-08-28T18:39:21.057" v="1"/>
+          <ac:spMkLst>
+            <pc:docMk/>
+            <pc:sldMk cId="1957369981" sldId="262"/>
+            <ac:spMk id="7" creationId="{C85DB8C4-FFB0-4CA0-AC46-2DA3367DA6D7}"/>
+          </ac:spMkLst>
+        </pc:spChg>
+        <pc:spChg chg="del">
+          <ac:chgData name="Usuario invitado" userId="S::urn:spo:anon#eb2a7d79476950051e46bb22be043da915db42be12fcf09fa5fbcbdfd1e1932b::" providerId="AD" clId="Web-{06BA73ED-A061-6375-8FFE-D5F796DAB0DE}" dt="2018-08-28T18:39:18.916" v="0"/>
+          <ac:spMkLst>
+            <pc:docMk/>
+            <pc:sldMk cId="1957369981" sldId="262"/>
+            <ac:spMk id="11" creationId="{00000000-0000-0000-0000-000000000000}"/>
+          </ac:spMkLst>
+        </pc:spChg>
+        <pc:picChg chg="mod">
+          <ac:chgData name="Usuario invitado" userId="S::urn:spo:anon#eb2a7d79476950051e46bb22be043da915db42be12fcf09fa5fbcbdfd1e1932b::" providerId="AD" clId="Web-{06BA73ED-A061-6375-8FFE-D5F796DAB0DE}" dt="2018-08-28T18:40:40.402" v="2" actId="1076"/>
+          <ac:picMkLst>
+            <pc:docMk/>
+            <pc:sldMk cId="1957369981" sldId="262"/>
+            <ac:picMk id="10" creationId="{00000000-0000-0000-0000-000000000000}"/>
           </ac:picMkLst>
         </pc:picChg>
       </pc:sldChg>
@@ -2865,185 +3242,6 @@
       </pc:sldChg>
     </pc:docChg>
   </pc:docChgLst>
-  <pc:docChgLst>
-    <pc:chgData name="GAMBOA ALVARADO IGNACIO G" userId="d3d0d4b5-30dd-46e6-93bb-837ddea6ad49" providerId="ADAL" clId="{8CBB8C90-6B1F-4992-B562-0E68CFD0F3DC}"/>
-    <pc:docChg chg="undo custSel addSld delSld modSld">
-      <pc:chgData name="GAMBOA ALVARADO IGNACIO G" userId="d3d0d4b5-30dd-46e6-93bb-837ddea6ad49" providerId="ADAL" clId="{8CBB8C90-6B1F-4992-B562-0E68CFD0F3DC}" dt="2024-05-25T23:12:26.814" v="1428" actId="20577"/>
-      <pc:docMkLst>
-        <pc:docMk/>
-      </pc:docMkLst>
-      <pc:sldChg chg="addSp delSp modSp mod modNotesTx">
-        <pc:chgData name="GAMBOA ALVARADO IGNACIO G" userId="d3d0d4b5-30dd-46e6-93bb-837ddea6ad49" providerId="ADAL" clId="{8CBB8C90-6B1F-4992-B562-0E68CFD0F3DC}" dt="2024-05-25T22:53:27.534" v="155" actId="20577"/>
-        <pc:sldMkLst>
-          <pc:docMk/>
-          <pc:sldMk cId="1957369981" sldId="262"/>
-        </pc:sldMkLst>
-        <pc:spChg chg="add mod">
-          <ac:chgData name="GAMBOA ALVARADO IGNACIO G" userId="d3d0d4b5-30dd-46e6-93bb-837ddea6ad49" providerId="ADAL" clId="{8CBB8C90-6B1F-4992-B562-0E68CFD0F3DC}" dt="2024-05-25T22:51:06.440" v="51" actId="1076"/>
-          <ac:spMkLst>
-            <pc:docMk/>
-            <pc:sldMk cId="1957369981" sldId="262"/>
-            <ac:spMk id="3" creationId="{14CE27E0-12EF-847D-668C-1C37A72AC54A}"/>
-          </ac:spMkLst>
-        </pc:spChg>
-        <pc:spChg chg="add mod">
-          <ac:chgData name="GAMBOA ALVARADO IGNACIO G" userId="d3d0d4b5-30dd-46e6-93bb-837ddea6ad49" providerId="ADAL" clId="{8CBB8C90-6B1F-4992-B562-0E68CFD0F3DC}" dt="2024-05-25T22:53:08.941" v="125" actId="115"/>
-          <ac:spMkLst>
-            <pc:docMk/>
-            <pc:sldMk cId="1957369981" sldId="262"/>
-            <ac:spMk id="4" creationId="{2A5B1E45-4D0E-297A-AB3D-9607063D7ABF}"/>
-          </ac:spMkLst>
-        </pc:spChg>
-        <pc:spChg chg="mod">
-          <ac:chgData name="GAMBOA ALVARADO IGNACIO G" userId="d3d0d4b5-30dd-46e6-93bb-837ddea6ad49" providerId="ADAL" clId="{8CBB8C90-6B1F-4992-B562-0E68CFD0F3DC}" dt="2024-05-25T22:49:46.327" v="22" actId="1076"/>
-          <ac:spMkLst>
-            <pc:docMk/>
-            <pc:sldMk cId="1957369981" sldId="262"/>
-            <ac:spMk id="13" creationId="{00000000-0000-0000-0000-000000000000}"/>
-          </ac:spMkLst>
-        </pc:spChg>
-        <pc:picChg chg="add mod">
-          <ac:chgData name="GAMBOA ALVARADO IGNACIO G" userId="d3d0d4b5-30dd-46e6-93bb-837ddea6ad49" providerId="ADAL" clId="{8CBB8C90-6B1F-4992-B562-0E68CFD0F3DC}" dt="2024-05-25T22:49:39.514" v="21" actId="1076"/>
-          <ac:picMkLst>
-            <pc:docMk/>
-            <pc:sldMk cId="1957369981" sldId="262"/>
-            <ac:picMk id="2" creationId="{AB648918-9FDB-46EB-F89C-E9D3FFF1273B}"/>
-          </ac:picMkLst>
-        </pc:picChg>
-        <pc:picChg chg="del">
-          <ac:chgData name="GAMBOA ALVARADO IGNACIO G" userId="d3d0d4b5-30dd-46e6-93bb-837ddea6ad49" providerId="ADAL" clId="{8CBB8C90-6B1F-4992-B562-0E68CFD0F3DC}" dt="2024-05-25T22:45:54.098" v="0" actId="478"/>
-          <ac:picMkLst>
-            <pc:docMk/>
-            <pc:sldMk cId="1957369981" sldId="262"/>
-            <ac:picMk id="8" creationId="{00000000-0000-0000-0000-000000000000}"/>
-          </ac:picMkLst>
-        </pc:picChg>
-        <pc:picChg chg="mod">
-          <ac:chgData name="GAMBOA ALVARADO IGNACIO G" userId="d3d0d4b5-30dd-46e6-93bb-837ddea6ad49" providerId="ADAL" clId="{8CBB8C90-6B1F-4992-B562-0E68CFD0F3DC}" dt="2024-05-25T22:48:55.182" v="17" actId="1076"/>
-          <ac:picMkLst>
-            <pc:docMk/>
-            <pc:sldMk cId="1957369981" sldId="262"/>
-            <ac:picMk id="9" creationId="{00000000-0000-0000-0000-000000000000}"/>
-          </ac:picMkLst>
-        </pc:picChg>
-        <pc:picChg chg="mod">
-          <ac:chgData name="GAMBOA ALVARADO IGNACIO G" userId="d3d0d4b5-30dd-46e6-93bb-837ddea6ad49" providerId="ADAL" clId="{8CBB8C90-6B1F-4992-B562-0E68CFD0F3DC}" dt="2024-05-25T22:49:24.864" v="20" actId="1076"/>
-          <ac:picMkLst>
-            <pc:docMk/>
-            <pc:sldMk cId="1957369981" sldId="262"/>
-            <ac:picMk id="10" creationId="{00000000-0000-0000-0000-000000000000}"/>
-          </ac:picMkLst>
-        </pc:picChg>
-      </pc:sldChg>
-      <pc:sldChg chg="addSp delSp modSp mod modNotesTx">
-        <pc:chgData name="GAMBOA ALVARADO IGNACIO G" userId="d3d0d4b5-30dd-46e6-93bb-837ddea6ad49" providerId="ADAL" clId="{8CBB8C90-6B1F-4992-B562-0E68CFD0F3DC}" dt="2024-05-25T23:12:26.814" v="1428" actId="20577"/>
-        <pc:sldMkLst>
-          <pc:docMk/>
-          <pc:sldMk cId="1761978179" sldId="303"/>
-        </pc:sldMkLst>
-        <pc:spChg chg="mod">
-          <ac:chgData name="GAMBOA ALVARADO IGNACIO G" userId="d3d0d4b5-30dd-46e6-93bb-837ddea6ad49" providerId="ADAL" clId="{8CBB8C90-6B1F-4992-B562-0E68CFD0F3DC}" dt="2024-05-25T23:01:26.637" v="850" actId="313"/>
-          <ac:spMkLst>
-            <pc:docMk/>
-            <pc:sldMk cId="1761978179" sldId="303"/>
-            <ac:spMk id="5" creationId="{699E2788-EBE2-45DF-9C0B-D666080A46A9}"/>
-          </ac:spMkLst>
-        </pc:spChg>
-        <pc:spChg chg="mod">
-          <ac:chgData name="GAMBOA ALVARADO IGNACIO G" userId="d3d0d4b5-30dd-46e6-93bb-837ddea6ad49" providerId="ADAL" clId="{8CBB8C90-6B1F-4992-B562-0E68CFD0F3DC}" dt="2024-05-25T23:05:17.306" v="1108" actId="20577"/>
-          <ac:spMkLst>
-            <pc:docMk/>
-            <pc:sldMk cId="1761978179" sldId="303"/>
-            <ac:spMk id="6" creationId="{9DEC9D77-6AA7-4B6B-881C-F31DAAE1DB2A}"/>
-          </ac:spMkLst>
-        </pc:spChg>
-        <pc:spChg chg="mod">
-          <ac:chgData name="GAMBOA ALVARADO IGNACIO G" userId="d3d0d4b5-30dd-46e6-93bb-837ddea6ad49" providerId="ADAL" clId="{8CBB8C90-6B1F-4992-B562-0E68CFD0F3DC}" dt="2024-05-25T23:12:26.814" v="1428" actId="20577"/>
-          <ac:spMkLst>
-            <pc:docMk/>
-            <pc:sldMk cId="1761978179" sldId="303"/>
-            <ac:spMk id="8" creationId="{8E5AB793-981F-4F0C-993F-B574912D895B}"/>
-          </ac:spMkLst>
-        </pc:spChg>
-        <pc:spChg chg="mod">
-          <ac:chgData name="GAMBOA ALVARADO IGNACIO G" userId="d3d0d4b5-30dd-46e6-93bb-837ddea6ad49" providerId="ADAL" clId="{8CBB8C90-6B1F-4992-B562-0E68CFD0F3DC}" dt="2024-05-25T22:59:54.044" v="747" actId="20577"/>
-          <ac:spMkLst>
-            <pc:docMk/>
-            <pc:sldMk cId="1761978179" sldId="303"/>
-            <ac:spMk id="10" creationId="{DC1D303F-E600-4ACE-9AB7-C6AEB05050D4}"/>
-          </ac:spMkLst>
-        </pc:spChg>
-        <pc:spChg chg="mod">
-          <ac:chgData name="GAMBOA ALVARADO IGNACIO G" userId="d3d0d4b5-30dd-46e6-93bb-837ddea6ad49" providerId="ADAL" clId="{8CBB8C90-6B1F-4992-B562-0E68CFD0F3DC}" dt="2024-05-25T23:03:38.271" v="875" actId="20577"/>
-          <ac:spMkLst>
-            <pc:docMk/>
-            <pc:sldMk cId="1761978179" sldId="303"/>
-            <ac:spMk id="11" creationId="{ACB6F962-DADC-4482-8A69-766A19968AF5}"/>
-          </ac:spMkLst>
-        </pc:spChg>
-        <pc:spChg chg="add del mod">
-          <ac:chgData name="GAMBOA ALVARADO IGNACIO G" userId="d3d0d4b5-30dd-46e6-93bb-837ddea6ad49" providerId="ADAL" clId="{8CBB8C90-6B1F-4992-B562-0E68CFD0F3DC}" dt="2024-05-25T23:10:21.783" v="1180" actId="20577"/>
-          <ac:spMkLst>
-            <pc:docMk/>
-            <pc:sldMk cId="1761978179" sldId="303"/>
-            <ac:spMk id="12" creationId="{A3A365B2-B2DE-4D2C-92CE-32C0611969DB}"/>
-          </ac:spMkLst>
-        </pc:spChg>
-        <pc:spChg chg="mod">
-          <ac:chgData name="GAMBOA ALVARADO IGNACIO G" userId="d3d0d4b5-30dd-46e6-93bb-837ddea6ad49" providerId="ADAL" clId="{8CBB8C90-6B1F-4992-B562-0E68CFD0F3DC}" dt="2024-05-25T23:05:32.844" v="1111" actId="1076"/>
-          <ac:spMkLst>
-            <pc:docMk/>
-            <pc:sldMk cId="1761978179" sldId="303"/>
-            <ac:spMk id="21" creationId="{6A548F58-8CF8-4D0C-8871-44C1700A4D4B}"/>
-          </ac:spMkLst>
-        </pc:spChg>
-        <pc:spChg chg="mod">
-          <ac:chgData name="GAMBOA ALVARADO IGNACIO G" userId="d3d0d4b5-30dd-46e6-93bb-837ddea6ad49" providerId="ADAL" clId="{8CBB8C90-6B1F-4992-B562-0E68CFD0F3DC}" dt="2024-05-25T23:11:36.767" v="1182" actId="1076"/>
-          <ac:spMkLst>
-            <pc:docMk/>
-            <pc:sldMk cId="1761978179" sldId="303"/>
-            <ac:spMk id="23" creationId="{73182A38-D6DF-453D-921E-315EFA20E2ED}"/>
-          </ac:spMkLst>
-        </pc:spChg>
-        <pc:cxnChg chg="mod">
-          <ac:chgData name="GAMBOA ALVARADO IGNACIO G" userId="d3d0d4b5-30dd-46e6-93bb-837ddea6ad49" providerId="ADAL" clId="{8CBB8C90-6B1F-4992-B562-0E68CFD0F3DC}" dt="2024-05-25T23:05:28.013" v="1110" actId="1076"/>
-          <ac:cxnSpMkLst>
-            <pc:docMk/>
-            <pc:sldMk cId="1761978179" sldId="303"/>
-            <ac:cxnSpMk id="22" creationId="{6A7DB234-E311-4E3B-AE05-EF5CB163CB48}"/>
-          </ac:cxnSpMkLst>
-        </pc:cxnChg>
-      </pc:sldChg>
-      <pc:sldChg chg="modNotesTx">
-        <pc:chgData name="GAMBOA ALVARADO IGNACIO G" userId="d3d0d4b5-30dd-46e6-93bb-837ddea6ad49" providerId="ADAL" clId="{8CBB8C90-6B1F-4992-B562-0E68CFD0F3DC}" dt="2024-05-25T22:55:01.615" v="462" actId="313"/>
-        <pc:sldMkLst>
-          <pc:docMk/>
-          <pc:sldMk cId="3105322462" sldId="304"/>
-        </pc:sldMkLst>
-      </pc:sldChg>
-      <pc:sldChg chg="modNotesTx">
-        <pc:chgData name="GAMBOA ALVARADO IGNACIO G" userId="d3d0d4b5-30dd-46e6-93bb-837ddea6ad49" providerId="ADAL" clId="{8CBB8C90-6B1F-4992-B562-0E68CFD0F3DC}" dt="2024-05-25T22:56:08.898" v="613" actId="33524"/>
-        <pc:sldMkLst>
-          <pc:docMk/>
-          <pc:sldMk cId="743564996" sldId="305"/>
-        </pc:sldMkLst>
-      </pc:sldChg>
-      <pc:sldChg chg="modNotesTx">
-        <pc:chgData name="GAMBOA ALVARADO IGNACIO G" userId="d3d0d4b5-30dd-46e6-93bb-837ddea6ad49" providerId="ADAL" clId="{8CBB8C90-6B1F-4992-B562-0E68CFD0F3DC}" dt="2024-05-25T22:58:38.633" v="727" actId="5793"/>
-        <pc:sldMkLst>
-          <pc:docMk/>
-          <pc:sldMk cId="2146413309" sldId="307"/>
-        </pc:sldMkLst>
-      </pc:sldChg>
-      <pc:sldChg chg="add del">
-        <pc:chgData name="GAMBOA ALVARADO IGNACIO G" userId="d3d0d4b5-30dd-46e6-93bb-837ddea6ad49" providerId="ADAL" clId="{8CBB8C90-6B1F-4992-B562-0E68CFD0F3DC}" dt="2024-05-25T23:00:35.106" v="784" actId="2890"/>
-        <pc:sldMkLst>
-          <pc:docMk/>
-          <pc:sldMk cId="3835194171" sldId="317"/>
-        </pc:sldMkLst>
-      </pc:sldChg>
-    </pc:docChg>
-  </pc:docChgLst>
 </pc:chgInfo>
 </file>
 
@@ -3129,7 +3327,7 @@
           <a:p>
             <a:fld id="{89347D60-E39B-E041-B6CE-3FDC1A8BB989}" type="datetimeFigureOut">
               <a:rPr lang="es-ES_tradnl" smtClean="0"/>
-              <a:t>25/05/2024</a:t>
+              <a:t>26/05/2024</a:t>
             </a:fld>
             <a:endParaRPr lang="es-ES_tradnl"/>
           </a:p>
@@ -3441,14 +3639,14 @@
           <a:lstStyle/>
           <a:p>
             <a:r>
-              <a:rPr lang="es-CL" dirty="0"/>
+              <a:rPr lang="es-CL"/>
               <a:t>Portada de la </a:t>
             </a:r>
             <a:r>
-              <a:rPr lang="es-CL" dirty="0" err="1"/>
+              <a:rPr lang="es-CL" err="1"/>
               <a:t>Presentacion</a:t>
             </a:r>
-            <a:endParaRPr lang="es-MX" dirty="0"/>
+            <a:endParaRPr lang="es-MX"/>
           </a:p>
         </p:txBody>
       </p:sp>
@@ -3532,7 +3730,7 @@
           <a:bodyPr/>
           <a:lstStyle/>
           <a:p>
-            <a:endParaRPr lang="es-ES_tradnl" dirty="0"/>
+            <a:endParaRPr lang="es-ES_tradnl"/>
           </a:p>
         </p:txBody>
       </p:sp>
@@ -3562,7 +3760,7 @@
     </p:spTree>
     <p:extLst>
       <p:ext uri="{BB962C8B-B14F-4D97-AF65-F5344CB8AC3E}">
-        <p14:creationId xmlns:p14="http://schemas.microsoft.com/office/powerpoint/2010/main" val="1236254308"/>
+        <p14:creationId xmlns:p14="http://schemas.microsoft.com/office/powerpoint/2010/main" val="4120998062"/>
       </p:ext>
     </p:extLst>
   </p:cSld>
@@ -3616,7 +3814,7 @@
           <a:bodyPr/>
           <a:lstStyle/>
           <a:p>
-            <a:endParaRPr lang="es-ES_tradnl" dirty="0"/>
+            <a:endParaRPr lang="es-ES_tradnl"/>
           </a:p>
         </p:txBody>
       </p:sp>
@@ -3646,7 +3844,7 @@
     </p:spTree>
     <p:extLst>
       <p:ext uri="{BB962C8B-B14F-4D97-AF65-F5344CB8AC3E}">
-        <p14:creationId xmlns:p14="http://schemas.microsoft.com/office/powerpoint/2010/main" val="2216672859"/>
+        <p14:creationId xmlns:p14="http://schemas.microsoft.com/office/powerpoint/2010/main" val="1236254308"/>
       </p:ext>
     </p:extLst>
   </p:cSld>
@@ -3700,7 +3898,7 @@
           <a:bodyPr/>
           <a:lstStyle/>
           <a:p>
-            <a:endParaRPr lang="es-ES_tradnl" dirty="0"/>
+            <a:endParaRPr lang="es-ES_tradnl"/>
           </a:p>
         </p:txBody>
       </p:sp>
@@ -3730,7 +3928,7 @@
     </p:spTree>
     <p:extLst>
       <p:ext uri="{BB962C8B-B14F-4D97-AF65-F5344CB8AC3E}">
-        <p14:creationId xmlns:p14="http://schemas.microsoft.com/office/powerpoint/2010/main" val="3678623892"/>
+        <p14:creationId xmlns:p14="http://schemas.microsoft.com/office/powerpoint/2010/main" val="2216672859"/>
       </p:ext>
     </p:extLst>
   </p:cSld>
@@ -3784,7 +3982,7 @@
           <a:bodyPr/>
           <a:lstStyle/>
           <a:p>
-            <a:endParaRPr lang="es-ES_tradnl" dirty="0"/>
+            <a:endParaRPr lang="es-ES_tradnl"/>
           </a:p>
         </p:txBody>
       </p:sp>
@@ -3814,7 +4012,7 @@
     </p:spTree>
     <p:extLst>
       <p:ext uri="{BB962C8B-B14F-4D97-AF65-F5344CB8AC3E}">
-        <p14:creationId xmlns:p14="http://schemas.microsoft.com/office/powerpoint/2010/main" val="296608123"/>
+        <p14:creationId xmlns:p14="http://schemas.microsoft.com/office/powerpoint/2010/main" val="3678623892"/>
       </p:ext>
     </p:extLst>
   </p:cSld>
@@ -3868,7 +4066,7 @@
           <a:bodyPr/>
           <a:lstStyle/>
           <a:p>
-            <a:endParaRPr lang="es-ES_tradnl" dirty="0"/>
+            <a:endParaRPr lang="es-ES_tradnl"/>
           </a:p>
         </p:txBody>
       </p:sp>
@@ -3898,7 +4096,7 @@
     </p:spTree>
     <p:extLst>
       <p:ext uri="{BB962C8B-B14F-4D97-AF65-F5344CB8AC3E}">
-        <p14:creationId xmlns:p14="http://schemas.microsoft.com/office/powerpoint/2010/main" val="2925636881"/>
+        <p14:creationId xmlns:p14="http://schemas.microsoft.com/office/powerpoint/2010/main" val="296608123"/>
       </p:ext>
     </p:extLst>
   </p:cSld>
@@ -3952,7 +4150,7 @@
           <a:bodyPr/>
           <a:lstStyle/>
           <a:p>
-            <a:endParaRPr lang="es-ES_tradnl" dirty="0"/>
+            <a:endParaRPr lang="es-ES_tradnl"/>
           </a:p>
         </p:txBody>
       </p:sp>
@@ -3974,6 +4172,90 @@
             <a:fld id="{80AD1966-643A-ED45-BFF9-B0FE18A32E2B}" type="slidenum">
               <a:rPr lang="es-ES_tradnl" smtClean="0"/>
               <a:t>15</a:t>
+            </a:fld>
+            <a:endParaRPr lang="es-ES_tradnl"/>
+          </a:p>
+        </p:txBody>
+      </p:sp>
+    </p:spTree>
+    <p:extLst>
+      <p:ext uri="{BB962C8B-B14F-4D97-AF65-F5344CB8AC3E}">
+        <p14:creationId xmlns:p14="http://schemas.microsoft.com/office/powerpoint/2010/main" val="2925636881"/>
+      </p:ext>
+    </p:extLst>
+  </p:cSld>
+  <p:clrMapOvr>
+    <a:masterClrMapping/>
+  </p:clrMapOvr>
+</p:notes>
+</file>
+
+<file path=ppt/notesSlides/notesSlide16.xml><?xml version="1.0" encoding="utf-8"?>
+<p:notes xmlns:a="http://schemas.openxmlformats.org/drawingml/2006/main" xmlns:r="http://schemas.openxmlformats.org/officeDocument/2006/relationships" xmlns:p="http://schemas.openxmlformats.org/presentationml/2006/main">
+  <p:cSld>
+    <p:spTree>
+      <p:nvGrpSpPr>
+        <p:cNvPr id="1" name=""/>
+        <p:cNvGrpSpPr/>
+        <p:nvPr/>
+      </p:nvGrpSpPr>
+      <p:grpSpPr>
+        <a:xfrm>
+          <a:off x="0" y="0"/>
+          <a:ext cx="0" cy="0"/>
+          <a:chOff x="0" y="0"/>
+          <a:chExt cx="0" cy="0"/>
+        </a:xfrm>
+      </p:grpSpPr>
+      <p:sp>
+        <p:nvSpPr>
+          <p:cNvPr id="2" name="Marcador de imagen de diapositiva 1"/>
+          <p:cNvSpPr>
+            <a:spLocks noGrp="1" noRot="1" noChangeAspect="1"/>
+          </p:cNvSpPr>
+          <p:nvPr>
+            <p:ph type="sldImg"/>
+          </p:nvPr>
+        </p:nvSpPr>
+        <p:spPr/>
+      </p:sp>
+      <p:sp>
+        <p:nvSpPr>
+          <p:cNvPr id="3" name="Marcador de notas 2"/>
+          <p:cNvSpPr>
+            <a:spLocks noGrp="1"/>
+          </p:cNvSpPr>
+          <p:nvPr>
+            <p:ph type="body" idx="1"/>
+          </p:nvPr>
+        </p:nvSpPr>
+        <p:spPr/>
+        <p:txBody>
+          <a:bodyPr/>
+          <a:lstStyle/>
+          <a:p>
+            <a:endParaRPr lang="es-ES_tradnl"/>
+          </a:p>
+        </p:txBody>
+      </p:sp>
+      <p:sp>
+        <p:nvSpPr>
+          <p:cNvPr id="4" name="Marcador de número de diapositiva 3"/>
+          <p:cNvSpPr>
+            <a:spLocks noGrp="1"/>
+          </p:cNvSpPr>
+          <p:nvPr>
+            <p:ph type="sldNum" sz="quarter" idx="10"/>
+          </p:nvPr>
+        </p:nvSpPr>
+        <p:spPr/>
+        <p:txBody>
+          <a:bodyPr/>
+          <a:lstStyle/>
+          <a:p>
+            <a:fld id="{80AD1966-643A-ED45-BFF9-B0FE18A32E2B}" type="slidenum">
+              <a:rPr lang="es-ES_tradnl" smtClean="0"/>
+              <a:t>16</a:t>
             </a:fld>
             <a:endParaRPr lang="es-ES_tradnl"/>
           </a:p>
@@ -4037,8 +4319,8 @@
           <a:lstStyle/>
           <a:p>
             <a:r>
-              <a:rPr lang="es-ES_tradnl" dirty="0"/>
-              <a:t>Resumen de la presentación anterior y resumen de los datos</a:t>
+              <a:rPr lang="es-ES_tradnl"/>
+              <a:t>Resumen del aprendizaje supervisado y los algoritmos a considerar sin explicar, estos se justificarán a medida que se avance…</a:t>
             </a:r>
           </a:p>
         </p:txBody>
@@ -4069,7 +4351,7 @@
     </p:spTree>
     <p:extLst>
       <p:ext uri="{BB962C8B-B14F-4D97-AF65-F5344CB8AC3E}">
-        <p14:creationId xmlns:p14="http://schemas.microsoft.com/office/powerpoint/2010/main" val="1915245970"/>
+        <p14:creationId xmlns:p14="http://schemas.microsoft.com/office/powerpoint/2010/main" val="3976011419"/>
       </p:ext>
     </p:extLst>
   </p:cSld>
@@ -4124,16 +4406,8 @@
           <a:lstStyle/>
           <a:p>
             <a:r>
-              <a:rPr lang="es-ES_tradnl" dirty="0"/>
-              <a:t>Primer mach con las conclusiones anteriores, de preferencia mostrar aquí lo </a:t>
-            </a:r>
-            <a:r>
-              <a:rPr lang="es-ES_tradnl" dirty="0" err="1"/>
-              <a:t>faaltante</a:t>
-            </a:r>
-            <a:r>
-              <a:rPr lang="es-ES_tradnl" dirty="0"/>
-              <a:t> de la presentación 1 (LA REGRESION LINEAL)</a:t>
+              <a:rPr lang="es-ES_tradnl"/>
+              <a:t>Resumen de la presentación anterior y resumen de los datos</a:t>
             </a:r>
           </a:p>
         </p:txBody>
@@ -4219,7 +4493,7 @@
           <a:lstStyle/>
           <a:p>
             <a:r>
-              <a:rPr lang="es-ES_tradnl" dirty="0"/>
+              <a:rPr lang="es-ES_tradnl"/>
               <a:t>Resumen del aprendizaje supervisado y los algoritmos a considerar sin explicar, estos se justificarán a medida que se avance…</a:t>
             </a:r>
           </a:p>
@@ -4251,7 +4525,7 @@
     </p:spTree>
     <p:extLst>
       <p:ext uri="{BB962C8B-B14F-4D97-AF65-F5344CB8AC3E}">
-        <p14:creationId xmlns:p14="http://schemas.microsoft.com/office/powerpoint/2010/main" val="3976011419"/>
+        <p14:creationId xmlns:p14="http://schemas.microsoft.com/office/powerpoint/2010/main" val="3128409536"/>
       </p:ext>
     </p:extLst>
   </p:cSld>
@@ -4306,13 +4580,13 @@
           <a:lstStyle/>
           <a:p>
             <a:r>
-              <a:rPr lang="es-ES_tradnl" dirty="0"/>
+              <a:rPr lang="es-ES_tradnl"/>
               <a:t>Variable dependiente: Precio.</a:t>
             </a:r>
           </a:p>
           <a:p>
             <a:r>
-              <a:rPr lang="es-ES_tradnl" dirty="0"/>
+              <a:rPr lang="es-ES_tradnl"/>
               <a:t>Variables independientes: Todas las demás.</a:t>
             </a:r>
           </a:p>
@@ -4398,7 +4672,18 @@
           <a:bodyPr/>
           <a:lstStyle/>
           <a:p>
-            <a:endParaRPr lang="es-ES_tradnl" dirty="0"/>
+            <a:r>
+              <a:rPr lang="es-ES_tradnl"/>
+              <a:t>Primer mach con las conclusiones anteriores, de preferencia mostrar aquí lo </a:t>
+            </a:r>
+            <a:r>
+              <a:rPr lang="es-ES_tradnl" err="1"/>
+              <a:t>faaltante</a:t>
+            </a:r>
+            <a:r>
+              <a:rPr lang="es-ES_tradnl"/>
+              <a:t> de la presentación 1 (LA REGRESION LINEAL)</a:t>
+            </a:r>
           </a:p>
         </p:txBody>
       </p:sp>
@@ -4428,7 +4713,7 @@
     </p:spTree>
     <p:extLst>
       <p:ext uri="{BB962C8B-B14F-4D97-AF65-F5344CB8AC3E}">
-        <p14:creationId xmlns:p14="http://schemas.microsoft.com/office/powerpoint/2010/main" val="3081660808"/>
+        <p14:creationId xmlns:p14="http://schemas.microsoft.com/office/powerpoint/2010/main" val="1915245970"/>
       </p:ext>
     </p:extLst>
   </p:cSld>
@@ -4482,7 +4767,7 @@
           <a:bodyPr/>
           <a:lstStyle/>
           <a:p>
-            <a:endParaRPr lang="es-ES_tradnl" dirty="0"/>
+            <a:endParaRPr lang="es-ES_tradnl"/>
           </a:p>
         </p:txBody>
       </p:sp>
@@ -4512,7 +4797,7 @@
     </p:spTree>
     <p:extLst>
       <p:ext uri="{BB962C8B-B14F-4D97-AF65-F5344CB8AC3E}">
-        <p14:creationId xmlns:p14="http://schemas.microsoft.com/office/powerpoint/2010/main" val="547028226"/>
+        <p14:creationId xmlns:p14="http://schemas.microsoft.com/office/powerpoint/2010/main" val="3081660808"/>
       </p:ext>
     </p:extLst>
   </p:cSld>
@@ -4566,7 +4851,7 @@
           <a:bodyPr/>
           <a:lstStyle/>
           <a:p>
-            <a:endParaRPr lang="es-ES_tradnl" dirty="0"/>
+            <a:endParaRPr lang="es-ES_tradnl"/>
           </a:p>
         </p:txBody>
       </p:sp>
@@ -4596,7 +4881,7 @@
     </p:spTree>
     <p:extLst>
       <p:ext uri="{BB962C8B-B14F-4D97-AF65-F5344CB8AC3E}">
-        <p14:creationId xmlns:p14="http://schemas.microsoft.com/office/powerpoint/2010/main" val="972177286"/>
+        <p14:creationId xmlns:p14="http://schemas.microsoft.com/office/powerpoint/2010/main" val="547028226"/>
       </p:ext>
     </p:extLst>
   </p:cSld>
@@ -4650,7 +4935,7 @@
           <a:bodyPr/>
           <a:lstStyle/>
           <a:p>
-            <a:endParaRPr lang="es-ES_tradnl" dirty="0"/>
+            <a:endParaRPr lang="es-ES_tradnl"/>
           </a:p>
         </p:txBody>
       </p:sp>
@@ -4680,7 +4965,7 @@
     </p:spTree>
     <p:extLst>
       <p:ext uri="{BB962C8B-B14F-4D97-AF65-F5344CB8AC3E}">
-        <p14:creationId xmlns:p14="http://schemas.microsoft.com/office/powerpoint/2010/main" val="4120998062"/>
+        <p14:creationId xmlns:p14="http://schemas.microsoft.com/office/powerpoint/2010/main" val="972177286"/>
       </p:ext>
     </p:extLst>
   </p:cSld>
@@ -4735,7 +5020,7 @@
               <a:rPr lang="es-ES_tradnl"/>
               <a:t>Clic para editar título</a:t>
             </a:r>
-            <a:endParaRPr lang="en-US" dirty="0"/>
+            <a:endParaRPr lang="en-US"/>
           </a:p>
         </p:txBody>
       </p:sp>
@@ -4800,7 +5085,7 @@
               <a:rPr lang="es-ES_tradnl"/>
               <a:t>Haga clic para modificar el estilo de subtítulo del patrón</a:t>
             </a:r>
-            <a:endParaRPr lang="en-US" dirty="0"/>
+            <a:endParaRPr lang="en-US"/>
           </a:p>
         </p:txBody>
       </p:sp>
@@ -4821,7 +5106,7 @@
           <a:p>
             <a:fld id="{6FD36221-589F-2846-B89B-D09559D774BF}" type="datetimeFigureOut">
               <a:rPr lang="es-ES_tradnl" smtClean="0"/>
-              <a:t>25/05/2024</a:t>
+              <a:t>26/05/2024</a:t>
             </a:fld>
             <a:endParaRPr lang="es-ES_tradnl"/>
           </a:p>
@@ -4913,7 +5198,7 @@
               <a:rPr lang="es-ES_tradnl"/>
               <a:t>Clic para editar título</a:t>
             </a:r>
-            <a:endParaRPr lang="en-US" dirty="0"/>
+            <a:endParaRPr lang="en-US"/>
           </a:p>
         </p:txBody>
       </p:sp>
@@ -4965,7 +5250,7 @@
               <a:rPr lang="es-ES_tradnl"/>
               <a:t>Quinto nivel</a:t>
             </a:r>
-            <a:endParaRPr lang="en-US" dirty="0"/>
+            <a:endParaRPr lang="en-US"/>
           </a:p>
         </p:txBody>
       </p:sp>
@@ -4986,7 +5271,7 @@
           <a:p>
             <a:fld id="{6FD36221-589F-2846-B89B-D09559D774BF}" type="datetimeFigureOut">
               <a:rPr lang="es-ES_tradnl" smtClean="0"/>
-              <a:t>25/05/2024</a:t>
+              <a:t>26/05/2024</a:t>
             </a:fld>
             <a:endParaRPr lang="es-ES_tradnl"/>
           </a:p>
@@ -5083,7 +5368,7 @@
               <a:rPr lang="es-ES_tradnl"/>
               <a:t>Clic para editar título</a:t>
             </a:r>
-            <a:endParaRPr lang="en-US" dirty="0"/>
+            <a:endParaRPr lang="en-US"/>
           </a:p>
         </p:txBody>
       </p:sp>
@@ -5140,7 +5425,7 @@
               <a:rPr lang="es-ES_tradnl"/>
               <a:t>Quinto nivel</a:t>
             </a:r>
-            <a:endParaRPr lang="en-US" dirty="0"/>
+            <a:endParaRPr lang="en-US"/>
           </a:p>
         </p:txBody>
       </p:sp>
@@ -5161,7 +5446,7 @@
           <a:p>
             <a:fld id="{6FD36221-589F-2846-B89B-D09559D774BF}" type="datetimeFigureOut">
               <a:rPr lang="es-ES_tradnl" smtClean="0"/>
-              <a:t>25/05/2024</a:t>
+              <a:t>26/05/2024</a:t>
             </a:fld>
             <a:endParaRPr lang="es-ES_tradnl"/>
           </a:p>
@@ -5253,7 +5538,7 @@
               <a:rPr lang="es-ES_tradnl"/>
               <a:t>Clic para editar título</a:t>
             </a:r>
-            <a:endParaRPr lang="en-US" dirty="0"/>
+            <a:endParaRPr lang="en-US"/>
           </a:p>
         </p:txBody>
       </p:sp>
@@ -5305,7 +5590,7 @@
               <a:rPr lang="es-ES_tradnl"/>
               <a:t>Quinto nivel</a:t>
             </a:r>
-            <a:endParaRPr lang="en-US" dirty="0"/>
+            <a:endParaRPr lang="en-US"/>
           </a:p>
         </p:txBody>
       </p:sp>
@@ -5326,7 +5611,7 @@
           <a:p>
             <a:fld id="{6FD36221-589F-2846-B89B-D09559D774BF}" type="datetimeFigureOut">
               <a:rPr lang="es-ES_tradnl" smtClean="0"/>
-              <a:t>25/05/2024</a:t>
+              <a:t>26/05/2024</a:t>
             </a:fld>
             <a:endParaRPr lang="es-ES_tradnl"/>
           </a:p>
@@ -5427,7 +5712,7 @@
               <a:rPr lang="es-ES_tradnl"/>
               <a:t>Clic para editar título</a:t>
             </a:r>
-            <a:endParaRPr lang="en-US" dirty="0"/>
+            <a:endParaRPr lang="en-US"/>
           </a:p>
         </p:txBody>
       </p:sp>
@@ -5565,7 +5850,7 @@
           <a:p>
             <a:fld id="{6FD36221-589F-2846-B89B-D09559D774BF}" type="datetimeFigureOut">
               <a:rPr lang="es-ES_tradnl" smtClean="0"/>
-              <a:t>25/05/2024</a:t>
+              <a:t>26/05/2024</a:t>
             </a:fld>
             <a:endParaRPr lang="es-ES_tradnl"/>
           </a:p>
@@ -5657,7 +5942,7 @@
               <a:rPr lang="es-ES_tradnl"/>
               <a:t>Clic para editar título</a:t>
             </a:r>
-            <a:endParaRPr lang="en-US" dirty="0"/>
+            <a:endParaRPr lang="en-US"/>
           </a:p>
         </p:txBody>
       </p:sp>
@@ -5714,7 +5999,7 @@
               <a:rPr lang="es-ES_tradnl"/>
               <a:t>Quinto nivel</a:t>
             </a:r>
-            <a:endParaRPr lang="en-US" dirty="0"/>
+            <a:endParaRPr lang="en-US"/>
           </a:p>
         </p:txBody>
       </p:sp>
@@ -5771,7 +6056,7 @@
               <a:rPr lang="es-ES_tradnl"/>
               <a:t>Quinto nivel</a:t>
             </a:r>
-            <a:endParaRPr lang="en-US" dirty="0"/>
+            <a:endParaRPr lang="en-US"/>
           </a:p>
         </p:txBody>
       </p:sp>
@@ -5792,7 +6077,7 @@
           <a:p>
             <a:fld id="{6FD36221-589F-2846-B89B-D09559D774BF}" type="datetimeFigureOut">
               <a:rPr lang="es-ES_tradnl" smtClean="0"/>
-              <a:t>25/05/2024</a:t>
+              <a:t>26/05/2024</a:t>
             </a:fld>
             <a:endParaRPr lang="es-ES_tradnl"/>
           </a:p>
@@ -5889,7 +6174,7 @@
               <a:rPr lang="es-ES_tradnl"/>
               <a:t>Clic para editar título</a:t>
             </a:r>
-            <a:endParaRPr lang="en-US" dirty="0"/>
+            <a:endParaRPr lang="en-US"/>
           </a:p>
         </p:txBody>
       </p:sp>
@@ -6011,7 +6296,7 @@
               <a:rPr lang="es-ES_tradnl"/>
               <a:t>Quinto nivel</a:t>
             </a:r>
-            <a:endParaRPr lang="en-US" dirty="0"/>
+            <a:endParaRPr lang="en-US"/>
           </a:p>
         </p:txBody>
       </p:sp>
@@ -6133,7 +6418,7 @@
               <a:rPr lang="es-ES_tradnl"/>
               <a:t>Quinto nivel</a:t>
             </a:r>
-            <a:endParaRPr lang="en-US" dirty="0"/>
+            <a:endParaRPr lang="en-US"/>
           </a:p>
         </p:txBody>
       </p:sp>
@@ -6154,7 +6439,7 @@
           <a:p>
             <a:fld id="{6FD36221-589F-2846-B89B-D09559D774BF}" type="datetimeFigureOut">
               <a:rPr lang="es-ES_tradnl" smtClean="0"/>
-              <a:t>25/05/2024</a:t>
+              <a:t>26/05/2024</a:t>
             </a:fld>
             <a:endParaRPr lang="es-ES_tradnl"/>
           </a:p>
@@ -6246,7 +6531,7 @@
               <a:rPr lang="es-ES_tradnl"/>
               <a:t>Clic para editar título</a:t>
             </a:r>
-            <a:endParaRPr lang="en-US" dirty="0"/>
+            <a:endParaRPr lang="en-US"/>
           </a:p>
         </p:txBody>
       </p:sp>
@@ -6267,7 +6552,7 @@
           <a:p>
             <a:fld id="{6FD36221-589F-2846-B89B-D09559D774BF}" type="datetimeFigureOut">
               <a:rPr lang="es-ES_tradnl" smtClean="0"/>
-              <a:t>25/05/2024</a:t>
+              <a:t>26/05/2024</a:t>
             </a:fld>
             <a:endParaRPr lang="es-ES_tradnl"/>
           </a:p>
@@ -6357,7 +6642,7 @@
           <a:p>
             <a:fld id="{6FD36221-589F-2846-B89B-D09559D774BF}" type="datetimeFigureOut">
               <a:rPr lang="es-ES_tradnl" smtClean="0"/>
-              <a:t>25/05/2024</a:t>
+              <a:t>26/05/2024</a:t>
             </a:fld>
             <a:endParaRPr lang="es-ES_tradnl"/>
           </a:p>
@@ -6458,7 +6743,7 @@
               <a:rPr lang="es-ES_tradnl"/>
               <a:t>Clic para editar título</a:t>
             </a:r>
-            <a:endParaRPr lang="en-US" dirty="0"/>
+            <a:endParaRPr lang="en-US"/>
           </a:p>
         </p:txBody>
       </p:sp>
@@ -6543,7 +6828,7 @@
               <a:rPr lang="es-ES_tradnl"/>
               <a:t>Quinto nivel</a:t>
             </a:r>
-            <a:endParaRPr lang="en-US" dirty="0"/>
+            <a:endParaRPr lang="en-US"/>
           </a:p>
         </p:txBody>
       </p:sp>
@@ -6629,7 +6914,7 @@
           <a:p>
             <a:fld id="{6FD36221-589F-2846-B89B-D09559D774BF}" type="datetimeFigureOut">
               <a:rPr lang="es-ES_tradnl" smtClean="0"/>
-              <a:t>25/05/2024</a:t>
+              <a:t>26/05/2024</a:t>
             </a:fld>
             <a:endParaRPr lang="es-ES_tradnl"/>
           </a:p>
@@ -6730,7 +7015,7 @@
               <a:rPr lang="es-ES_tradnl"/>
               <a:t>Clic para editar título</a:t>
             </a:r>
-            <a:endParaRPr lang="en-US" dirty="0"/>
+            <a:endParaRPr lang="en-US"/>
           </a:p>
         </p:txBody>
       </p:sp>
@@ -6795,7 +7080,7 @@
               <a:rPr lang="es-ES_tradnl"/>
               <a:t>Arrastre la imagen al marcador de posición o haga clic en el icono para agregarla</a:t>
             </a:r>
-            <a:endParaRPr lang="en-US" dirty="0"/>
+            <a:endParaRPr lang="en-US"/>
           </a:p>
         </p:txBody>
       </p:sp>
@@ -6881,7 +7166,7 @@
           <a:p>
             <a:fld id="{6FD36221-589F-2846-B89B-D09559D774BF}" type="datetimeFigureOut">
               <a:rPr lang="es-ES_tradnl" smtClean="0"/>
-              <a:t>25/05/2024</a:t>
+              <a:t>26/05/2024</a:t>
             </a:fld>
             <a:endParaRPr lang="es-ES_tradnl"/>
           </a:p>
@@ -6988,7 +7273,7 @@
               <a:rPr lang="es-ES_tradnl"/>
               <a:t>Clic para editar título</a:t>
             </a:r>
-            <a:endParaRPr lang="en-US" dirty="0"/>
+            <a:endParaRPr lang="en-US"/>
           </a:p>
         </p:txBody>
       </p:sp>
@@ -7050,7 +7335,7 @@
               <a:rPr lang="es-ES_tradnl"/>
               <a:t>Quinto nivel</a:t>
             </a:r>
-            <a:endParaRPr lang="en-US" dirty="0"/>
+            <a:endParaRPr lang="en-US"/>
           </a:p>
         </p:txBody>
       </p:sp>
@@ -7089,7 +7374,7 @@
           <a:p>
             <a:fld id="{6FD36221-589F-2846-B89B-D09559D774BF}" type="datetimeFigureOut">
               <a:rPr lang="es-ES_tradnl" smtClean="0"/>
-              <a:t>25/05/2024</a:t>
+              <a:t>26/05/2024</a:t>
             </a:fld>
             <a:endParaRPr lang="es-ES_tradnl"/>
           </a:p>
@@ -7589,7 +7874,7 @@
           <a:lstStyle/>
           <a:p>
             <a:r>
-              <a:rPr lang="es-ES_tradnl" sz="1200" b="1" dirty="0">
+              <a:rPr lang="es-ES_tradnl" sz="1200" b="1">
                 <a:solidFill>
                   <a:schemeClr val="bg1"/>
                 </a:solidFill>
@@ -7667,7 +7952,7 @@
           <a:p>
             <a:pPr algn="ctr"/>
             <a:r>
-              <a:rPr lang="es-CL" dirty="0">
+              <a:rPr lang="es-CL">
                 <a:solidFill>
                   <a:schemeClr val="bg1"/>
                 </a:solidFill>
@@ -7676,7 +7961,7 @@
               </a:rPr>
               <a:t>Minería de Datos.</a:t>
             </a:r>
-            <a:endParaRPr lang="es-MX" dirty="0">
+            <a:endParaRPr lang="es-MX">
               <a:solidFill>
                 <a:schemeClr val="bg1"/>
               </a:solidFill>
@@ -7715,7 +8000,7 @@
           <a:lstStyle/>
           <a:p>
             <a:r>
-              <a:rPr lang="es-CL" u="sng" dirty="0">
+              <a:rPr lang="es-CL" u="sng">
                 <a:solidFill>
                   <a:schemeClr val="bg1"/>
                 </a:solidFill>
@@ -7731,7 +8016,7 @@
               <a:buChar char="•"/>
             </a:pPr>
             <a:r>
-              <a:rPr lang="es-CL" dirty="0">
+              <a:rPr lang="es-CL">
                 <a:solidFill>
                   <a:schemeClr val="bg1"/>
                 </a:solidFill>
@@ -7747,7 +8032,7 @@
               <a:buChar char="•"/>
             </a:pPr>
             <a:r>
-              <a:rPr lang="es-CL" dirty="0">
+              <a:rPr lang="es-CL">
                 <a:solidFill>
                   <a:schemeClr val="bg1"/>
                 </a:solidFill>
@@ -7763,7 +8048,7 @@
               <a:buChar char="•"/>
             </a:pPr>
             <a:r>
-              <a:rPr lang="es-CL" dirty="0">
+              <a:rPr lang="es-CL">
                 <a:solidFill>
                   <a:schemeClr val="bg1"/>
                 </a:solidFill>
@@ -7772,7 +8057,7 @@
               </a:rPr>
               <a:t>Gonzalo Vásquez.</a:t>
             </a:r>
-            <a:endParaRPr lang="es-MX" dirty="0">
+            <a:endParaRPr lang="es-MX">
               <a:solidFill>
                 <a:schemeClr val="bg1"/>
               </a:solidFill>
@@ -7874,7 +8159,7 @@
     </p:spTree>
     <p:extLst>
       <p:ext uri="{BB962C8B-B14F-4D97-AF65-F5344CB8AC3E}">
-        <p14:creationId xmlns:p14="http://schemas.microsoft.com/office/powerpoint/2010/main" val="3846956206"/>
+        <p14:creationId xmlns:p14="http://schemas.microsoft.com/office/powerpoint/2010/main" val="4018481977"/>
       </p:ext>
     </p:extLst>
   </p:cSld>
@@ -7963,7 +8248,7 @@
     </p:spTree>
     <p:extLst>
       <p:ext uri="{BB962C8B-B14F-4D97-AF65-F5344CB8AC3E}">
-        <p14:creationId xmlns:p14="http://schemas.microsoft.com/office/powerpoint/2010/main" val="1385646645"/>
+        <p14:creationId xmlns:p14="http://schemas.microsoft.com/office/powerpoint/2010/main" val="3846956206"/>
       </p:ext>
     </p:extLst>
   </p:cSld>
@@ -8052,7 +8337,7 @@
     </p:spTree>
     <p:extLst>
       <p:ext uri="{BB962C8B-B14F-4D97-AF65-F5344CB8AC3E}">
-        <p14:creationId xmlns:p14="http://schemas.microsoft.com/office/powerpoint/2010/main" val="2591914574"/>
+        <p14:creationId xmlns:p14="http://schemas.microsoft.com/office/powerpoint/2010/main" val="1385646645"/>
       </p:ext>
     </p:extLst>
   </p:cSld>
@@ -8141,7 +8426,7 @@
     </p:spTree>
     <p:extLst>
       <p:ext uri="{BB962C8B-B14F-4D97-AF65-F5344CB8AC3E}">
-        <p14:creationId xmlns:p14="http://schemas.microsoft.com/office/powerpoint/2010/main" val="3036640731"/>
+        <p14:creationId xmlns:p14="http://schemas.microsoft.com/office/powerpoint/2010/main" val="2591914574"/>
       </p:ext>
     </p:extLst>
   </p:cSld>
@@ -8230,6 +8515,95 @@
     </p:spTree>
     <p:extLst>
       <p:ext uri="{BB962C8B-B14F-4D97-AF65-F5344CB8AC3E}">
+        <p14:creationId xmlns:p14="http://schemas.microsoft.com/office/powerpoint/2010/main" val="3036640731"/>
+      </p:ext>
+    </p:extLst>
+  </p:cSld>
+  <p:clrMapOvr>
+    <a:masterClrMapping/>
+  </p:clrMapOvr>
+</p:sld>
+</file>
+
+<file path=ppt/slides/slide15.xml><?xml version="1.0" encoding="utf-8"?>
+<p:sld xmlns:a="http://schemas.openxmlformats.org/drawingml/2006/main" xmlns:r="http://schemas.openxmlformats.org/officeDocument/2006/relationships" xmlns:p="http://schemas.openxmlformats.org/presentationml/2006/main">
+  <p:cSld>
+    <p:spTree>
+      <p:nvGrpSpPr>
+        <p:cNvPr id="1" name=""/>
+        <p:cNvGrpSpPr/>
+        <p:nvPr/>
+      </p:nvGrpSpPr>
+      <p:grpSpPr>
+        <a:xfrm>
+          <a:off x="0" y="0"/>
+          <a:ext cx="0" cy="0"/>
+          <a:chOff x="0" y="0"/>
+          <a:chExt cx="0" cy="0"/>
+        </a:xfrm>
+      </p:grpSpPr>
+      <p:pic>
+        <p:nvPicPr>
+          <p:cNvPr id="7" name="Imagen 6"/>
+          <p:cNvPicPr>
+            <a:picLocks noChangeAspect="1"/>
+          </p:cNvPicPr>
+          <p:nvPr/>
+        </p:nvPicPr>
+        <p:blipFill rotWithShape="1">
+          <a:blip r:embed="rId3">
+            <a:extLst>
+              <a:ext uri="{28A0092B-C50C-407E-A947-70E740481C1C}">
+                <a14:useLocalDpi xmlns:a14="http://schemas.microsoft.com/office/drawing/2010/main" val="0"/>
+              </a:ext>
+            </a:extLst>
+          </a:blip>
+          <a:srcRect l="-153" t="20538" r="153" b="51651"/>
+          <a:stretch/>
+        </p:blipFill>
+        <p:spPr>
+          <a:xfrm>
+            <a:off x="-14013" y="1"/>
+            <a:ext cx="9172026" cy="802886"/>
+          </a:xfrm>
+          <a:prstGeom prst="rect">
+            <a:avLst/>
+          </a:prstGeom>
+        </p:spPr>
+      </p:pic>
+      <p:pic>
+        <p:nvPicPr>
+          <p:cNvPr id="2" name="Imagen 1"/>
+          <p:cNvPicPr>
+            <a:picLocks noChangeAspect="1"/>
+          </p:cNvPicPr>
+          <p:nvPr/>
+        </p:nvPicPr>
+        <p:blipFill>
+          <a:blip r:embed="rId4">
+            <a:extLst>
+              <a:ext uri="{28A0092B-C50C-407E-A947-70E740481C1C}">
+                <a14:useLocalDpi xmlns:a14="http://schemas.microsoft.com/office/drawing/2010/main" val="0"/>
+              </a:ext>
+            </a:extLst>
+          </a:blip>
+          <a:stretch>
+            <a:fillRect/>
+          </a:stretch>
+        </p:blipFill>
+        <p:spPr>
+          <a:xfrm>
+            <a:off x="8316024" y="89553"/>
+            <a:ext cx="719254" cy="600029"/>
+          </a:xfrm>
+          <a:prstGeom prst="rect">
+            <a:avLst/>
+          </a:prstGeom>
+        </p:spPr>
+      </p:pic>
+    </p:spTree>
+    <p:extLst>
+      <p:ext uri="{BB962C8B-B14F-4D97-AF65-F5344CB8AC3E}">
         <p14:creationId xmlns:p14="http://schemas.microsoft.com/office/powerpoint/2010/main" val="1086978629"/>
       </p:ext>
     </p:extLst>
@@ -8240,7 +8614,7 @@
 </p:sld>
 </file>
 
-<file path=ppt/slides/slide15.xml><?xml version="1.0" encoding="utf-8"?>
+<file path=ppt/slides/slide16.xml><?xml version="1.0" encoding="utf-8"?>
 <p:sld xmlns:a="http://schemas.openxmlformats.org/drawingml/2006/main" xmlns:r="http://schemas.openxmlformats.org/officeDocument/2006/relationships" xmlns:p="http://schemas.openxmlformats.org/presentationml/2006/main">
   <p:cSld>
     <p:spTree>
@@ -8332,6 +8706,228 @@
 <file path=ppt/slides/slide2.xml><?xml version="1.0" encoding="utf-8"?>
 <p:sld xmlns:a="http://schemas.openxmlformats.org/drawingml/2006/main" xmlns:r="http://schemas.openxmlformats.org/officeDocument/2006/relationships" xmlns:p="http://schemas.openxmlformats.org/presentationml/2006/main">
   <p:cSld>
+    <p:spTree>
+      <p:nvGrpSpPr>
+        <p:cNvPr id="1" name=""/>
+        <p:cNvGrpSpPr/>
+        <p:nvPr/>
+      </p:nvGrpSpPr>
+      <p:grpSpPr>
+        <a:xfrm>
+          <a:off x="0" y="0"/>
+          <a:ext cx="0" cy="0"/>
+          <a:chOff x="0" y="0"/>
+          <a:chExt cx="0" cy="0"/>
+        </a:xfrm>
+      </p:grpSpPr>
+      <p:pic>
+        <p:nvPicPr>
+          <p:cNvPr id="7" name="Imagen 6"/>
+          <p:cNvPicPr>
+            <a:picLocks noChangeAspect="1"/>
+          </p:cNvPicPr>
+          <p:nvPr/>
+        </p:nvPicPr>
+        <p:blipFill rotWithShape="1">
+          <a:blip r:embed="rId3">
+            <a:extLst>
+              <a:ext uri="{28A0092B-C50C-407E-A947-70E740481C1C}">
+                <a14:useLocalDpi xmlns:a14="http://schemas.microsoft.com/office/drawing/2010/main" val="0"/>
+              </a:ext>
+            </a:extLst>
+          </a:blip>
+          <a:srcRect l="-153" t="20538" r="153" b="51651"/>
+          <a:stretch/>
+        </p:blipFill>
+        <p:spPr>
+          <a:xfrm>
+            <a:off x="-14013" y="1"/>
+            <a:ext cx="9172026" cy="802886"/>
+          </a:xfrm>
+          <a:prstGeom prst="rect">
+            <a:avLst/>
+          </a:prstGeom>
+        </p:spPr>
+      </p:pic>
+      <p:pic>
+        <p:nvPicPr>
+          <p:cNvPr id="2" name="Imagen 1"/>
+          <p:cNvPicPr>
+            <a:picLocks noChangeAspect="1"/>
+          </p:cNvPicPr>
+          <p:nvPr/>
+        </p:nvPicPr>
+        <p:blipFill>
+          <a:blip r:embed="rId4">
+            <a:extLst>
+              <a:ext uri="{28A0092B-C50C-407E-A947-70E740481C1C}">
+                <a14:useLocalDpi xmlns:a14="http://schemas.microsoft.com/office/drawing/2010/main" val="0"/>
+              </a:ext>
+            </a:extLst>
+          </a:blip>
+          <a:stretch>
+            <a:fillRect/>
+          </a:stretch>
+        </p:blipFill>
+        <p:spPr>
+          <a:xfrm>
+            <a:off x="8316024" y="89553"/>
+            <a:ext cx="719254" cy="600029"/>
+          </a:xfrm>
+          <a:prstGeom prst="rect">
+            <a:avLst/>
+          </a:prstGeom>
+        </p:spPr>
+      </p:pic>
+      <p:sp>
+        <p:nvSpPr>
+          <p:cNvPr id="3" name="TextBox 2">
+            <a:extLst>
+              <a:ext uri="{FF2B5EF4-FFF2-40B4-BE49-F238E27FC236}">
+                <a16:creationId xmlns:a16="http://schemas.microsoft.com/office/drawing/2014/main" id="{23480A74-8042-3918-FB57-0ABA427747B4}"/>
+              </a:ext>
+            </a:extLst>
+          </p:cNvPr>
+          <p:cNvSpPr txBox="1"/>
+          <p:nvPr/>
+        </p:nvSpPr>
+        <p:spPr>
+          <a:xfrm>
+            <a:off x="398006" y="1112667"/>
+            <a:ext cx="8341672" cy="2677656"/>
+          </a:xfrm>
+          <a:prstGeom prst="rect">
+            <a:avLst/>
+          </a:prstGeom>
+          <a:noFill/>
+        </p:spPr>
+        <p:txBody>
+          <a:bodyPr rot="0" spcFirstLastPara="0" vertOverflow="overflow" horzOverflow="overflow" vert="horz" wrap="square" lIns="91440" tIns="45720" rIns="91440" bIns="45720" numCol="1" spcCol="0" rtlCol="0" fromWordArt="0" anchor="t" anchorCtr="0" forceAA="0" compatLnSpc="1">
+            <a:prstTxWarp prst="textNoShape">
+              <a:avLst/>
+            </a:prstTxWarp>
+            <a:spAutoFit/>
+          </a:bodyPr>
+          <a:lstStyle/>
+          <a:p>
+            <a:r>
+              <a:rPr lang="es-CL" sz="2400">
+                <a:solidFill>
+                  <a:srgbClr val="19202E"/>
+                </a:solidFill>
+                <a:latin typeface="Segoe UI"/>
+                <a:ea typeface="Calibri"/>
+                <a:cs typeface="Segoe UI"/>
+              </a:rPr>
+              <a:t>Se identificaron y clasificamos las </a:t>
+            </a:r>
+            <a:r>
+              <a:rPr lang="es-CL" sz="2400" err="1">
+                <a:solidFill>
+                  <a:srgbClr val="19202E"/>
+                </a:solidFill>
+                <a:latin typeface="Segoe UI"/>
+                <a:ea typeface="Calibri"/>
+                <a:cs typeface="Segoe UI"/>
+              </a:rPr>
+              <a:t>caracteristics</a:t>
+            </a:r>
+            <a:r>
+              <a:rPr lang="es-CL" sz="2400">
+                <a:solidFill>
+                  <a:srgbClr val="19202E"/>
+                </a:solidFill>
+                <a:latin typeface="Segoe UI"/>
+                <a:ea typeface="Calibri"/>
+                <a:cs typeface="Segoe UI"/>
+              </a:rPr>
+              <a:t> y variables identificando sus grados de correlación, representamos el comportamiento de los datos </a:t>
+            </a:r>
+            <a:r>
+              <a:rPr lang="es-CL" sz="2400" err="1">
+                <a:solidFill>
+                  <a:srgbClr val="19202E"/>
+                </a:solidFill>
+                <a:latin typeface="Segoe UI"/>
+                <a:ea typeface="Calibri"/>
+                <a:cs typeface="Segoe UI"/>
+              </a:rPr>
+              <a:t>mediantes</a:t>
+            </a:r>
+            <a:r>
+              <a:rPr lang="es-CL" sz="2400">
+                <a:solidFill>
+                  <a:srgbClr val="19202E"/>
+                </a:solidFill>
+                <a:latin typeface="Segoe UI"/>
+                <a:ea typeface="Calibri"/>
+                <a:cs typeface="Segoe UI"/>
+              </a:rPr>
+              <a:t> </a:t>
+            </a:r>
+            <a:r>
+              <a:rPr lang="es-CL" sz="2400" err="1">
+                <a:solidFill>
+                  <a:srgbClr val="19202E"/>
+                </a:solidFill>
+                <a:latin typeface="Segoe UI"/>
+                <a:ea typeface="Calibri"/>
+                <a:cs typeface="Segoe UI"/>
+              </a:rPr>
+              <a:t>graficos</a:t>
+            </a:r>
+            <a:r>
+              <a:rPr lang="es-CL" sz="2400">
+                <a:solidFill>
+                  <a:srgbClr val="19202E"/>
+                </a:solidFill>
+                <a:latin typeface="Segoe UI"/>
+                <a:ea typeface="Calibri"/>
+                <a:cs typeface="Segoe UI"/>
+              </a:rPr>
+              <a:t>, donde se eliminan los datos iguales a cero en los ejes X,Y, Z  y considerando esta información identificamos que para crear nuestro modelo de </a:t>
+            </a:r>
+            <a:r>
+              <a:rPr lang="es-CL" sz="2400" err="1">
+                <a:solidFill>
+                  <a:srgbClr val="19202E"/>
+                </a:solidFill>
+                <a:latin typeface="Segoe UI"/>
+                <a:ea typeface="Calibri"/>
+                <a:cs typeface="Segoe UI"/>
+              </a:rPr>
+              <a:t>prediccion</a:t>
+            </a:r>
+            <a:r>
+              <a:rPr lang="es-CL" sz="2400">
+                <a:solidFill>
+                  <a:srgbClr val="19202E"/>
+                </a:solidFill>
+                <a:latin typeface="Segoe UI"/>
+                <a:ea typeface="Calibri"/>
+                <a:cs typeface="Segoe UI"/>
+              </a:rPr>
+              <a:t> vamos a trabajar con nuestra variable dependiente que es el precio </a:t>
+            </a:r>
+          </a:p>
+        </p:txBody>
+      </p:sp>
+    </p:spTree>
+    <p:extLst>
+      <p:ext uri="{BB962C8B-B14F-4D97-AF65-F5344CB8AC3E}">
+        <p14:creationId xmlns:p14="http://schemas.microsoft.com/office/powerpoint/2010/main" val="743564996"/>
+      </p:ext>
+    </p:extLst>
+  </p:cSld>
+  <p:clrMapOvr>
+    <a:masterClrMapping/>
+  </p:clrMapOvr>
+</p:sld>
+</file>
+
+<file path=ppt/slides/slide3.xml><?xml version="1.0" encoding="utf-8"?>
+<p:sld xmlns:a="http://schemas.openxmlformats.org/drawingml/2006/main" xmlns:r="http://schemas.openxmlformats.org/officeDocument/2006/relationships" xmlns:p="http://schemas.openxmlformats.org/presentationml/2006/main">
+  <p:cSld>
     <p:bg>
       <p:bgPr>
         <a:solidFill>
@@ -8402,7 +8998,7 @@
           <a:lstStyle/>
           <a:p>
             <a:pPr algn="ctr"/>
-            <a:endParaRPr lang="es-CL" dirty="0"/>
+            <a:endParaRPr lang="es-CL"/>
           </a:p>
         </p:txBody>
       </p:sp>
@@ -8430,7 +9026,7 @@
           </a:prstGeom>
         </p:spPr>
         <p:txBody>
-          <a:bodyPr vert="horz" lIns="91440" tIns="45720" rIns="91440" bIns="45720" rtlCol="0">
+          <a:bodyPr vert="horz" lIns="91440" tIns="45720" rIns="91440" bIns="45720" rtlCol="0" anchor="t">
             <a:normAutofit/>
           </a:bodyPr>
           <a:lstStyle>
@@ -8600,11 +9196,11 @@
           <a:p>
             <a:pPr algn="just"/>
             <a:r>
-              <a:rPr lang="es-CL" sz="1600" dirty="0">
+              <a:rPr lang="es-CL" sz="1600">
                 <a:solidFill>
                   <a:schemeClr val="bg1"/>
                 </a:solidFill>
-                <a:latin typeface="Arial Narrow" panose="020B0606020202030204" pitchFamily="34" charset="0"/>
+                <a:latin typeface="Arial Narrow"/>
               </a:rPr>
               <a:t>Diamantes:</a:t>
             </a:r>
@@ -8612,14 +9208,35 @@
           <a:p>
             <a:pPr algn="just"/>
             <a:r>
-              <a:rPr lang="es-CL" sz="1600" dirty="0">
+              <a:rPr lang="es-CL" sz="1600">
                 <a:solidFill>
                   <a:schemeClr val="bg1"/>
                 </a:solidFill>
-                <a:latin typeface="Arial Narrow" panose="020B0606020202030204" pitchFamily="34" charset="0"/>
+                <a:latin typeface="Arial Narrow"/>
               </a:rPr>
-              <a:t>Contiene un total de 53940 datos, 10 variables (3 cualitativas y 7 cuantitativas) </a:t>
-            </a:r>
+              <a:t>Contiene un total de 53.940 datos, 10 variables (3 cualitativas y 7 cuantitativas) </a:t>
+            </a:r>
+          </a:p>
+          <a:p>
+            <a:pPr algn="just"/>
+            <a:r>
+              <a:rPr lang="es-CL" sz="1600">
+                <a:solidFill>
+                  <a:schemeClr val="bg1"/>
+                </a:solidFill>
+                <a:latin typeface="Arial Narrow"/>
+              </a:rPr>
+              <a:t>Precio variable dependiente</a:t>
+            </a:r>
+          </a:p>
+          <a:p>
+            <a:pPr algn="just"/>
+            <a:endParaRPr lang="es-CL" sz="1600">
+              <a:solidFill>
+                <a:schemeClr val="bg1"/>
+              </a:solidFill>
+              <a:latin typeface="Arial Narrow" panose="020B0606020202030204" pitchFamily="34" charset="0"/>
+            </a:endParaRPr>
           </a:p>
         </p:txBody>
       </p:sp>
@@ -8820,7 +9437,7 @@
               <a:buNone/>
             </a:pPr>
             <a:r>
-              <a:rPr lang="es-CL" sz="1600" dirty="0">
+              <a:rPr lang="es-CL" sz="1600">
                 <a:solidFill>
                   <a:schemeClr val="bg1"/>
                 </a:solidFill>
@@ -8855,7 +9472,7 @@
           </a:prstGeom>
         </p:spPr>
         <p:txBody>
-          <a:bodyPr vert="horz" lIns="91440" tIns="45720" rIns="91440" bIns="45720" rtlCol="0">
+          <a:bodyPr vert="horz" lIns="91440" tIns="45720" rIns="91440" bIns="45720" rtlCol="0" anchor="t">
             <a:noAutofit/>
           </a:bodyPr>
           <a:lstStyle>
@@ -9024,420 +9641,161 @@
           </a:lstStyle>
           <a:p>
             <a:pPr marL="0" indent="0" algn="just">
-              <a:buFont typeface="Arial" panose="020B0604020202020204" pitchFamily="34" charset="0"/>
               <a:buNone/>
             </a:pPr>
             <a:r>
-              <a:rPr lang="es-MX" sz="1600" b="0" i="0" dirty="0" err="1">
+              <a:rPr lang="es-MX" sz="1600" err="1">
                 <a:solidFill>
                   <a:schemeClr val="bg1"/>
                 </a:solidFill>
-                <a:effectLst/>
-                <a:latin typeface="Arial Narrow" panose="020B0606020202030204" pitchFamily="34" charset="0"/>
+                <a:latin typeface="Arial Narrow"/>
               </a:rPr>
-              <a:t>Lorem</a:t>
-            </a:r>
-            <a:r>
-              <a:rPr lang="es-MX" sz="1600" b="0" i="0" dirty="0">
+              <a:t>Definicion</a:t>
+            </a:r>
+            <a:r>
+              <a:rPr lang="es-MX" sz="1600">
                 <a:solidFill>
                   <a:schemeClr val="bg1"/>
                 </a:solidFill>
-                <a:effectLst/>
-                <a:latin typeface="Arial Narrow" panose="020B0606020202030204" pitchFamily="34" charset="0"/>
+                <a:latin typeface="Arial Narrow"/>
+              </a:rPr>
+              <a:t> del modelo de </a:t>
+            </a:r>
+            <a:r>
+              <a:rPr lang="es-MX" sz="1600" err="1">
+                <a:solidFill>
+                  <a:schemeClr val="bg1"/>
+                </a:solidFill>
+                <a:latin typeface="Arial Narrow"/>
+              </a:rPr>
+              <a:t>Regresion</a:t>
+            </a:r>
+            <a:r>
+              <a:rPr lang="es-MX" sz="1600">
+                <a:solidFill>
+                  <a:schemeClr val="bg1"/>
+                </a:solidFill>
+                <a:latin typeface="Arial Narrow"/>
+              </a:rPr>
+              <a:t> Lineal</a:t>
+            </a:r>
+          </a:p>
+          <a:p>
+            <a:pPr marL="0" indent="0" algn="just">
+              <a:buNone/>
+            </a:pPr>
+            <a:r>
+              <a:rPr lang="es-MX" sz="1600" err="1">
+                <a:solidFill>
+                  <a:schemeClr val="bg1"/>
+                </a:solidFill>
+                <a:latin typeface="Arial Narrow"/>
+              </a:rPr>
+              <a:t>Normalizacion</a:t>
+            </a:r>
+            <a:r>
+              <a:rPr lang="es-MX" sz="1600">
+                <a:solidFill>
+                  <a:schemeClr val="bg1"/>
+                </a:solidFill>
+                <a:latin typeface="Arial Narrow"/>
+              </a:rPr>
+              <a:t> de los Datos</a:t>
+            </a:r>
+          </a:p>
+          <a:p>
+            <a:pPr marL="0" indent="0" algn="just">
+              <a:buNone/>
+            </a:pPr>
+            <a:r>
+              <a:rPr lang="es-MX" sz="1600" err="1">
+                <a:solidFill>
+                  <a:schemeClr val="bg1"/>
+                </a:solidFill>
+                <a:latin typeface="Arial Narrow"/>
+              </a:rPr>
+              <a:t>Aplicacion</a:t>
+            </a:r>
+            <a:r>
+              <a:rPr lang="es-MX" sz="1600">
+                <a:solidFill>
+                  <a:schemeClr val="bg1"/>
+                </a:solidFill>
+                <a:latin typeface="Arial Narrow"/>
               </a:rPr>
               <a:t> </a:t>
             </a:r>
             <a:r>
-              <a:rPr lang="es-MX" sz="1600" b="0" i="0" dirty="0" err="1">
+              <a:rPr lang="es-MX" sz="1600" err="1">
                 <a:solidFill>
                   <a:schemeClr val="bg1"/>
                 </a:solidFill>
-                <a:effectLst/>
-                <a:latin typeface="Arial Narrow" panose="020B0606020202030204" pitchFamily="34" charset="0"/>
+                <a:latin typeface="Arial Narrow"/>
               </a:rPr>
-              <a:t>ipsum</a:t>
-            </a:r>
-            <a:r>
-              <a:rPr lang="es-MX" sz="1600" b="0" i="0" dirty="0">
+              <a:t>dle</a:t>
+            </a:r>
+            <a:r>
+              <a:rPr lang="es-MX" sz="1600">
                 <a:solidFill>
                   <a:schemeClr val="bg1"/>
                 </a:solidFill>
-                <a:effectLst/>
-                <a:latin typeface="Arial Narrow" panose="020B0606020202030204" pitchFamily="34" charset="0"/>
+                <a:latin typeface="Arial Narrow"/>
               </a:rPr>
-              <a:t> dolor </a:t>
-            </a:r>
-            <a:r>
-              <a:rPr lang="es-MX" sz="1600" b="0" i="0" dirty="0" err="1">
+              <a:t> Modelo de </a:t>
+            </a:r>
+            <a:r>
+              <a:rPr lang="es-MX" sz="1600" err="1">
                 <a:solidFill>
                   <a:schemeClr val="bg1"/>
                 </a:solidFill>
-                <a:effectLst/>
-                <a:latin typeface="Arial Narrow" panose="020B0606020202030204" pitchFamily="34" charset="0"/>
+                <a:latin typeface="Arial Narrow"/>
               </a:rPr>
-              <a:t>sit</a:t>
-            </a:r>
-            <a:r>
-              <a:rPr lang="es-MX" sz="1600" b="0" i="0" dirty="0">
+              <a:t>Arbol</a:t>
+            </a:r>
+            <a:r>
+              <a:rPr lang="es-MX" sz="1600">
                 <a:solidFill>
                   <a:schemeClr val="bg1"/>
                 </a:solidFill>
-                <a:effectLst/>
-                <a:latin typeface="Arial Narrow" panose="020B0606020202030204" pitchFamily="34" charset="0"/>
+                <a:latin typeface="Arial Narrow"/>
               </a:rPr>
-              <a:t> </a:t>
-            </a:r>
-            <a:r>
-              <a:rPr lang="es-MX" sz="1600" b="0" i="0" dirty="0" err="1">
+              <a:t> de  </a:t>
+            </a:r>
+            <a:r>
+              <a:rPr lang="es-MX" sz="1600" err="1">
                 <a:solidFill>
                   <a:schemeClr val="bg1"/>
                 </a:solidFill>
-                <a:effectLst/>
-                <a:latin typeface="Arial Narrow" panose="020B0606020202030204" pitchFamily="34" charset="0"/>
+                <a:latin typeface="Arial Narrow"/>
               </a:rPr>
-              <a:t>amet</a:t>
-            </a:r>
-            <a:r>
-              <a:rPr lang="es-MX" sz="1600" b="0" i="0" dirty="0">
+              <a:t>decision</a:t>
+            </a:r>
+          </a:p>
+          <a:p>
+            <a:pPr marL="0" indent="0" algn="just">
+              <a:buNone/>
+            </a:pPr>
+            <a:endParaRPr lang="es-MX" sz="1600">
+              <a:solidFill>
+                <a:schemeClr val="bg1"/>
+              </a:solidFill>
+              <a:latin typeface="Arial Narrow" panose="020B0606020202030204" pitchFamily="34" charset="0"/>
+            </a:endParaRPr>
+          </a:p>
+          <a:p>
+            <a:pPr marL="0" indent="0" algn="just">
+              <a:buNone/>
+            </a:pPr>
+            <a:r>
+              <a:rPr lang="es-MX" sz="1600">
                 <a:solidFill>
                   <a:schemeClr val="bg1"/>
                 </a:solidFill>
-                <a:effectLst/>
-                <a:latin typeface="Arial Narrow" panose="020B0606020202030204" pitchFamily="34" charset="0"/>
+                <a:latin typeface="Arial Narrow"/>
               </a:rPr>
-              <a:t>, </a:t>
-            </a:r>
-            <a:r>
-              <a:rPr lang="es-MX" sz="1600" b="0" i="0" dirty="0" err="1">
-                <a:solidFill>
-                  <a:schemeClr val="bg1"/>
-                </a:solidFill>
-                <a:effectLst/>
-                <a:latin typeface="Arial Narrow" panose="020B0606020202030204" pitchFamily="34" charset="0"/>
-              </a:rPr>
-              <a:t>consectetur</a:t>
-            </a:r>
-            <a:r>
-              <a:rPr lang="es-MX" sz="1600" b="0" i="0" dirty="0">
-                <a:solidFill>
-                  <a:schemeClr val="bg1"/>
-                </a:solidFill>
-                <a:effectLst/>
-                <a:latin typeface="Arial Narrow" panose="020B0606020202030204" pitchFamily="34" charset="0"/>
-              </a:rPr>
-              <a:t> </a:t>
-            </a:r>
-            <a:r>
-              <a:rPr lang="es-MX" sz="1600" b="0" i="0" dirty="0" err="1">
-                <a:solidFill>
-                  <a:schemeClr val="bg1"/>
-                </a:solidFill>
-                <a:effectLst/>
-                <a:latin typeface="Arial Narrow" panose="020B0606020202030204" pitchFamily="34" charset="0"/>
-              </a:rPr>
-              <a:t>adipiscing</a:t>
-            </a:r>
-            <a:r>
-              <a:rPr lang="es-MX" sz="1600" b="0" i="0" dirty="0">
-                <a:solidFill>
-                  <a:schemeClr val="bg1"/>
-                </a:solidFill>
-                <a:effectLst/>
-                <a:latin typeface="Arial Narrow" panose="020B0606020202030204" pitchFamily="34" charset="0"/>
-              </a:rPr>
-              <a:t> </a:t>
-            </a:r>
-            <a:r>
-              <a:rPr lang="es-MX" sz="1600" b="0" i="0" dirty="0" err="1">
-                <a:solidFill>
-                  <a:schemeClr val="bg1"/>
-                </a:solidFill>
-                <a:effectLst/>
-                <a:latin typeface="Arial Narrow" panose="020B0606020202030204" pitchFamily="34" charset="0"/>
-              </a:rPr>
-              <a:t>elit</a:t>
-            </a:r>
-            <a:r>
-              <a:rPr lang="es-MX" sz="1600" b="0" i="0" dirty="0">
-                <a:solidFill>
-                  <a:schemeClr val="bg1"/>
-                </a:solidFill>
-                <a:effectLst/>
-                <a:latin typeface="Arial Narrow" panose="020B0606020202030204" pitchFamily="34" charset="0"/>
-              </a:rPr>
-              <a:t>, sed do </a:t>
-            </a:r>
-            <a:r>
-              <a:rPr lang="es-MX" sz="1600" b="0" i="0" dirty="0" err="1">
-                <a:solidFill>
-                  <a:schemeClr val="bg1"/>
-                </a:solidFill>
-                <a:effectLst/>
-                <a:latin typeface="Arial Narrow" panose="020B0606020202030204" pitchFamily="34" charset="0"/>
-              </a:rPr>
-              <a:t>eiusmod</a:t>
-            </a:r>
-            <a:r>
-              <a:rPr lang="es-MX" sz="1600" b="0" i="0" dirty="0">
-                <a:solidFill>
-                  <a:schemeClr val="bg1"/>
-                </a:solidFill>
-                <a:effectLst/>
-                <a:latin typeface="Arial Narrow" panose="020B0606020202030204" pitchFamily="34" charset="0"/>
-              </a:rPr>
-              <a:t> </a:t>
-            </a:r>
-            <a:r>
-              <a:rPr lang="es-MX" sz="1600" b="0" i="0" dirty="0" err="1">
-                <a:solidFill>
-                  <a:schemeClr val="bg1"/>
-                </a:solidFill>
-                <a:effectLst/>
-                <a:latin typeface="Arial Narrow" panose="020B0606020202030204" pitchFamily="34" charset="0"/>
-              </a:rPr>
-              <a:t>tempor</a:t>
-            </a:r>
-            <a:r>
-              <a:rPr lang="es-MX" sz="1600" b="0" i="0" dirty="0">
-                <a:solidFill>
-                  <a:schemeClr val="bg1"/>
-                </a:solidFill>
-                <a:effectLst/>
-                <a:latin typeface="Arial Narrow" panose="020B0606020202030204" pitchFamily="34" charset="0"/>
-              </a:rPr>
-              <a:t> </a:t>
-            </a:r>
-            <a:r>
-              <a:rPr lang="es-MX" sz="1600" b="0" i="0" dirty="0" err="1">
-                <a:solidFill>
-                  <a:schemeClr val="bg1"/>
-                </a:solidFill>
-                <a:effectLst/>
-                <a:latin typeface="Arial Narrow" panose="020B0606020202030204" pitchFamily="34" charset="0"/>
-              </a:rPr>
-              <a:t>incididunt</a:t>
-            </a:r>
-            <a:r>
-              <a:rPr lang="es-MX" sz="1600" b="0" i="0" dirty="0">
-                <a:solidFill>
-                  <a:schemeClr val="bg1"/>
-                </a:solidFill>
-                <a:effectLst/>
-                <a:latin typeface="Arial Narrow" panose="020B0606020202030204" pitchFamily="34" charset="0"/>
-              </a:rPr>
-              <a:t> ut labore et </a:t>
-            </a:r>
-            <a:r>
-              <a:rPr lang="es-MX" sz="1600" b="0" i="0" dirty="0" err="1">
-                <a:solidFill>
-                  <a:schemeClr val="bg1"/>
-                </a:solidFill>
-                <a:effectLst/>
-                <a:latin typeface="Arial Narrow" panose="020B0606020202030204" pitchFamily="34" charset="0"/>
-              </a:rPr>
-              <a:t>dolore</a:t>
-            </a:r>
-            <a:r>
-              <a:rPr lang="es-MX" sz="1600" b="0" i="0" dirty="0">
-                <a:solidFill>
-                  <a:schemeClr val="bg1"/>
-                </a:solidFill>
-                <a:effectLst/>
-                <a:latin typeface="Arial Narrow" panose="020B0606020202030204" pitchFamily="34" charset="0"/>
-              </a:rPr>
-              <a:t> magna </a:t>
-            </a:r>
-            <a:r>
-              <a:rPr lang="es-MX" sz="1600" b="0" i="0" dirty="0" err="1">
-                <a:solidFill>
-                  <a:schemeClr val="bg1"/>
-                </a:solidFill>
-                <a:effectLst/>
-                <a:latin typeface="Arial Narrow" panose="020B0606020202030204" pitchFamily="34" charset="0"/>
-              </a:rPr>
-              <a:t>aliqua</a:t>
-            </a:r>
-            <a:r>
-              <a:rPr lang="es-MX" sz="1600" b="0" i="0" dirty="0">
-                <a:solidFill>
-                  <a:schemeClr val="bg1"/>
-                </a:solidFill>
-                <a:effectLst/>
-                <a:latin typeface="Arial Narrow" panose="020B0606020202030204" pitchFamily="34" charset="0"/>
-              </a:rPr>
-              <a:t>. Ut </a:t>
-            </a:r>
-            <a:r>
-              <a:rPr lang="es-MX" sz="1600" b="0" i="0" dirty="0" err="1">
-                <a:solidFill>
-                  <a:schemeClr val="bg1"/>
-                </a:solidFill>
-                <a:effectLst/>
-                <a:latin typeface="Arial Narrow" panose="020B0606020202030204" pitchFamily="34" charset="0"/>
-              </a:rPr>
-              <a:t>enim</a:t>
-            </a:r>
-            <a:r>
-              <a:rPr lang="es-MX" sz="1600" b="0" i="0" dirty="0">
-                <a:solidFill>
-                  <a:schemeClr val="bg1"/>
-                </a:solidFill>
-                <a:effectLst/>
-                <a:latin typeface="Arial Narrow" panose="020B0606020202030204" pitchFamily="34" charset="0"/>
-              </a:rPr>
-              <a:t> ad </a:t>
-            </a:r>
-            <a:r>
-              <a:rPr lang="es-MX" sz="1600" b="0" i="0" dirty="0" err="1">
-                <a:solidFill>
-                  <a:schemeClr val="bg1"/>
-                </a:solidFill>
-                <a:effectLst/>
-                <a:latin typeface="Arial Narrow" panose="020B0606020202030204" pitchFamily="34" charset="0"/>
-              </a:rPr>
-              <a:t>minim</a:t>
-            </a:r>
-            <a:r>
-              <a:rPr lang="es-MX" sz="1600" b="0" i="0" dirty="0">
-                <a:solidFill>
-                  <a:schemeClr val="bg1"/>
-                </a:solidFill>
-                <a:effectLst/>
-                <a:latin typeface="Arial Narrow" panose="020B0606020202030204" pitchFamily="34" charset="0"/>
-              </a:rPr>
-              <a:t> </a:t>
-            </a:r>
-            <a:r>
-              <a:rPr lang="es-MX" sz="1600" b="0" i="0" dirty="0" err="1">
-                <a:solidFill>
-                  <a:schemeClr val="bg1"/>
-                </a:solidFill>
-                <a:effectLst/>
-                <a:latin typeface="Arial Narrow" panose="020B0606020202030204" pitchFamily="34" charset="0"/>
-              </a:rPr>
-              <a:t>veniam</a:t>
-            </a:r>
-            <a:r>
-              <a:rPr lang="es-MX" sz="1600" b="0" i="0" dirty="0">
-                <a:solidFill>
-                  <a:schemeClr val="bg1"/>
-                </a:solidFill>
-                <a:effectLst/>
-                <a:latin typeface="Arial Narrow" panose="020B0606020202030204" pitchFamily="34" charset="0"/>
-              </a:rPr>
-              <a:t>, quis </a:t>
-            </a:r>
-            <a:r>
-              <a:rPr lang="es-MX" sz="1600" b="0" i="0" dirty="0" err="1">
-                <a:solidFill>
-                  <a:schemeClr val="bg1"/>
-                </a:solidFill>
-                <a:effectLst/>
-                <a:latin typeface="Arial Narrow" panose="020B0606020202030204" pitchFamily="34" charset="0"/>
-              </a:rPr>
-              <a:t>nostrud</a:t>
-            </a:r>
-            <a:r>
-              <a:rPr lang="es-MX" sz="1600" b="0" i="0" dirty="0">
-                <a:solidFill>
-                  <a:schemeClr val="bg1"/>
-                </a:solidFill>
-                <a:effectLst/>
-                <a:latin typeface="Arial Narrow" panose="020B0606020202030204" pitchFamily="34" charset="0"/>
-              </a:rPr>
-              <a:t> </a:t>
-            </a:r>
-            <a:r>
-              <a:rPr lang="es-MX" sz="1600" b="0" i="0" dirty="0" err="1">
-                <a:solidFill>
-                  <a:schemeClr val="bg1"/>
-                </a:solidFill>
-                <a:effectLst/>
-                <a:latin typeface="Arial Narrow" panose="020B0606020202030204" pitchFamily="34" charset="0"/>
-              </a:rPr>
-              <a:t>exercitation</a:t>
-            </a:r>
-            <a:r>
-              <a:rPr lang="es-MX" sz="1600" b="0" i="0" dirty="0">
-                <a:solidFill>
-                  <a:schemeClr val="bg1"/>
-                </a:solidFill>
-                <a:effectLst/>
-                <a:latin typeface="Arial Narrow" panose="020B0606020202030204" pitchFamily="34" charset="0"/>
-              </a:rPr>
-              <a:t> </a:t>
-            </a:r>
-            <a:r>
-              <a:rPr lang="es-MX" sz="1600" b="0" i="0" dirty="0" err="1">
-                <a:solidFill>
-                  <a:schemeClr val="bg1"/>
-                </a:solidFill>
-                <a:effectLst/>
-                <a:latin typeface="Arial Narrow" panose="020B0606020202030204" pitchFamily="34" charset="0"/>
-              </a:rPr>
-              <a:t>ullamco</a:t>
-            </a:r>
-            <a:r>
-              <a:rPr lang="es-MX" sz="1600" b="0" i="0" dirty="0">
-                <a:solidFill>
-                  <a:schemeClr val="bg1"/>
-                </a:solidFill>
-                <a:effectLst/>
-                <a:latin typeface="Arial Narrow" panose="020B0606020202030204" pitchFamily="34" charset="0"/>
-              </a:rPr>
-              <a:t> </a:t>
-            </a:r>
-            <a:r>
-              <a:rPr lang="es-MX" sz="1600" b="0" i="0" dirty="0" err="1">
-                <a:solidFill>
-                  <a:schemeClr val="bg1"/>
-                </a:solidFill>
-                <a:effectLst/>
-                <a:latin typeface="Arial Narrow" panose="020B0606020202030204" pitchFamily="34" charset="0"/>
-              </a:rPr>
-              <a:t>laboris</a:t>
-            </a:r>
-            <a:r>
-              <a:rPr lang="es-MX" sz="1600" b="0" i="0" dirty="0">
-                <a:solidFill>
-                  <a:schemeClr val="bg1"/>
-                </a:solidFill>
-                <a:effectLst/>
-                <a:latin typeface="Arial Narrow" panose="020B0606020202030204" pitchFamily="34" charset="0"/>
-              </a:rPr>
-              <a:t> </a:t>
-            </a:r>
-            <a:r>
-              <a:rPr lang="es-MX" sz="1600" b="0" i="0" dirty="0" err="1">
-                <a:solidFill>
-                  <a:schemeClr val="bg1"/>
-                </a:solidFill>
-                <a:effectLst/>
-                <a:latin typeface="Arial Narrow" panose="020B0606020202030204" pitchFamily="34" charset="0"/>
-              </a:rPr>
-              <a:t>nisi</a:t>
-            </a:r>
-            <a:r>
-              <a:rPr lang="es-MX" sz="1600" b="0" i="0" dirty="0">
-                <a:solidFill>
-                  <a:schemeClr val="bg1"/>
-                </a:solidFill>
-                <a:effectLst/>
-                <a:latin typeface="Arial Narrow" panose="020B0606020202030204" pitchFamily="34" charset="0"/>
-              </a:rPr>
-              <a:t> ut </a:t>
-            </a:r>
-            <a:r>
-              <a:rPr lang="es-MX" sz="1600" b="0" i="0" dirty="0" err="1">
-                <a:solidFill>
-                  <a:schemeClr val="bg1"/>
-                </a:solidFill>
-                <a:effectLst/>
-                <a:latin typeface="Arial Narrow" panose="020B0606020202030204" pitchFamily="34" charset="0"/>
-              </a:rPr>
-              <a:t>aliquip</a:t>
-            </a:r>
-            <a:endParaRPr lang="en-US" sz="1600" dirty="0">
+              <a:t>Aplicación de Redes neuronales</a:t>
+            </a:r>
+            <a:endParaRPr lang="es-MX" sz="1600">
               <a:solidFill>
                 <a:schemeClr val="bg1"/>
               </a:solidFill>
@@ -9519,7 +9877,7 @@
           <a:p>
             <a:pPr algn="ctr"/>
             <a:r>
-              <a:rPr lang="es-ES" b="1" dirty="0">
+              <a:rPr lang="es-ES" b="1">
                 <a:solidFill>
                   <a:schemeClr val="bg1"/>
                 </a:solidFill>
@@ -9554,22 +9912,29 @@
           <a:noFill/>
         </p:spPr>
         <p:txBody>
-          <a:bodyPr wrap="square">
+          <a:bodyPr wrap="square" lIns="91440" tIns="45720" rIns="91440" bIns="45720" anchor="t">
             <a:spAutoFit/>
           </a:bodyPr>
           <a:lstStyle/>
           <a:p>
             <a:pPr algn="ctr"/>
             <a:r>
-              <a:rPr lang="es-ES" b="1" dirty="0">
+              <a:rPr lang="es-ES" b="1">
                 <a:solidFill>
                   <a:schemeClr val="bg1"/>
                 </a:solidFill>
-                <a:latin typeface="Arial" panose="020B0604020202020204" pitchFamily="34" charset="0"/>
-                <a:cs typeface="Arial" panose="020B0604020202020204" pitchFamily="34" charset="0"/>
+                <a:latin typeface="Arial"/>
+                <a:cs typeface="Arial"/>
               </a:rPr>
-              <a:t>Objetivo</a:t>
-            </a:r>
+              <a:t>Objetivo General</a:t>
+            </a:r>
+            <a:endParaRPr lang="es-ES" b="1">
+              <a:solidFill>
+                <a:schemeClr val="bg1"/>
+              </a:solidFill>
+              <a:latin typeface="Arial" panose="020B0604020202020204" pitchFamily="34" charset="0"/>
+              <a:cs typeface="Arial" panose="020B0604020202020204" pitchFamily="34" charset="0"/>
+            </a:endParaRPr>
           </a:p>
         </p:txBody>
       </p:sp>
@@ -9596,38 +9961,26 @@
           <a:noFill/>
         </p:spPr>
         <p:txBody>
-          <a:bodyPr wrap="square">
+          <a:bodyPr wrap="square" lIns="91440" tIns="45720" rIns="91440" bIns="45720" anchor="t">
             <a:spAutoFit/>
           </a:bodyPr>
           <a:lstStyle/>
           <a:p>
             <a:pPr algn="ctr"/>
             <a:r>
-              <a:rPr lang="es-ES" b="1" dirty="0">
+              <a:rPr lang="es-ES" b="1">
                 <a:solidFill>
                   <a:schemeClr val="bg1"/>
                 </a:solidFill>
-                <a:latin typeface="Arial" panose="020B0604020202020204" pitchFamily="34" charset="0"/>
-                <a:cs typeface="Arial" panose="020B0604020202020204" pitchFamily="34" charset="0"/>
+                <a:latin typeface="Arial"/>
+                <a:cs typeface="Arial"/>
               </a:rPr>
-              <a:t>Lore </a:t>
-            </a:r>
-            <a:r>
-              <a:rPr lang="es-ES" b="1" dirty="0" err="1">
-                <a:solidFill>
-                  <a:schemeClr val="bg1"/>
-                </a:solidFill>
-                <a:latin typeface="Arial" panose="020B0604020202020204" pitchFamily="34" charset="0"/>
-                <a:cs typeface="Arial" panose="020B0604020202020204" pitchFamily="34" charset="0"/>
-              </a:rPr>
-              <a:t>ipsum</a:t>
-            </a:r>
-            <a:endParaRPr lang="es-ES" b="1" dirty="0">
+              <a:t>Objetivo Específico</a:t>
+            </a:r>
+            <a:endParaRPr lang="en-US">
               <a:solidFill>
                 <a:schemeClr val="bg1"/>
               </a:solidFill>
-              <a:latin typeface="Arial" panose="020B0604020202020204" pitchFamily="34" charset="0"/>
-              <a:cs typeface="Arial" panose="020B0604020202020204" pitchFamily="34" charset="0"/>
             </a:endParaRPr>
           </a:p>
         </p:txBody>
@@ -9684,7 +10037,7 @@
         </p:nvCxnSpPr>
         <p:spPr>
           <a:xfrm flipH="1">
-            <a:off x="964012" y="4932025"/>
+            <a:off x="1007144" y="5636516"/>
             <a:ext cx="2233884" cy="0"/>
           </a:xfrm>
           <a:prstGeom prst="line">
@@ -10039,99 +10392,1067 @@
           </a:fontRef>
         </p:style>
       </p:cxnSp>
+      <p:sp>
+        <p:nvSpPr>
+          <p:cNvPr id="2" name="Flecha: pentágono 7">
+            <a:extLst>
+              <a:ext uri="{FF2B5EF4-FFF2-40B4-BE49-F238E27FC236}">
+                <a16:creationId xmlns:a16="http://schemas.microsoft.com/office/drawing/2014/main" id="{BCB3922B-C2DC-EB08-0E39-D79B2646FD4D}"/>
+              </a:ext>
+            </a:extLst>
+          </p:cNvPr>
+          <p:cNvSpPr/>
+          <p:nvPr/>
+        </p:nvSpPr>
+        <p:spPr>
+          <a:xfrm>
+            <a:off x="242328" y="3843608"/>
+            <a:ext cx="1676690" cy="441726"/>
+          </a:xfrm>
+          <a:prstGeom prst="homePlate">
+            <a:avLst/>
+          </a:prstGeom>
+          <a:solidFill>
+            <a:srgbClr val="E35F65"/>
+          </a:solidFill>
+          <a:ln>
+            <a:solidFill>
+              <a:srgbClr val="E30000"/>
+            </a:solidFill>
+          </a:ln>
+        </p:spPr>
+        <p:style>
+          <a:lnRef idx="2">
+            <a:schemeClr val="accent1">
+              <a:shade val="15000"/>
+            </a:schemeClr>
+          </a:lnRef>
+          <a:fillRef idx="1">
+            <a:schemeClr val="accent1"/>
+          </a:fillRef>
+          <a:effectRef idx="0">
+            <a:schemeClr val="accent1"/>
+          </a:effectRef>
+          <a:fontRef idx="minor">
+            <a:schemeClr val="lt1"/>
+          </a:fontRef>
+        </p:style>
+        <p:txBody>
+          <a:bodyPr rtlCol="0" anchor="ctr"/>
+          <a:lstStyle>
+            <a:defPPr>
+              <a:defRPr lang="es-ES_tradnl"/>
+            </a:defPPr>
+            <a:lvl1pPr marL="0" algn="l" defTabSz="914400" rtl="0" eaLnBrk="1" latinLnBrk="0" hangingPunct="1">
+              <a:defRPr sz="1800" kern="1200">
+                <a:solidFill>
+                  <a:schemeClr val="lt1"/>
+                </a:solidFill>
+                <a:latin typeface="+mn-lt"/>
+                <a:ea typeface="+mn-ea"/>
+                <a:cs typeface="+mn-cs"/>
+              </a:defRPr>
+            </a:lvl1pPr>
+            <a:lvl2pPr marL="457200" algn="l" defTabSz="914400" rtl="0" eaLnBrk="1" latinLnBrk="0" hangingPunct="1">
+              <a:defRPr sz="1800" kern="1200">
+                <a:solidFill>
+                  <a:schemeClr val="lt1"/>
+                </a:solidFill>
+                <a:latin typeface="+mn-lt"/>
+                <a:ea typeface="+mn-ea"/>
+                <a:cs typeface="+mn-cs"/>
+              </a:defRPr>
+            </a:lvl2pPr>
+            <a:lvl3pPr marL="914400" algn="l" defTabSz="914400" rtl="0" eaLnBrk="1" latinLnBrk="0" hangingPunct="1">
+              <a:defRPr sz="1800" kern="1200">
+                <a:solidFill>
+                  <a:schemeClr val="lt1"/>
+                </a:solidFill>
+                <a:latin typeface="+mn-lt"/>
+                <a:ea typeface="+mn-ea"/>
+                <a:cs typeface="+mn-cs"/>
+              </a:defRPr>
+            </a:lvl3pPr>
+            <a:lvl4pPr marL="1371600" algn="l" defTabSz="914400" rtl="0" eaLnBrk="1" latinLnBrk="0" hangingPunct="1">
+              <a:defRPr sz="1800" kern="1200">
+                <a:solidFill>
+                  <a:schemeClr val="lt1"/>
+                </a:solidFill>
+                <a:latin typeface="+mn-lt"/>
+                <a:ea typeface="+mn-ea"/>
+                <a:cs typeface="+mn-cs"/>
+              </a:defRPr>
+            </a:lvl4pPr>
+            <a:lvl5pPr marL="1828800" algn="l" defTabSz="914400" rtl="0" eaLnBrk="1" latinLnBrk="0" hangingPunct="1">
+              <a:defRPr sz="1800" kern="1200">
+                <a:solidFill>
+                  <a:schemeClr val="lt1"/>
+                </a:solidFill>
+                <a:latin typeface="+mn-lt"/>
+                <a:ea typeface="+mn-ea"/>
+                <a:cs typeface="+mn-cs"/>
+              </a:defRPr>
+            </a:lvl5pPr>
+            <a:lvl6pPr marL="2286000" algn="l" defTabSz="914400" rtl="0" eaLnBrk="1" latinLnBrk="0" hangingPunct="1">
+              <a:defRPr sz="1800" kern="1200">
+                <a:solidFill>
+                  <a:schemeClr val="lt1"/>
+                </a:solidFill>
+                <a:latin typeface="+mn-lt"/>
+                <a:ea typeface="+mn-ea"/>
+                <a:cs typeface="+mn-cs"/>
+              </a:defRPr>
+            </a:lvl6pPr>
+            <a:lvl7pPr marL="2743200" algn="l" defTabSz="914400" rtl="0" eaLnBrk="1" latinLnBrk="0" hangingPunct="1">
+              <a:defRPr sz="1800" kern="1200">
+                <a:solidFill>
+                  <a:schemeClr val="lt1"/>
+                </a:solidFill>
+                <a:latin typeface="+mn-lt"/>
+                <a:ea typeface="+mn-ea"/>
+                <a:cs typeface="+mn-cs"/>
+              </a:defRPr>
+            </a:lvl7pPr>
+            <a:lvl8pPr marL="3200400" algn="l" defTabSz="914400" rtl="0" eaLnBrk="1" latinLnBrk="0" hangingPunct="1">
+              <a:defRPr sz="1800" kern="1200">
+                <a:solidFill>
+                  <a:schemeClr val="lt1"/>
+                </a:solidFill>
+                <a:latin typeface="+mn-lt"/>
+                <a:ea typeface="+mn-ea"/>
+                <a:cs typeface="+mn-cs"/>
+              </a:defRPr>
+            </a:lvl8pPr>
+            <a:lvl9pPr marL="3657600" algn="l" defTabSz="914400" rtl="0" eaLnBrk="1" latinLnBrk="0" hangingPunct="1">
+              <a:defRPr sz="1800" kern="1200">
+                <a:solidFill>
+                  <a:schemeClr val="lt1"/>
+                </a:solidFill>
+                <a:latin typeface="+mn-lt"/>
+                <a:ea typeface="+mn-ea"/>
+                <a:cs typeface="+mn-cs"/>
+              </a:defRPr>
+            </a:lvl9pPr>
+          </a:lstStyle>
+          <a:p>
+            <a:pPr algn="ctr"/>
+            <a:r>
+              <a:rPr lang="es-CL"/>
+              <a:t>Profundidad</a:t>
+            </a:r>
+          </a:p>
+        </p:txBody>
+      </p:sp>
+      <p:sp>
+        <p:nvSpPr>
+          <p:cNvPr id="3" name="Flecha: pentágono 8">
+            <a:extLst>
+              <a:ext uri="{FF2B5EF4-FFF2-40B4-BE49-F238E27FC236}">
+                <a16:creationId xmlns:a16="http://schemas.microsoft.com/office/drawing/2014/main" id="{53A07681-A1E1-2E20-06A1-7D9C8965BE78}"/>
+              </a:ext>
+            </a:extLst>
+          </p:cNvPr>
+          <p:cNvSpPr/>
+          <p:nvPr/>
+        </p:nvSpPr>
+        <p:spPr>
+          <a:xfrm>
+            <a:off x="2054549" y="3843608"/>
+            <a:ext cx="1115974" cy="427349"/>
+          </a:xfrm>
+          <a:prstGeom prst="homePlate">
+            <a:avLst/>
+          </a:prstGeom>
+          <a:solidFill>
+            <a:srgbClr val="E35F65"/>
+          </a:solidFill>
+          <a:ln>
+            <a:solidFill>
+              <a:srgbClr val="E30000"/>
+            </a:solidFill>
+          </a:ln>
+        </p:spPr>
+        <p:style>
+          <a:lnRef idx="2">
+            <a:schemeClr val="accent1">
+              <a:shade val="15000"/>
+            </a:schemeClr>
+          </a:lnRef>
+          <a:fillRef idx="1">
+            <a:schemeClr val="accent1"/>
+          </a:fillRef>
+          <a:effectRef idx="0">
+            <a:schemeClr val="accent1"/>
+          </a:effectRef>
+          <a:fontRef idx="minor">
+            <a:schemeClr val="lt1"/>
+          </a:fontRef>
+        </p:style>
+        <p:txBody>
+          <a:bodyPr rtlCol="0" anchor="ctr"/>
+          <a:lstStyle>
+            <a:defPPr>
+              <a:defRPr lang="es-ES_tradnl"/>
+            </a:defPPr>
+            <a:lvl1pPr marL="0" algn="l" defTabSz="914400" rtl="0" eaLnBrk="1" latinLnBrk="0" hangingPunct="1">
+              <a:defRPr sz="1800" kern="1200">
+                <a:solidFill>
+                  <a:schemeClr val="lt1"/>
+                </a:solidFill>
+                <a:latin typeface="+mn-lt"/>
+                <a:ea typeface="+mn-ea"/>
+                <a:cs typeface="+mn-cs"/>
+              </a:defRPr>
+            </a:lvl1pPr>
+            <a:lvl2pPr marL="457200" algn="l" defTabSz="914400" rtl="0" eaLnBrk="1" latinLnBrk="0" hangingPunct="1">
+              <a:defRPr sz="1800" kern="1200">
+                <a:solidFill>
+                  <a:schemeClr val="lt1"/>
+                </a:solidFill>
+                <a:latin typeface="+mn-lt"/>
+                <a:ea typeface="+mn-ea"/>
+                <a:cs typeface="+mn-cs"/>
+              </a:defRPr>
+            </a:lvl2pPr>
+            <a:lvl3pPr marL="914400" algn="l" defTabSz="914400" rtl="0" eaLnBrk="1" latinLnBrk="0" hangingPunct="1">
+              <a:defRPr sz="1800" kern="1200">
+                <a:solidFill>
+                  <a:schemeClr val="lt1"/>
+                </a:solidFill>
+                <a:latin typeface="+mn-lt"/>
+                <a:ea typeface="+mn-ea"/>
+                <a:cs typeface="+mn-cs"/>
+              </a:defRPr>
+            </a:lvl3pPr>
+            <a:lvl4pPr marL="1371600" algn="l" defTabSz="914400" rtl="0" eaLnBrk="1" latinLnBrk="0" hangingPunct="1">
+              <a:defRPr sz="1800" kern="1200">
+                <a:solidFill>
+                  <a:schemeClr val="lt1"/>
+                </a:solidFill>
+                <a:latin typeface="+mn-lt"/>
+                <a:ea typeface="+mn-ea"/>
+                <a:cs typeface="+mn-cs"/>
+              </a:defRPr>
+            </a:lvl4pPr>
+            <a:lvl5pPr marL="1828800" algn="l" defTabSz="914400" rtl="0" eaLnBrk="1" latinLnBrk="0" hangingPunct="1">
+              <a:defRPr sz="1800" kern="1200">
+                <a:solidFill>
+                  <a:schemeClr val="lt1"/>
+                </a:solidFill>
+                <a:latin typeface="+mn-lt"/>
+                <a:ea typeface="+mn-ea"/>
+                <a:cs typeface="+mn-cs"/>
+              </a:defRPr>
+            </a:lvl5pPr>
+            <a:lvl6pPr marL="2286000" algn="l" defTabSz="914400" rtl="0" eaLnBrk="1" latinLnBrk="0" hangingPunct="1">
+              <a:defRPr sz="1800" kern="1200">
+                <a:solidFill>
+                  <a:schemeClr val="lt1"/>
+                </a:solidFill>
+                <a:latin typeface="+mn-lt"/>
+                <a:ea typeface="+mn-ea"/>
+                <a:cs typeface="+mn-cs"/>
+              </a:defRPr>
+            </a:lvl6pPr>
+            <a:lvl7pPr marL="2743200" algn="l" defTabSz="914400" rtl="0" eaLnBrk="1" latinLnBrk="0" hangingPunct="1">
+              <a:defRPr sz="1800" kern="1200">
+                <a:solidFill>
+                  <a:schemeClr val="lt1"/>
+                </a:solidFill>
+                <a:latin typeface="+mn-lt"/>
+                <a:ea typeface="+mn-ea"/>
+                <a:cs typeface="+mn-cs"/>
+              </a:defRPr>
+            </a:lvl7pPr>
+            <a:lvl8pPr marL="3200400" algn="l" defTabSz="914400" rtl="0" eaLnBrk="1" latinLnBrk="0" hangingPunct="1">
+              <a:defRPr sz="1800" kern="1200">
+                <a:solidFill>
+                  <a:schemeClr val="lt1"/>
+                </a:solidFill>
+                <a:latin typeface="+mn-lt"/>
+                <a:ea typeface="+mn-ea"/>
+                <a:cs typeface="+mn-cs"/>
+              </a:defRPr>
+            </a:lvl8pPr>
+            <a:lvl9pPr marL="3657600" algn="l" defTabSz="914400" rtl="0" eaLnBrk="1" latinLnBrk="0" hangingPunct="1">
+              <a:defRPr sz="1800" kern="1200">
+                <a:solidFill>
+                  <a:schemeClr val="lt1"/>
+                </a:solidFill>
+                <a:latin typeface="+mn-lt"/>
+                <a:ea typeface="+mn-ea"/>
+                <a:cs typeface="+mn-cs"/>
+              </a:defRPr>
+            </a:lvl9pPr>
+          </a:lstStyle>
+          <a:p>
+            <a:pPr algn="ctr"/>
+            <a:r>
+              <a:rPr lang="es-CL"/>
+              <a:t>Ancho</a:t>
+            </a:r>
+          </a:p>
+        </p:txBody>
+      </p:sp>
+      <p:sp>
+        <p:nvSpPr>
+          <p:cNvPr id="4" name="Flecha: pentágono 9">
+            <a:extLst>
+              <a:ext uri="{FF2B5EF4-FFF2-40B4-BE49-F238E27FC236}">
+                <a16:creationId xmlns:a16="http://schemas.microsoft.com/office/drawing/2014/main" id="{B420626F-7183-5B69-CC17-50E83C0AF8B0}"/>
+              </a:ext>
+            </a:extLst>
+          </p:cNvPr>
+          <p:cNvSpPr/>
+          <p:nvPr/>
+        </p:nvSpPr>
+        <p:spPr>
+          <a:xfrm>
+            <a:off x="1116616" y="4495226"/>
+            <a:ext cx="1115974" cy="441727"/>
+          </a:xfrm>
+          <a:prstGeom prst="homePlate">
+            <a:avLst/>
+          </a:prstGeom>
+          <a:solidFill>
+            <a:srgbClr val="002060"/>
+          </a:solidFill>
+          <a:ln>
+            <a:solidFill>
+              <a:srgbClr val="E30000"/>
+            </a:solidFill>
+          </a:ln>
+        </p:spPr>
+        <p:style>
+          <a:lnRef idx="2">
+            <a:schemeClr val="accent1">
+              <a:shade val="15000"/>
+            </a:schemeClr>
+          </a:lnRef>
+          <a:fillRef idx="1">
+            <a:schemeClr val="accent1"/>
+          </a:fillRef>
+          <a:effectRef idx="0">
+            <a:schemeClr val="accent1"/>
+          </a:effectRef>
+          <a:fontRef idx="minor">
+            <a:schemeClr val="lt1"/>
+          </a:fontRef>
+        </p:style>
+        <p:txBody>
+          <a:bodyPr rtlCol="0" anchor="ctr"/>
+          <a:lstStyle>
+            <a:defPPr>
+              <a:defRPr lang="es-ES_tradnl"/>
+            </a:defPPr>
+            <a:lvl1pPr marL="0" algn="l" defTabSz="914400" rtl="0" eaLnBrk="1" latinLnBrk="0" hangingPunct="1">
+              <a:defRPr sz="1800" kern="1200">
+                <a:solidFill>
+                  <a:schemeClr val="lt1"/>
+                </a:solidFill>
+                <a:latin typeface="+mn-lt"/>
+                <a:ea typeface="+mn-ea"/>
+                <a:cs typeface="+mn-cs"/>
+              </a:defRPr>
+            </a:lvl1pPr>
+            <a:lvl2pPr marL="457200" algn="l" defTabSz="914400" rtl="0" eaLnBrk="1" latinLnBrk="0" hangingPunct="1">
+              <a:defRPr sz="1800" kern="1200">
+                <a:solidFill>
+                  <a:schemeClr val="lt1"/>
+                </a:solidFill>
+                <a:latin typeface="+mn-lt"/>
+                <a:ea typeface="+mn-ea"/>
+                <a:cs typeface="+mn-cs"/>
+              </a:defRPr>
+            </a:lvl2pPr>
+            <a:lvl3pPr marL="914400" algn="l" defTabSz="914400" rtl="0" eaLnBrk="1" latinLnBrk="0" hangingPunct="1">
+              <a:defRPr sz="1800" kern="1200">
+                <a:solidFill>
+                  <a:schemeClr val="lt1"/>
+                </a:solidFill>
+                <a:latin typeface="+mn-lt"/>
+                <a:ea typeface="+mn-ea"/>
+                <a:cs typeface="+mn-cs"/>
+              </a:defRPr>
+            </a:lvl3pPr>
+            <a:lvl4pPr marL="1371600" algn="l" defTabSz="914400" rtl="0" eaLnBrk="1" latinLnBrk="0" hangingPunct="1">
+              <a:defRPr sz="1800" kern="1200">
+                <a:solidFill>
+                  <a:schemeClr val="lt1"/>
+                </a:solidFill>
+                <a:latin typeface="+mn-lt"/>
+                <a:ea typeface="+mn-ea"/>
+                <a:cs typeface="+mn-cs"/>
+              </a:defRPr>
+            </a:lvl4pPr>
+            <a:lvl5pPr marL="1828800" algn="l" defTabSz="914400" rtl="0" eaLnBrk="1" latinLnBrk="0" hangingPunct="1">
+              <a:defRPr sz="1800" kern="1200">
+                <a:solidFill>
+                  <a:schemeClr val="lt1"/>
+                </a:solidFill>
+                <a:latin typeface="+mn-lt"/>
+                <a:ea typeface="+mn-ea"/>
+                <a:cs typeface="+mn-cs"/>
+              </a:defRPr>
+            </a:lvl5pPr>
+            <a:lvl6pPr marL="2286000" algn="l" defTabSz="914400" rtl="0" eaLnBrk="1" latinLnBrk="0" hangingPunct="1">
+              <a:defRPr sz="1800" kern="1200">
+                <a:solidFill>
+                  <a:schemeClr val="lt1"/>
+                </a:solidFill>
+                <a:latin typeface="+mn-lt"/>
+                <a:ea typeface="+mn-ea"/>
+                <a:cs typeface="+mn-cs"/>
+              </a:defRPr>
+            </a:lvl6pPr>
+            <a:lvl7pPr marL="2743200" algn="l" defTabSz="914400" rtl="0" eaLnBrk="1" latinLnBrk="0" hangingPunct="1">
+              <a:defRPr sz="1800" kern="1200">
+                <a:solidFill>
+                  <a:schemeClr val="lt1"/>
+                </a:solidFill>
+                <a:latin typeface="+mn-lt"/>
+                <a:ea typeface="+mn-ea"/>
+                <a:cs typeface="+mn-cs"/>
+              </a:defRPr>
+            </a:lvl7pPr>
+            <a:lvl8pPr marL="3200400" algn="l" defTabSz="914400" rtl="0" eaLnBrk="1" latinLnBrk="0" hangingPunct="1">
+              <a:defRPr sz="1800" kern="1200">
+                <a:solidFill>
+                  <a:schemeClr val="lt1"/>
+                </a:solidFill>
+                <a:latin typeface="+mn-lt"/>
+                <a:ea typeface="+mn-ea"/>
+                <a:cs typeface="+mn-cs"/>
+              </a:defRPr>
+            </a:lvl8pPr>
+            <a:lvl9pPr marL="3657600" algn="l" defTabSz="914400" rtl="0" eaLnBrk="1" latinLnBrk="0" hangingPunct="1">
+              <a:defRPr sz="1800" kern="1200">
+                <a:solidFill>
+                  <a:schemeClr val="lt1"/>
+                </a:solidFill>
+                <a:latin typeface="+mn-lt"/>
+                <a:ea typeface="+mn-ea"/>
+                <a:cs typeface="+mn-cs"/>
+              </a:defRPr>
+            </a:lvl9pPr>
+          </a:lstStyle>
+          <a:p>
+            <a:pPr algn="ctr"/>
+            <a:r>
+              <a:rPr lang="es-CL"/>
+              <a:t>Precio</a:t>
+            </a:r>
+          </a:p>
+        </p:txBody>
+      </p:sp>
+      <p:sp>
+        <p:nvSpPr>
+          <p:cNvPr id="7" name="Flecha: pentágono 10">
+            <a:extLst>
+              <a:ext uri="{FF2B5EF4-FFF2-40B4-BE49-F238E27FC236}">
+                <a16:creationId xmlns:a16="http://schemas.microsoft.com/office/drawing/2014/main" id="{AFFEA349-59DA-112C-3E6F-80A06484C65C}"/>
+              </a:ext>
+            </a:extLst>
+          </p:cNvPr>
+          <p:cNvSpPr/>
+          <p:nvPr/>
+        </p:nvSpPr>
+        <p:spPr>
+          <a:xfrm>
+            <a:off x="242328" y="5003071"/>
+            <a:ext cx="1115974" cy="427349"/>
+          </a:xfrm>
+          <a:prstGeom prst="homePlate">
+            <a:avLst/>
+          </a:prstGeom>
+          <a:solidFill>
+            <a:srgbClr val="E35F65"/>
+          </a:solidFill>
+          <a:ln>
+            <a:solidFill>
+              <a:srgbClr val="E30000"/>
+            </a:solidFill>
+          </a:ln>
+        </p:spPr>
+        <p:style>
+          <a:lnRef idx="2">
+            <a:schemeClr val="accent1">
+              <a:shade val="15000"/>
+            </a:schemeClr>
+          </a:lnRef>
+          <a:fillRef idx="1">
+            <a:schemeClr val="accent1"/>
+          </a:fillRef>
+          <a:effectRef idx="0">
+            <a:schemeClr val="accent1"/>
+          </a:effectRef>
+          <a:fontRef idx="minor">
+            <a:schemeClr val="lt1"/>
+          </a:fontRef>
+        </p:style>
+        <p:txBody>
+          <a:bodyPr rtlCol="0" anchor="ctr"/>
+          <a:lstStyle>
+            <a:defPPr>
+              <a:defRPr lang="es-ES_tradnl"/>
+            </a:defPPr>
+            <a:lvl1pPr marL="0" algn="l" defTabSz="914400" rtl="0" eaLnBrk="1" latinLnBrk="0" hangingPunct="1">
+              <a:defRPr sz="1800" kern="1200">
+                <a:solidFill>
+                  <a:schemeClr val="lt1"/>
+                </a:solidFill>
+                <a:latin typeface="+mn-lt"/>
+                <a:ea typeface="+mn-ea"/>
+                <a:cs typeface="+mn-cs"/>
+              </a:defRPr>
+            </a:lvl1pPr>
+            <a:lvl2pPr marL="457200" algn="l" defTabSz="914400" rtl="0" eaLnBrk="1" latinLnBrk="0" hangingPunct="1">
+              <a:defRPr sz="1800" kern="1200">
+                <a:solidFill>
+                  <a:schemeClr val="lt1"/>
+                </a:solidFill>
+                <a:latin typeface="+mn-lt"/>
+                <a:ea typeface="+mn-ea"/>
+                <a:cs typeface="+mn-cs"/>
+              </a:defRPr>
+            </a:lvl2pPr>
+            <a:lvl3pPr marL="914400" algn="l" defTabSz="914400" rtl="0" eaLnBrk="1" latinLnBrk="0" hangingPunct="1">
+              <a:defRPr sz="1800" kern="1200">
+                <a:solidFill>
+                  <a:schemeClr val="lt1"/>
+                </a:solidFill>
+                <a:latin typeface="+mn-lt"/>
+                <a:ea typeface="+mn-ea"/>
+                <a:cs typeface="+mn-cs"/>
+              </a:defRPr>
+            </a:lvl3pPr>
+            <a:lvl4pPr marL="1371600" algn="l" defTabSz="914400" rtl="0" eaLnBrk="1" latinLnBrk="0" hangingPunct="1">
+              <a:defRPr sz="1800" kern="1200">
+                <a:solidFill>
+                  <a:schemeClr val="lt1"/>
+                </a:solidFill>
+                <a:latin typeface="+mn-lt"/>
+                <a:ea typeface="+mn-ea"/>
+                <a:cs typeface="+mn-cs"/>
+              </a:defRPr>
+            </a:lvl4pPr>
+            <a:lvl5pPr marL="1828800" algn="l" defTabSz="914400" rtl="0" eaLnBrk="1" latinLnBrk="0" hangingPunct="1">
+              <a:defRPr sz="1800" kern="1200">
+                <a:solidFill>
+                  <a:schemeClr val="lt1"/>
+                </a:solidFill>
+                <a:latin typeface="+mn-lt"/>
+                <a:ea typeface="+mn-ea"/>
+                <a:cs typeface="+mn-cs"/>
+              </a:defRPr>
+            </a:lvl5pPr>
+            <a:lvl6pPr marL="2286000" algn="l" defTabSz="914400" rtl="0" eaLnBrk="1" latinLnBrk="0" hangingPunct="1">
+              <a:defRPr sz="1800" kern="1200">
+                <a:solidFill>
+                  <a:schemeClr val="lt1"/>
+                </a:solidFill>
+                <a:latin typeface="+mn-lt"/>
+                <a:ea typeface="+mn-ea"/>
+                <a:cs typeface="+mn-cs"/>
+              </a:defRPr>
+            </a:lvl6pPr>
+            <a:lvl7pPr marL="2743200" algn="l" defTabSz="914400" rtl="0" eaLnBrk="1" latinLnBrk="0" hangingPunct="1">
+              <a:defRPr sz="1800" kern="1200">
+                <a:solidFill>
+                  <a:schemeClr val="lt1"/>
+                </a:solidFill>
+                <a:latin typeface="+mn-lt"/>
+                <a:ea typeface="+mn-ea"/>
+                <a:cs typeface="+mn-cs"/>
+              </a:defRPr>
+            </a:lvl7pPr>
+            <a:lvl8pPr marL="3200400" algn="l" defTabSz="914400" rtl="0" eaLnBrk="1" latinLnBrk="0" hangingPunct="1">
+              <a:defRPr sz="1800" kern="1200">
+                <a:solidFill>
+                  <a:schemeClr val="lt1"/>
+                </a:solidFill>
+                <a:latin typeface="+mn-lt"/>
+                <a:ea typeface="+mn-ea"/>
+                <a:cs typeface="+mn-cs"/>
+              </a:defRPr>
+            </a:lvl8pPr>
+            <a:lvl9pPr marL="3657600" algn="l" defTabSz="914400" rtl="0" eaLnBrk="1" latinLnBrk="0" hangingPunct="1">
+              <a:defRPr sz="1800" kern="1200">
+                <a:solidFill>
+                  <a:schemeClr val="lt1"/>
+                </a:solidFill>
+                <a:latin typeface="+mn-lt"/>
+                <a:ea typeface="+mn-ea"/>
+                <a:cs typeface="+mn-cs"/>
+              </a:defRPr>
+            </a:lvl9pPr>
+          </a:lstStyle>
+          <a:p>
+            <a:pPr algn="ctr"/>
+            <a:r>
+              <a:rPr lang="es-CL"/>
+              <a:t>X</a:t>
+            </a:r>
+          </a:p>
+        </p:txBody>
+      </p:sp>
+      <p:sp>
+        <p:nvSpPr>
+          <p:cNvPr id="17" name="Flecha: pentágono 11">
+            <a:extLst>
+              <a:ext uri="{FF2B5EF4-FFF2-40B4-BE49-F238E27FC236}">
+                <a16:creationId xmlns:a16="http://schemas.microsoft.com/office/drawing/2014/main" id="{58C34E86-807D-A536-4841-E34D9BE399E2}"/>
+              </a:ext>
+            </a:extLst>
+          </p:cNvPr>
+          <p:cNvSpPr/>
+          <p:nvPr/>
+        </p:nvSpPr>
+        <p:spPr>
+          <a:xfrm>
+            <a:off x="1767002" y="5003071"/>
+            <a:ext cx="1115974" cy="427349"/>
+          </a:xfrm>
+          <a:prstGeom prst="homePlate">
+            <a:avLst/>
+          </a:prstGeom>
+          <a:solidFill>
+            <a:srgbClr val="E35F65"/>
+          </a:solidFill>
+          <a:ln>
+            <a:solidFill>
+              <a:srgbClr val="E30000"/>
+            </a:solidFill>
+          </a:ln>
+        </p:spPr>
+        <p:style>
+          <a:lnRef idx="2">
+            <a:schemeClr val="accent1">
+              <a:shade val="15000"/>
+            </a:schemeClr>
+          </a:lnRef>
+          <a:fillRef idx="1">
+            <a:schemeClr val="accent1"/>
+          </a:fillRef>
+          <a:effectRef idx="0">
+            <a:schemeClr val="accent1"/>
+          </a:effectRef>
+          <a:fontRef idx="minor">
+            <a:schemeClr val="lt1"/>
+          </a:fontRef>
+        </p:style>
+        <p:txBody>
+          <a:bodyPr rtlCol="0" anchor="ctr"/>
+          <a:lstStyle>
+            <a:defPPr>
+              <a:defRPr lang="es-ES_tradnl"/>
+            </a:defPPr>
+            <a:lvl1pPr marL="0" algn="l" defTabSz="914400" rtl="0" eaLnBrk="1" latinLnBrk="0" hangingPunct="1">
+              <a:defRPr sz="1800" kern="1200">
+                <a:solidFill>
+                  <a:schemeClr val="lt1"/>
+                </a:solidFill>
+                <a:latin typeface="+mn-lt"/>
+                <a:ea typeface="+mn-ea"/>
+                <a:cs typeface="+mn-cs"/>
+              </a:defRPr>
+            </a:lvl1pPr>
+            <a:lvl2pPr marL="457200" algn="l" defTabSz="914400" rtl="0" eaLnBrk="1" latinLnBrk="0" hangingPunct="1">
+              <a:defRPr sz="1800" kern="1200">
+                <a:solidFill>
+                  <a:schemeClr val="lt1"/>
+                </a:solidFill>
+                <a:latin typeface="+mn-lt"/>
+                <a:ea typeface="+mn-ea"/>
+                <a:cs typeface="+mn-cs"/>
+              </a:defRPr>
+            </a:lvl2pPr>
+            <a:lvl3pPr marL="914400" algn="l" defTabSz="914400" rtl="0" eaLnBrk="1" latinLnBrk="0" hangingPunct="1">
+              <a:defRPr sz="1800" kern="1200">
+                <a:solidFill>
+                  <a:schemeClr val="lt1"/>
+                </a:solidFill>
+                <a:latin typeface="+mn-lt"/>
+                <a:ea typeface="+mn-ea"/>
+                <a:cs typeface="+mn-cs"/>
+              </a:defRPr>
+            </a:lvl3pPr>
+            <a:lvl4pPr marL="1371600" algn="l" defTabSz="914400" rtl="0" eaLnBrk="1" latinLnBrk="0" hangingPunct="1">
+              <a:defRPr sz="1800" kern="1200">
+                <a:solidFill>
+                  <a:schemeClr val="lt1"/>
+                </a:solidFill>
+                <a:latin typeface="+mn-lt"/>
+                <a:ea typeface="+mn-ea"/>
+                <a:cs typeface="+mn-cs"/>
+              </a:defRPr>
+            </a:lvl4pPr>
+            <a:lvl5pPr marL="1828800" algn="l" defTabSz="914400" rtl="0" eaLnBrk="1" latinLnBrk="0" hangingPunct="1">
+              <a:defRPr sz="1800" kern="1200">
+                <a:solidFill>
+                  <a:schemeClr val="lt1"/>
+                </a:solidFill>
+                <a:latin typeface="+mn-lt"/>
+                <a:ea typeface="+mn-ea"/>
+                <a:cs typeface="+mn-cs"/>
+              </a:defRPr>
+            </a:lvl5pPr>
+            <a:lvl6pPr marL="2286000" algn="l" defTabSz="914400" rtl="0" eaLnBrk="1" latinLnBrk="0" hangingPunct="1">
+              <a:defRPr sz="1800" kern="1200">
+                <a:solidFill>
+                  <a:schemeClr val="lt1"/>
+                </a:solidFill>
+                <a:latin typeface="+mn-lt"/>
+                <a:ea typeface="+mn-ea"/>
+                <a:cs typeface="+mn-cs"/>
+              </a:defRPr>
+            </a:lvl6pPr>
+            <a:lvl7pPr marL="2743200" algn="l" defTabSz="914400" rtl="0" eaLnBrk="1" latinLnBrk="0" hangingPunct="1">
+              <a:defRPr sz="1800" kern="1200">
+                <a:solidFill>
+                  <a:schemeClr val="lt1"/>
+                </a:solidFill>
+                <a:latin typeface="+mn-lt"/>
+                <a:ea typeface="+mn-ea"/>
+                <a:cs typeface="+mn-cs"/>
+              </a:defRPr>
+            </a:lvl7pPr>
+            <a:lvl8pPr marL="3200400" algn="l" defTabSz="914400" rtl="0" eaLnBrk="1" latinLnBrk="0" hangingPunct="1">
+              <a:defRPr sz="1800" kern="1200">
+                <a:solidFill>
+                  <a:schemeClr val="lt1"/>
+                </a:solidFill>
+                <a:latin typeface="+mn-lt"/>
+                <a:ea typeface="+mn-ea"/>
+                <a:cs typeface="+mn-cs"/>
+              </a:defRPr>
+            </a:lvl8pPr>
+            <a:lvl9pPr marL="3657600" algn="l" defTabSz="914400" rtl="0" eaLnBrk="1" latinLnBrk="0" hangingPunct="1">
+              <a:defRPr sz="1800" kern="1200">
+                <a:solidFill>
+                  <a:schemeClr val="lt1"/>
+                </a:solidFill>
+                <a:latin typeface="+mn-lt"/>
+                <a:ea typeface="+mn-ea"/>
+                <a:cs typeface="+mn-cs"/>
+              </a:defRPr>
+            </a:lvl9pPr>
+          </a:lstStyle>
+          <a:p>
+            <a:pPr algn="ctr"/>
+            <a:r>
+              <a:rPr lang="es-CL"/>
+              <a:t>Y</a:t>
+            </a:r>
+          </a:p>
+        </p:txBody>
+      </p:sp>
+      <p:sp>
+        <p:nvSpPr>
+          <p:cNvPr id="24" name="Flecha: pentágono 12">
+            <a:extLst>
+              <a:ext uri="{FF2B5EF4-FFF2-40B4-BE49-F238E27FC236}">
+                <a16:creationId xmlns:a16="http://schemas.microsoft.com/office/drawing/2014/main" id="{B558E4C3-58FD-2962-9E56-66C0A77F77A5}"/>
+              </a:ext>
+            </a:extLst>
+          </p:cNvPr>
+          <p:cNvSpPr/>
+          <p:nvPr/>
+        </p:nvSpPr>
+        <p:spPr>
+          <a:xfrm>
+            <a:off x="1116616" y="3307008"/>
+            <a:ext cx="1115974" cy="427349"/>
+          </a:xfrm>
+          <a:prstGeom prst="homePlate">
+            <a:avLst/>
+          </a:prstGeom>
+          <a:solidFill>
+            <a:srgbClr val="E35F65"/>
+          </a:solidFill>
+          <a:ln>
+            <a:solidFill>
+              <a:srgbClr val="E30000"/>
+            </a:solidFill>
+          </a:ln>
+        </p:spPr>
+        <p:style>
+          <a:lnRef idx="2">
+            <a:schemeClr val="accent1">
+              <a:shade val="15000"/>
+            </a:schemeClr>
+          </a:lnRef>
+          <a:fillRef idx="1">
+            <a:schemeClr val="accent1"/>
+          </a:fillRef>
+          <a:effectRef idx="0">
+            <a:schemeClr val="accent1"/>
+          </a:effectRef>
+          <a:fontRef idx="minor">
+            <a:schemeClr val="lt1"/>
+          </a:fontRef>
+        </p:style>
+        <p:txBody>
+          <a:bodyPr rtlCol="0" anchor="ctr"/>
+          <a:lstStyle>
+            <a:defPPr>
+              <a:defRPr lang="es-ES_tradnl"/>
+            </a:defPPr>
+            <a:lvl1pPr marL="0" algn="l" defTabSz="914400" rtl="0" eaLnBrk="1" latinLnBrk="0" hangingPunct="1">
+              <a:defRPr sz="1800" kern="1200">
+                <a:solidFill>
+                  <a:schemeClr val="lt1"/>
+                </a:solidFill>
+                <a:latin typeface="+mn-lt"/>
+                <a:ea typeface="+mn-ea"/>
+                <a:cs typeface="+mn-cs"/>
+              </a:defRPr>
+            </a:lvl1pPr>
+            <a:lvl2pPr marL="457200" algn="l" defTabSz="914400" rtl="0" eaLnBrk="1" latinLnBrk="0" hangingPunct="1">
+              <a:defRPr sz="1800" kern="1200">
+                <a:solidFill>
+                  <a:schemeClr val="lt1"/>
+                </a:solidFill>
+                <a:latin typeface="+mn-lt"/>
+                <a:ea typeface="+mn-ea"/>
+                <a:cs typeface="+mn-cs"/>
+              </a:defRPr>
+            </a:lvl2pPr>
+            <a:lvl3pPr marL="914400" algn="l" defTabSz="914400" rtl="0" eaLnBrk="1" latinLnBrk="0" hangingPunct="1">
+              <a:defRPr sz="1800" kern="1200">
+                <a:solidFill>
+                  <a:schemeClr val="lt1"/>
+                </a:solidFill>
+                <a:latin typeface="+mn-lt"/>
+                <a:ea typeface="+mn-ea"/>
+                <a:cs typeface="+mn-cs"/>
+              </a:defRPr>
+            </a:lvl3pPr>
+            <a:lvl4pPr marL="1371600" algn="l" defTabSz="914400" rtl="0" eaLnBrk="1" latinLnBrk="0" hangingPunct="1">
+              <a:defRPr sz="1800" kern="1200">
+                <a:solidFill>
+                  <a:schemeClr val="lt1"/>
+                </a:solidFill>
+                <a:latin typeface="+mn-lt"/>
+                <a:ea typeface="+mn-ea"/>
+                <a:cs typeface="+mn-cs"/>
+              </a:defRPr>
+            </a:lvl4pPr>
+            <a:lvl5pPr marL="1828800" algn="l" defTabSz="914400" rtl="0" eaLnBrk="1" latinLnBrk="0" hangingPunct="1">
+              <a:defRPr sz="1800" kern="1200">
+                <a:solidFill>
+                  <a:schemeClr val="lt1"/>
+                </a:solidFill>
+                <a:latin typeface="+mn-lt"/>
+                <a:ea typeface="+mn-ea"/>
+                <a:cs typeface="+mn-cs"/>
+              </a:defRPr>
+            </a:lvl5pPr>
+            <a:lvl6pPr marL="2286000" algn="l" defTabSz="914400" rtl="0" eaLnBrk="1" latinLnBrk="0" hangingPunct="1">
+              <a:defRPr sz="1800" kern="1200">
+                <a:solidFill>
+                  <a:schemeClr val="lt1"/>
+                </a:solidFill>
+                <a:latin typeface="+mn-lt"/>
+                <a:ea typeface="+mn-ea"/>
+                <a:cs typeface="+mn-cs"/>
+              </a:defRPr>
+            </a:lvl6pPr>
+            <a:lvl7pPr marL="2743200" algn="l" defTabSz="914400" rtl="0" eaLnBrk="1" latinLnBrk="0" hangingPunct="1">
+              <a:defRPr sz="1800" kern="1200">
+                <a:solidFill>
+                  <a:schemeClr val="lt1"/>
+                </a:solidFill>
+                <a:latin typeface="+mn-lt"/>
+                <a:ea typeface="+mn-ea"/>
+                <a:cs typeface="+mn-cs"/>
+              </a:defRPr>
+            </a:lvl7pPr>
+            <a:lvl8pPr marL="3200400" algn="l" defTabSz="914400" rtl="0" eaLnBrk="1" latinLnBrk="0" hangingPunct="1">
+              <a:defRPr sz="1800" kern="1200">
+                <a:solidFill>
+                  <a:schemeClr val="lt1"/>
+                </a:solidFill>
+                <a:latin typeface="+mn-lt"/>
+                <a:ea typeface="+mn-ea"/>
+                <a:cs typeface="+mn-cs"/>
+              </a:defRPr>
+            </a:lvl8pPr>
+            <a:lvl9pPr marL="3657600" algn="l" defTabSz="914400" rtl="0" eaLnBrk="1" latinLnBrk="0" hangingPunct="1">
+              <a:defRPr sz="1800" kern="1200">
+                <a:solidFill>
+                  <a:schemeClr val="lt1"/>
+                </a:solidFill>
+                <a:latin typeface="+mn-lt"/>
+                <a:ea typeface="+mn-ea"/>
+                <a:cs typeface="+mn-cs"/>
+              </a:defRPr>
+            </a:lvl9pPr>
+          </a:lstStyle>
+          <a:p>
+            <a:pPr algn="ctr"/>
+            <a:r>
+              <a:rPr lang="es-CL"/>
+              <a:t>Peso</a:t>
+            </a:r>
+          </a:p>
+        </p:txBody>
+      </p:sp>
+      <p:sp>
+        <p:nvSpPr>
+          <p:cNvPr id="25" name="Flecha: pentágono 13">
+            <a:extLst>
+              <a:ext uri="{FF2B5EF4-FFF2-40B4-BE49-F238E27FC236}">
+                <a16:creationId xmlns:a16="http://schemas.microsoft.com/office/drawing/2014/main" id="{A8B32074-C045-5934-176F-E42A90AFDD47}"/>
+              </a:ext>
+            </a:extLst>
+          </p:cNvPr>
+          <p:cNvSpPr/>
+          <p:nvPr/>
+        </p:nvSpPr>
+        <p:spPr>
+          <a:xfrm>
+            <a:off x="1001597" y="5525293"/>
+            <a:ext cx="1115974" cy="427349"/>
+          </a:xfrm>
+          <a:prstGeom prst="homePlate">
+            <a:avLst/>
+          </a:prstGeom>
+          <a:solidFill>
+            <a:srgbClr val="E35F65"/>
+          </a:solidFill>
+          <a:ln>
+            <a:solidFill>
+              <a:srgbClr val="E30000"/>
+            </a:solidFill>
+          </a:ln>
+        </p:spPr>
+        <p:style>
+          <a:lnRef idx="2">
+            <a:schemeClr val="accent1">
+              <a:shade val="15000"/>
+            </a:schemeClr>
+          </a:lnRef>
+          <a:fillRef idx="1">
+            <a:schemeClr val="accent1"/>
+          </a:fillRef>
+          <a:effectRef idx="0">
+            <a:schemeClr val="accent1"/>
+          </a:effectRef>
+          <a:fontRef idx="minor">
+            <a:schemeClr val="lt1"/>
+          </a:fontRef>
+        </p:style>
+        <p:txBody>
+          <a:bodyPr rtlCol="0" anchor="ctr"/>
+          <a:lstStyle>
+            <a:defPPr>
+              <a:defRPr lang="es-ES_tradnl"/>
+            </a:defPPr>
+            <a:lvl1pPr marL="0" algn="l" defTabSz="914400" rtl="0" eaLnBrk="1" latinLnBrk="0" hangingPunct="1">
+              <a:defRPr sz="1800" kern="1200">
+                <a:solidFill>
+                  <a:schemeClr val="lt1"/>
+                </a:solidFill>
+                <a:latin typeface="+mn-lt"/>
+                <a:ea typeface="+mn-ea"/>
+                <a:cs typeface="+mn-cs"/>
+              </a:defRPr>
+            </a:lvl1pPr>
+            <a:lvl2pPr marL="457200" algn="l" defTabSz="914400" rtl="0" eaLnBrk="1" latinLnBrk="0" hangingPunct="1">
+              <a:defRPr sz="1800" kern="1200">
+                <a:solidFill>
+                  <a:schemeClr val="lt1"/>
+                </a:solidFill>
+                <a:latin typeface="+mn-lt"/>
+                <a:ea typeface="+mn-ea"/>
+                <a:cs typeface="+mn-cs"/>
+              </a:defRPr>
+            </a:lvl2pPr>
+            <a:lvl3pPr marL="914400" algn="l" defTabSz="914400" rtl="0" eaLnBrk="1" latinLnBrk="0" hangingPunct="1">
+              <a:defRPr sz="1800" kern="1200">
+                <a:solidFill>
+                  <a:schemeClr val="lt1"/>
+                </a:solidFill>
+                <a:latin typeface="+mn-lt"/>
+                <a:ea typeface="+mn-ea"/>
+                <a:cs typeface="+mn-cs"/>
+              </a:defRPr>
+            </a:lvl3pPr>
+            <a:lvl4pPr marL="1371600" algn="l" defTabSz="914400" rtl="0" eaLnBrk="1" latinLnBrk="0" hangingPunct="1">
+              <a:defRPr sz="1800" kern="1200">
+                <a:solidFill>
+                  <a:schemeClr val="lt1"/>
+                </a:solidFill>
+                <a:latin typeface="+mn-lt"/>
+                <a:ea typeface="+mn-ea"/>
+                <a:cs typeface="+mn-cs"/>
+              </a:defRPr>
+            </a:lvl4pPr>
+            <a:lvl5pPr marL="1828800" algn="l" defTabSz="914400" rtl="0" eaLnBrk="1" latinLnBrk="0" hangingPunct="1">
+              <a:defRPr sz="1800" kern="1200">
+                <a:solidFill>
+                  <a:schemeClr val="lt1"/>
+                </a:solidFill>
+                <a:latin typeface="+mn-lt"/>
+                <a:ea typeface="+mn-ea"/>
+                <a:cs typeface="+mn-cs"/>
+              </a:defRPr>
+            </a:lvl5pPr>
+            <a:lvl6pPr marL="2286000" algn="l" defTabSz="914400" rtl="0" eaLnBrk="1" latinLnBrk="0" hangingPunct="1">
+              <a:defRPr sz="1800" kern="1200">
+                <a:solidFill>
+                  <a:schemeClr val="lt1"/>
+                </a:solidFill>
+                <a:latin typeface="+mn-lt"/>
+                <a:ea typeface="+mn-ea"/>
+                <a:cs typeface="+mn-cs"/>
+              </a:defRPr>
+            </a:lvl6pPr>
+            <a:lvl7pPr marL="2743200" algn="l" defTabSz="914400" rtl="0" eaLnBrk="1" latinLnBrk="0" hangingPunct="1">
+              <a:defRPr sz="1800" kern="1200">
+                <a:solidFill>
+                  <a:schemeClr val="lt1"/>
+                </a:solidFill>
+                <a:latin typeface="+mn-lt"/>
+                <a:ea typeface="+mn-ea"/>
+                <a:cs typeface="+mn-cs"/>
+              </a:defRPr>
+            </a:lvl7pPr>
+            <a:lvl8pPr marL="3200400" algn="l" defTabSz="914400" rtl="0" eaLnBrk="1" latinLnBrk="0" hangingPunct="1">
+              <a:defRPr sz="1800" kern="1200">
+                <a:solidFill>
+                  <a:schemeClr val="lt1"/>
+                </a:solidFill>
+                <a:latin typeface="+mn-lt"/>
+                <a:ea typeface="+mn-ea"/>
+                <a:cs typeface="+mn-cs"/>
+              </a:defRPr>
+            </a:lvl8pPr>
+            <a:lvl9pPr marL="3657600" algn="l" defTabSz="914400" rtl="0" eaLnBrk="1" latinLnBrk="0" hangingPunct="1">
+              <a:defRPr sz="1800" kern="1200">
+                <a:solidFill>
+                  <a:schemeClr val="lt1"/>
+                </a:solidFill>
+                <a:latin typeface="+mn-lt"/>
+                <a:ea typeface="+mn-ea"/>
+                <a:cs typeface="+mn-cs"/>
+              </a:defRPr>
+            </a:lvl9pPr>
+          </a:lstStyle>
+          <a:p>
+            <a:pPr algn="ctr"/>
+            <a:r>
+              <a:rPr lang="es-CL"/>
+              <a:t>Z</a:t>
+            </a:r>
+          </a:p>
+        </p:txBody>
+      </p:sp>
     </p:spTree>
     <p:extLst>
       <p:ext uri="{BB962C8B-B14F-4D97-AF65-F5344CB8AC3E}">
         <p14:creationId xmlns:p14="http://schemas.microsoft.com/office/powerpoint/2010/main" val="1761978179"/>
-      </p:ext>
-    </p:extLst>
-  </p:cSld>
-  <p:clrMapOvr>
-    <a:masterClrMapping/>
-  </p:clrMapOvr>
-</p:sld>
-</file>
-
-<file path=ppt/slides/slide3.xml><?xml version="1.0" encoding="utf-8"?>
-<p:sld xmlns:a="http://schemas.openxmlformats.org/drawingml/2006/main" xmlns:r="http://schemas.openxmlformats.org/officeDocument/2006/relationships" xmlns:p="http://schemas.openxmlformats.org/presentationml/2006/main">
-  <p:cSld>
-    <p:spTree>
-      <p:nvGrpSpPr>
-        <p:cNvPr id="1" name=""/>
-        <p:cNvGrpSpPr/>
-        <p:nvPr/>
-      </p:nvGrpSpPr>
-      <p:grpSpPr>
-        <a:xfrm>
-          <a:off x="0" y="0"/>
-          <a:ext cx="0" cy="0"/>
-          <a:chOff x="0" y="0"/>
-          <a:chExt cx="0" cy="0"/>
-        </a:xfrm>
-      </p:grpSpPr>
-      <p:pic>
-        <p:nvPicPr>
-          <p:cNvPr id="7" name="Imagen 6"/>
-          <p:cNvPicPr>
-            <a:picLocks noChangeAspect="1"/>
-          </p:cNvPicPr>
-          <p:nvPr/>
-        </p:nvPicPr>
-        <p:blipFill rotWithShape="1">
-          <a:blip r:embed="rId3">
-            <a:extLst>
-              <a:ext uri="{28A0092B-C50C-407E-A947-70E740481C1C}">
-                <a14:useLocalDpi xmlns:a14="http://schemas.microsoft.com/office/drawing/2010/main" val="0"/>
-              </a:ext>
-            </a:extLst>
-          </a:blip>
-          <a:srcRect l="-153" t="20538" r="153" b="51651"/>
-          <a:stretch/>
-        </p:blipFill>
-        <p:spPr>
-          <a:xfrm>
-            <a:off x="-14013" y="1"/>
-            <a:ext cx="9172026" cy="802886"/>
-          </a:xfrm>
-          <a:prstGeom prst="rect">
-            <a:avLst/>
-          </a:prstGeom>
-        </p:spPr>
-      </p:pic>
-      <p:pic>
-        <p:nvPicPr>
-          <p:cNvPr id="2" name="Imagen 1"/>
-          <p:cNvPicPr>
-            <a:picLocks noChangeAspect="1"/>
-          </p:cNvPicPr>
-          <p:nvPr/>
-        </p:nvPicPr>
-        <p:blipFill>
-          <a:blip r:embed="rId4">
-            <a:extLst>
-              <a:ext uri="{28A0092B-C50C-407E-A947-70E740481C1C}">
-                <a14:useLocalDpi xmlns:a14="http://schemas.microsoft.com/office/drawing/2010/main" val="0"/>
-              </a:ext>
-            </a:extLst>
-          </a:blip>
-          <a:stretch>
-            <a:fillRect/>
-          </a:stretch>
-        </p:blipFill>
-        <p:spPr>
-          <a:xfrm>
-            <a:off x="8316024" y="89553"/>
-            <a:ext cx="719254" cy="600029"/>
-          </a:xfrm>
-          <a:prstGeom prst="rect">
-            <a:avLst/>
-          </a:prstGeom>
-        </p:spPr>
-      </p:pic>
-    </p:spTree>
-    <p:extLst>
-      <p:ext uri="{BB962C8B-B14F-4D97-AF65-F5344CB8AC3E}">
-        <p14:creationId xmlns:p14="http://schemas.microsoft.com/office/powerpoint/2010/main" val="3105322462"/>
       </p:ext>
     </p:extLst>
   </p:cSld>
@@ -10217,10 +11538,305 @@
           </a:prstGeom>
         </p:spPr>
       </p:pic>
+      <p:sp>
+        <p:nvSpPr>
+          <p:cNvPr id="3" name="TextBox 2">
+            <a:extLst>
+              <a:ext uri="{FF2B5EF4-FFF2-40B4-BE49-F238E27FC236}">
+                <a16:creationId xmlns:a16="http://schemas.microsoft.com/office/drawing/2014/main" id="{23480A74-8042-3918-FB57-0ABA427747B4}"/>
+              </a:ext>
+            </a:extLst>
+          </p:cNvPr>
+          <p:cNvSpPr txBox="1"/>
+          <p:nvPr/>
+        </p:nvSpPr>
+        <p:spPr>
+          <a:xfrm>
+            <a:off x="398006" y="1112667"/>
+            <a:ext cx="8341672" cy="2308324"/>
+          </a:xfrm>
+          <a:prstGeom prst="rect">
+            <a:avLst/>
+          </a:prstGeom>
+          <a:noFill/>
+        </p:spPr>
+        <p:txBody>
+          <a:bodyPr rot="0" spcFirstLastPara="0" vertOverflow="overflow" horzOverflow="overflow" vert="horz" wrap="square" lIns="91440" tIns="45720" rIns="91440" bIns="45720" numCol="1" spcCol="0" rtlCol="0" fromWordArt="0" anchor="t" anchorCtr="0" forceAA="0" compatLnSpc="1">
+            <a:prstTxWarp prst="textNoShape">
+              <a:avLst/>
+            </a:prstTxWarp>
+            <a:spAutoFit/>
+          </a:bodyPr>
+          <a:lstStyle/>
+          <a:p>
+            <a:r>
+              <a:rPr lang="es-CL" sz="2400">
+                <a:solidFill>
+                  <a:srgbClr val="19202E"/>
+                </a:solidFill>
+                <a:latin typeface="Segoe UI"/>
+                <a:ea typeface="Calibri"/>
+                <a:cs typeface="Segoe UI"/>
+              </a:rPr>
+              <a:t>Es una </a:t>
+            </a:r>
+            <a:r>
+              <a:rPr lang="es-CL" sz="2400" err="1">
+                <a:solidFill>
+                  <a:srgbClr val="19202E"/>
+                </a:solidFill>
+                <a:latin typeface="Segoe UI"/>
+                <a:ea typeface="Calibri"/>
+                <a:cs typeface="Segoe UI"/>
+              </a:rPr>
+              <a:t>tecnica</a:t>
+            </a:r>
+            <a:r>
+              <a:rPr lang="es-CL" sz="2400">
+                <a:solidFill>
+                  <a:srgbClr val="19202E"/>
+                </a:solidFill>
+                <a:latin typeface="Segoe UI"/>
+                <a:ea typeface="Calibri"/>
+                <a:cs typeface="Segoe UI"/>
+              </a:rPr>
+              <a:t> aplicada en la rama del Machine </a:t>
+            </a:r>
+            <a:r>
+              <a:rPr lang="es-CL" sz="2400" err="1">
+                <a:solidFill>
+                  <a:srgbClr val="19202E"/>
+                </a:solidFill>
+                <a:latin typeface="Segoe UI"/>
+                <a:ea typeface="Calibri"/>
+                <a:cs typeface="Segoe UI"/>
+              </a:rPr>
+              <a:t>Learning</a:t>
+            </a:r>
+            <a:r>
+              <a:rPr lang="es-CL" sz="2400">
+                <a:solidFill>
+                  <a:srgbClr val="19202E"/>
+                </a:solidFill>
+                <a:latin typeface="Segoe UI"/>
+                <a:ea typeface="Calibri"/>
+                <a:cs typeface="Segoe UI"/>
+              </a:rPr>
+              <a:t> en la que se aplican el uso de algoritmos definiendo que debe o no aprender en una serie de datos etiquetados </a:t>
+            </a:r>
+            <a:r>
+              <a:rPr lang="es-CL" sz="2400" err="1">
+                <a:solidFill>
+                  <a:srgbClr val="19202E"/>
+                </a:solidFill>
+                <a:latin typeface="Segoe UI"/>
+                <a:ea typeface="Calibri"/>
+                <a:cs typeface="Segoe UI"/>
+              </a:rPr>
+              <a:t>tambien</a:t>
+            </a:r>
+            <a:r>
+              <a:rPr lang="es-CL" sz="2400">
+                <a:solidFill>
+                  <a:srgbClr val="19202E"/>
+                </a:solidFill>
+                <a:latin typeface="Segoe UI"/>
+                <a:ea typeface="Calibri"/>
+                <a:cs typeface="Segoe UI"/>
+              </a:rPr>
+              <a:t> llamados conjunto de entrenamiento que permiten definir una </a:t>
+            </a:r>
+            <a:r>
+              <a:rPr lang="es-CL" sz="2400" err="1">
+                <a:solidFill>
+                  <a:srgbClr val="19202E"/>
+                </a:solidFill>
+                <a:latin typeface="Segoe UI"/>
+                <a:ea typeface="Calibri"/>
+                <a:cs typeface="Segoe UI"/>
+              </a:rPr>
+              <a:t>funcion</a:t>
+            </a:r>
+            <a:r>
+              <a:rPr lang="es-CL" sz="2400">
+                <a:solidFill>
+                  <a:srgbClr val="19202E"/>
+                </a:solidFill>
+                <a:latin typeface="Segoe UI"/>
+                <a:ea typeface="Calibri"/>
+                <a:cs typeface="Segoe UI"/>
+              </a:rPr>
+              <a:t> predictiva y enseñar al modelo a predecir los resultados con </a:t>
+            </a:r>
+            <a:r>
+              <a:rPr lang="es-CL" sz="2400" err="1">
+                <a:solidFill>
+                  <a:srgbClr val="19202E"/>
+                </a:solidFill>
+                <a:latin typeface="Segoe UI"/>
+                <a:ea typeface="Calibri"/>
+                <a:cs typeface="Segoe UI"/>
+              </a:rPr>
+              <a:t>precision</a:t>
+            </a:r>
+            <a:r>
+              <a:rPr lang="es-CL" sz="2400">
+                <a:solidFill>
+                  <a:srgbClr val="19202E"/>
+                </a:solidFill>
+                <a:latin typeface="Segoe UI"/>
+                <a:ea typeface="Calibri"/>
+                <a:cs typeface="Segoe UI"/>
+              </a:rPr>
+              <a:t>.</a:t>
+            </a:r>
+          </a:p>
+        </p:txBody>
+      </p:sp>
+      <p:sp>
+        <p:nvSpPr>
+          <p:cNvPr id="5" name="TextBox 4">
+            <a:extLst>
+              <a:ext uri="{FF2B5EF4-FFF2-40B4-BE49-F238E27FC236}">
+                <a16:creationId xmlns:a16="http://schemas.microsoft.com/office/drawing/2014/main" id="{433DB7EB-7290-9321-AB65-AD0581FDF5EA}"/>
+              </a:ext>
+            </a:extLst>
+          </p:cNvPr>
+          <p:cNvSpPr txBox="1"/>
+          <p:nvPr/>
+        </p:nvSpPr>
+        <p:spPr>
+          <a:xfrm>
+            <a:off x="4968816" y="3430438"/>
+            <a:ext cx="4410972" cy="3416320"/>
+          </a:xfrm>
+          <a:prstGeom prst="rect">
+            <a:avLst/>
+          </a:prstGeom>
+          <a:noFill/>
+        </p:spPr>
+        <p:txBody>
+          <a:bodyPr rot="0" spcFirstLastPara="0" vertOverflow="overflow" horzOverflow="overflow" vert="horz" wrap="square" lIns="91440" tIns="45720" rIns="91440" bIns="45720" numCol="1" spcCol="0" rtlCol="0" fromWordArt="0" anchor="t" anchorCtr="0" forceAA="0" compatLnSpc="1">
+            <a:prstTxWarp prst="textNoShape">
+              <a:avLst/>
+            </a:prstTxWarp>
+            <a:spAutoFit/>
+          </a:bodyPr>
+          <a:lstStyle/>
+          <a:p>
+            <a:r>
+              <a:rPr lang="es-CL" sz="2400">
+                <a:solidFill>
+                  <a:srgbClr val="19202E"/>
+                </a:solidFill>
+                <a:latin typeface="Segoe UI"/>
+                <a:cs typeface="Segoe UI"/>
+              </a:rPr>
+              <a:t> </a:t>
+            </a:r>
+            <a:r>
+              <a:rPr lang="es-CL" sz="2400" err="1">
+                <a:solidFill>
+                  <a:srgbClr val="19202E"/>
+                </a:solidFill>
+                <a:latin typeface="Segoe UI"/>
+                <a:cs typeface="Segoe UI"/>
+              </a:rPr>
+              <a:t>Asi</a:t>
+            </a:r>
+            <a:r>
+              <a:rPr lang="es-CL" sz="2400">
+                <a:solidFill>
+                  <a:srgbClr val="19202E"/>
+                </a:solidFill>
+                <a:latin typeface="Segoe UI"/>
+                <a:cs typeface="Segoe UI"/>
+              </a:rPr>
+              <a:t> mismo, con la </a:t>
+            </a:r>
+            <a:r>
+              <a:rPr lang="es-CL" sz="2400" err="1">
+                <a:solidFill>
+                  <a:srgbClr val="19202E"/>
+                </a:solidFill>
+                <a:latin typeface="Segoe UI"/>
+                <a:cs typeface="Segoe UI"/>
+              </a:rPr>
+              <a:t>funcion</a:t>
+            </a:r>
+            <a:r>
+              <a:rPr lang="es-CL" sz="2400">
+                <a:solidFill>
+                  <a:srgbClr val="19202E"/>
+                </a:solidFill>
+                <a:latin typeface="Segoe UI"/>
+                <a:cs typeface="Segoe UI"/>
+              </a:rPr>
+              <a:t> definida, el modelo usa los datos </a:t>
+            </a:r>
+            <a:r>
+              <a:rPr lang="es-CL" sz="2400" err="1">
+                <a:solidFill>
+                  <a:srgbClr val="19202E"/>
+                </a:solidFill>
+                <a:latin typeface="Segoe UI"/>
+                <a:cs typeface="Segoe UI"/>
+              </a:rPr>
+              <a:t>etiqutados</a:t>
+            </a:r>
+            <a:r>
+              <a:rPr lang="es-CL" sz="2400">
+                <a:solidFill>
+                  <a:srgbClr val="19202E"/>
+                </a:solidFill>
+                <a:latin typeface="Segoe UI"/>
+                <a:cs typeface="Segoe UI"/>
+              </a:rPr>
+              <a:t> para medir la relevancia de diferentes </a:t>
+            </a:r>
+            <a:r>
+              <a:rPr lang="es-CL" sz="2400" err="1">
+                <a:solidFill>
+                  <a:srgbClr val="19202E"/>
+                </a:solidFill>
+                <a:latin typeface="Segoe UI"/>
+                <a:cs typeface="Segoe UI"/>
+              </a:rPr>
+              <a:t>caracteristicas</a:t>
+            </a:r>
+            <a:r>
+              <a:rPr lang="es-CL" sz="2400">
+                <a:solidFill>
+                  <a:srgbClr val="19202E"/>
+                </a:solidFill>
+                <a:latin typeface="Segoe UI"/>
+                <a:cs typeface="Segoe UI"/>
+              </a:rPr>
+              <a:t> a fin de mejorar gradualmente el ajuste del modelo al resultado conocido</a:t>
+            </a:r>
+            <a:r>
+              <a:rPr lang="en-US" sz="2400">
+                <a:latin typeface="Segoe UI"/>
+                <a:cs typeface="Segoe UI"/>
+              </a:rPr>
+              <a:t>​</a:t>
+            </a:r>
+          </a:p>
+          <a:p>
+            <a:r>
+              <a:rPr lang="es-CL" sz="2400">
+                <a:latin typeface="Segoe UI"/>
+                <a:cs typeface="Segoe UI"/>
+              </a:rPr>
+              <a:t>​</a:t>
+            </a:r>
+          </a:p>
+        </p:txBody>
+      </p:sp>
     </p:spTree>
     <p:extLst>
       <p:ext uri="{BB962C8B-B14F-4D97-AF65-F5344CB8AC3E}">
-        <p14:creationId xmlns:p14="http://schemas.microsoft.com/office/powerpoint/2010/main" val="743564996"/>
+        <p14:creationId xmlns:p14="http://schemas.microsoft.com/office/powerpoint/2010/main" val="923601911"/>
       </p:ext>
     </p:extLst>
   </p:cSld>
@@ -10306,6 +11922,227 @@
           </a:prstGeom>
         </p:spPr>
       </p:pic>
+      <p:sp>
+        <p:nvSpPr>
+          <p:cNvPr id="3" name="TextBox 3">
+            <a:extLst>
+              <a:ext uri="{FF2B5EF4-FFF2-40B4-BE49-F238E27FC236}">
+                <a16:creationId xmlns:a16="http://schemas.microsoft.com/office/drawing/2014/main" id="{0BAEEE35-569A-C1B1-3DE8-7187348AFB7D}"/>
+              </a:ext>
+            </a:extLst>
+          </p:cNvPr>
+          <p:cNvSpPr txBox="1"/>
+          <p:nvPr/>
+        </p:nvSpPr>
+        <p:spPr>
+          <a:xfrm>
+            <a:off x="973101" y="1083913"/>
+            <a:ext cx="6846427" cy="3785652"/>
+          </a:xfrm>
+          <a:prstGeom prst="rect">
+            <a:avLst/>
+          </a:prstGeom>
+          <a:noFill/>
+        </p:spPr>
+        <p:txBody>
+          <a:bodyPr rot="0" spcFirstLastPara="0" vert="horz" wrap="square" lIns="91440" tIns="45720" rIns="91440" bIns="45720" numCol="1" spcCol="0" rtlCol="0" fromWordArt="0" anchor="t" anchorCtr="0" forceAA="0" compatLnSpc="1">
+            <a:prstTxWarp prst="textNoShape">
+              <a:avLst/>
+            </a:prstTxWarp>
+            <a:spAutoFit/>
+          </a:bodyPr>
+          <a:lstStyle>
+            <a:defPPr>
+              <a:defRPr lang="es-ES_tradnl"/>
+            </a:defPPr>
+            <a:lvl1pPr marL="0" algn="l" defTabSz="914400" rtl="0" eaLnBrk="1" latinLnBrk="0" hangingPunct="1">
+              <a:defRPr sz="1800" kern="1200">
+                <a:solidFill>
+                  <a:schemeClr val="tx1"/>
+                </a:solidFill>
+                <a:latin typeface="+mn-lt"/>
+                <a:ea typeface="+mn-ea"/>
+                <a:cs typeface="+mn-cs"/>
+              </a:defRPr>
+            </a:lvl1pPr>
+            <a:lvl2pPr marL="457200" algn="l" defTabSz="914400" rtl="0" eaLnBrk="1" latinLnBrk="0" hangingPunct="1">
+              <a:defRPr sz="1800" kern="1200">
+                <a:solidFill>
+                  <a:schemeClr val="tx1"/>
+                </a:solidFill>
+                <a:latin typeface="+mn-lt"/>
+                <a:ea typeface="+mn-ea"/>
+                <a:cs typeface="+mn-cs"/>
+              </a:defRPr>
+            </a:lvl2pPr>
+            <a:lvl3pPr marL="914400" algn="l" defTabSz="914400" rtl="0" eaLnBrk="1" latinLnBrk="0" hangingPunct="1">
+              <a:defRPr sz="1800" kern="1200">
+                <a:solidFill>
+                  <a:schemeClr val="tx1"/>
+                </a:solidFill>
+                <a:latin typeface="+mn-lt"/>
+                <a:ea typeface="+mn-ea"/>
+                <a:cs typeface="+mn-cs"/>
+              </a:defRPr>
+            </a:lvl3pPr>
+            <a:lvl4pPr marL="1371600" algn="l" defTabSz="914400" rtl="0" eaLnBrk="1" latinLnBrk="0" hangingPunct="1">
+              <a:defRPr sz="1800" kern="1200">
+                <a:solidFill>
+                  <a:schemeClr val="tx1"/>
+                </a:solidFill>
+                <a:latin typeface="+mn-lt"/>
+                <a:ea typeface="+mn-ea"/>
+                <a:cs typeface="+mn-cs"/>
+              </a:defRPr>
+            </a:lvl4pPr>
+            <a:lvl5pPr marL="1828800" algn="l" defTabSz="914400" rtl="0" eaLnBrk="1" latinLnBrk="0" hangingPunct="1">
+              <a:defRPr sz="1800" kern="1200">
+                <a:solidFill>
+                  <a:schemeClr val="tx1"/>
+                </a:solidFill>
+                <a:latin typeface="+mn-lt"/>
+                <a:ea typeface="+mn-ea"/>
+                <a:cs typeface="+mn-cs"/>
+              </a:defRPr>
+            </a:lvl5pPr>
+            <a:lvl6pPr marL="2286000" algn="l" defTabSz="914400" rtl="0" eaLnBrk="1" latinLnBrk="0" hangingPunct="1">
+              <a:defRPr sz="1800" kern="1200">
+                <a:solidFill>
+                  <a:schemeClr val="tx1"/>
+                </a:solidFill>
+                <a:latin typeface="+mn-lt"/>
+                <a:ea typeface="+mn-ea"/>
+                <a:cs typeface="+mn-cs"/>
+              </a:defRPr>
+            </a:lvl6pPr>
+            <a:lvl7pPr marL="2743200" algn="l" defTabSz="914400" rtl="0" eaLnBrk="1" latinLnBrk="0" hangingPunct="1">
+              <a:defRPr sz="1800" kern="1200">
+                <a:solidFill>
+                  <a:schemeClr val="tx1"/>
+                </a:solidFill>
+                <a:latin typeface="+mn-lt"/>
+                <a:ea typeface="+mn-ea"/>
+                <a:cs typeface="+mn-cs"/>
+              </a:defRPr>
+            </a:lvl7pPr>
+            <a:lvl8pPr marL="3200400" algn="l" defTabSz="914400" rtl="0" eaLnBrk="1" latinLnBrk="0" hangingPunct="1">
+              <a:defRPr sz="1800" kern="1200">
+                <a:solidFill>
+                  <a:schemeClr val="tx1"/>
+                </a:solidFill>
+                <a:latin typeface="+mn-lt"/>
+                <a:ea typeface="+mn-ea"/>
+                <a:cs typeface="+mn-cs"/>
+              </a:defRPr>
+            </a:lvl8pPr>
+            <a:lvl9pPr marL="3657600" algn="l" defTabSz="914400" rtl="0" eaLnBrk="1" latinLnBrk="0" hangingPunct="1">
+              <a:defRPr sz="1800" kern="1200">
+                <a:solidFill>
+                  <a:schemeClr val="tx1"/>
+                </a:solidFill>
+                <a:latin typeface="+mn-lt"/>
+                <a:ea typeface="+mn-ea"/>
+                <a:cs typeface="+mn-cs"/>
+              </a:defRPr>
+            </a:lvl9pPr>
+          </a:lstStyle>
+          <a:p>
+            <a:r>
+              <a:rPr lang="es-CL" sz="2400">
+                <a:solidFill>
+                  <a:srgbClr val="19202E"/>
+                </a:solidFill>
+                <a:latin typeface="Segoe UI"/>
+                <a:ea typeface="Calibri"/>
+                <a:cs typeface="Segoe UI"/>
+              </a:rPr>
+              <a:t>En el caso de estudio presente trabajamos un modelo de Regresión lineal, para el cual aplicamos los siguientes algoritmos:</a:t>
+            </a:r>
+          </a:p>
+          <a:p>
+            <a:endParaRPr lang="es-CL" sz="2400">
+              <a:solidFill>
+                <a:srgbClr val="19202E"/>
+              </a:solidFill>
+              <a:latin typeface="Segoe UI"/>
+              <a:ea typeface="Calibri"/>
+              <a:cs typeface="Segoe UI"/>
+            </a:endParaRPr>
+          </a:p>
+          <a:p>
+            <a:r>
+              <a:rPr lang="es-CL" sz="2400">
+                <a:solidFill>
+                  <a:srgbClr val="19202E"/>
+                </a:solidFill>
+                <a:latin typeface="Segoe UI"/>
+                <a:ea typeface="Calibri"/>
+                <a:cs typeface="Segoe UI"/>
+              </a:rPr>
+              <a:t>Regresión lineal </a:t>
+            </a:r>
+            <a:r>
+              <a:rPr lang="es-CL" sz="2400" err="1">
+                <a:solidFill>
+                  <a:srgbClr val="19202E"/>
+                </a:solidFill>
+                <a:latin typeface="Segoe UI"/>
+                <a:ea typeface="Calibri"/>
+                <a:cs typeface="Segoe UI"/>
+              </a:rPr>
+              <a:t>multiple</a:t>
+            </a:r>
+            <a:r>
+              <a:rPr lang="es-CL" sz="2400">
+                <a:solidFill>
+                  <a:srgbClr val="19202E"/>
+                </a:solidFill>
+                <a:latin typeface="Segoe UI"/>
+                <a:ea typeface="Calibri"/>
+                <a:cs typeface="Segoe UI"/>
+              </a:rPr>
+              <a:t>: Modela la relación entre una variable dependiente y una o mas independientes mediante una linea recta, permite </a:t>
+            </a:r>
+          </a:p>
+          <a:p>
+            <a:r>
+              <a:rPr lang="es-CL" sz="2400" err="1">
+                <a:solidFill>
+                  <a:srgbClr val="19202E"/>
+                </a:solidFill>
+                <a:latin typeface="Segoe UI"/>
+                <a:ea typeface="Calibri"/>
+                <a:cs typeface="Segoe UI"/>
+              </a:rPr>
+              <a:t>Arbol</a:t>
+            </a:r>
+            <a:r>
+              <a:rPr lang="es-CL" sz="2400">
+                <a:solidFill>
+                  <a:srgbClr val="19202E"/>
+                </a:solidFill>
+                <a:latin typeface="Segoe UI"/>
+                <a:ea typeface="Calibri"/>
+                <a:cs typeface="Segoe UI"/>
+              </a:rPr>
+              <a:t> de decisón:</a:t>
+            </a:r>
+          </a:p>
+          <a:p>
+            <a:r>
+              <a:rPr lang="es-CL" sz="2400">
+                <a:solidFill>
+                  <a:srgbClr val="19202E"/>
+                </a:solidFill>
+                <a:latin typeface="Segoe UI"/>
+                <a:ea typeface="Calibri"/>
+                <a:cs typeface="Segoe UI"/>
+              </a:rPr>
+              <a:t>Redes Neuronales:</a:t>
+            </a:r>
+          </a:p>
+        </p:txBody>
+      </p:sp>
     </p:spTree>
     <p:extLst>
       <p:ext uri="{BB962C8B-B14F-4D97-AF65-F5344CB8AC3E}">
@@ -10395,10 +12232,162 @@
           </a:prstGeom>
         </p:spPr>
       </p:pic>
+      <p:sp>
+        <p:nvSpPr>
+          <p:cNvPr id="3" name="TextBox 2">
+            <a:extLst>
+              <a:ext uri="{FF2B5EF4-FFF2-40B4-BE49-F238E27FC236}">
+                <a16:creationId xmlns:a16="http://schemas.microsoft.com/office/drawing/2014/main" id="{70866F9F-102C-0AFC-BCE5-4E8C73321E74}"/>
+              </a:ext>
+            </a:extLst>
+          </p:cNvPr>
+          <p:cNvSpPr txBox="1"/>
+          <p:nvPr/>
+        </p:nvSpPr>
+        <p:spPr>
+          <a:xfrm>
+            <a:off x="973101" y="1083913"/>
+            <a:ext cx="6846427" cy="5170646"/>
+          </a:xfrm>
+          <a:prstGeom prst="rect">
+            <a:avLst/>
+          </a:prstGeom>
+          <a:noFill/>
+        </p:spPr>
+        <p:txBody>
+          <a:bodyPr rot="0" spcFirstLastPara="0" vertOverflow="overflow" horzOverflow="overflow" vert="horz" wrap="square" lIns="91440" tIns="45720" rIns="91440" bIns="45720" numCol="1" spcCol="0" rtlCol="0" fromWordArt="0" anchor="t" anchorCtr="0" forceAA="0" compatLnSpc="1">
+            <a:prstTxWarp prst="textNoShape">
+              <a:avLst/>
+            </a:prstTxWarp>
+            <a:spAutoFit/>
+          </a:bodyPr>
+          <a:lstStyle/>
+          <a:p>
+            <a:r>
+              <a:rPr lang="es-CL" sz="2400" err="1">
+                <a:solidFill>
+                  <a:srgbClr val="19202E"/>
+                </a:solidFill>
+                <a:latin typeface="Segoe UI"/>
+                <a:cs typeface="Segoe UI"/>
+              </a:rPr>
+              <a:t>Slide</a:t>
+            </a:r>
+            <a:r>
+              <a:rPr lang="es-CL" sz="2400">
+                <a:solidFill>
+                  <a:srgbClr val="19202E"/>
+                </a:solidFill>
+                <a:latin typeface="Segoe UI"/>
+                <a:cs typeface="Segoe UI"/>
+              </a:rPr>
+              <a:t> 1: Logo de la universidad, facultad, Carrera, Nombre de integrantes del grupo.</a:t>
+            </a:r>
+            <a:endParaRPr lang="en-US" sz="2400">
+              <a:solidFill>
+                <a:srgbClr val="19202E"/>
+              </a:solidFill>
+              <a:latin typeface="Segoe UI"/>
+              <a:cs typeface="Segoe UI"/>
+            </a:endParaRPr>
+          </a:p>
+          <a:p>
+            <a:r>
+              <a:rPr lang="es-CL" sz="2400" err="1">
+                <a:solidFill>
+                  <a:srgbClr val="19202E"/>
+                </a:solidFill>
+                <a:latin typeface="Segoe UI"/>
+                <a:cs typeface="Segoe UI"/>
+              </a:rPr>
+              <a:t>Slide</a:t>
+            </a:r>
+            <a:r>
+              <a:rPr lang="es-CL" sz="2400">
+                <a:solidFill>
+                  <a:srgbClr val="19202E"/>
+                </a:solidFill>
+                <a:latin typeface="Segoe UI"/>
+                <a:cs typeface="Segoe UI"/>
+              </a:rPr>
+              <a:t> 2, 3, 4: Introducción: de una breve reseña del contenido del trabajo; explicación en qué consiste el aprendizaje supervisado y breve explicación de los algoritmos utilizados, objetivos del estudio.</a:t>
+            </a:r>
+            <a:endParaRPr lang="en-US" sz="2400">
+              <a:solidFill>
+                <a:srgbClr val="19202E"/>
+              </a:solidFill>
+              <a:latin typeface="Segoe UI"/>
+              <a:cs typeface="Segoe UI"/>
+            </a:endParaRPr>
+          </a:p>
+          <a:p>
+            <a:r>
+              <a:rPr lang="es-CL" sz="2400" err="1">
+                <a:solidFill>
+                  <a:srgbClr val="19202E"/>
+                </a:solidFill>
+                <a:latin typeface="Segoe UI"/>
+                <a:cs typeface="Segoe UI"/>
+              </a:rPr>
+              <a:t>Slide</a:t>
+            </a:r>
+            <a:r>
+              <a:rPr lang="es-CL" sz="2400">
+                <a:solidFill>
+                  <a:srgbClr val="19202E"/>
+                </a:solidFill>
+                <a:latin typeface="Segoe UI"/>
+                <a:cs typeface="Segoe UI"/>
+              </a:rPr>
+              <a:t> 5: Defina variable dependiente y variables independientes; y justifique si tiene que utilizar algoritmos de regresión o clasificación.</a:t>
+            </a:r>
+            <a:endParaRPr lang="en-US" sz="2400">
+              <a:solidFill>
+                <a:srgbClr val="19202E"/>
+              </a:solidFill>
+              <a:latin typeface="Segoe UI"/>
+              <a:cs typeface="Segoe UI"/>
+            </a:endParaRPr>
+          </a:p>
+          <a:p>
+            <a:r>
+              <a:rPr lang="es-CL" sz="2400" err="1">
+                <a:solidFill>
+                  <a:srgbClr val="19202E"/>
+                </a:solidFill>
+                <a:latin typeface="Segoe UI"/>
+                <a:cs typeface="Segoe UI"/>
+              </a:rPr>
+              <a:t>Slide</a:t>
+            </a:r>
+            <a:r>
+              <a:rPr lang="es-CL" sz="2400">
+                <a:solidFill>
+                  <a:srgbClr val="19202E"/>
+                </a:solidFill>
+                <a:latin typeface="Segoe UI"/>
+                <a:cs typeface="Segoe UI"/>
+              </a:rPr>
+              <a:t> 6: Tiempo de entrenamiento en la validación cruzada para cada algoritmo de cada estudiante del grupo</a:t>
+            </a:r>
+            <a:endParaRPr lang="en-US" sz="2400">
+              <a:ea typeface="Calibri"/>
+              <a:cs typeface="Calibri"/>
+            </a:endParaRPr>
+          </a:p>
+          <a:p>
+            <a:pPr algn="l"/>
+            <a:endParaRPr lang="en-US">
+              <a:ea typeface="Calibri"/>
+              <a:cs typeface="Calibri"/>
+            </a:endParaRPr>
+          </a:p>
+        </p:txBody>
+      </p:sp>
     </p:spTree>
     <p:extLst>
       <p:ext uri="{BB962C8B-B14F-4D97-AF65-F5344CB8AC3E}">
-        <p14:creationId xmlns:p14="http://schemas.microsoft.com/office/powerpoint/2010/main" val="2361542432"/>
+        <p14:creationId xmlns:p14="http://schemas.microsoft.com/office/powerpoint/2010/main" val="3105322462"/>
       </p:ext>
     </p:extLst>
   </p:cSld>
@@ -10487,7 +12476,7 @@
     </p:spTree>
     <p:extLst>
       <p:ext uri="{BB962C8B-B14F-4D97-AF65-F5344CB8AC3E}">
-        <p14:creationId xmlns:p14="http://schemas.microsoft.com/office/powerpoint/2010/main" val="3699663989"/>
+        <p14:creationId xmlns:p14="http://schemas.microsoft.com/office/powerpoint/2010/main" val="2361542432"/>
       </p:ext>
     </p:extLst>
   </p:cSld>
@@ -10576,7 +12565,7 @@
     </p:spTree>
     <p:extLst>
       <p:ext uri="{BB962C8B-B14F-4D97-AF65-F5344CB8AC3E}">
-        <p14:creationId xmlns:p14="http://schemas.microsoft.com/office/powerpoint/2010/main" val="3519697008"/>
+        <p14:creationId xmlns:p14="http://schemas.microsoft.com/office/powerpoint/2010/main" val="3699663989"/>
       </p:ext>
     </p:extLst>
   </p:cSld>
@@ -10665,7 +12654,7 @@
     </p:spTree>
     <p:extLst>
       <p:ext uri="{BB962C8B-B14F-4D97-AF65-F5344CB8AC3E}">
-        <p14:creationId xmlns:p14="http://schemas.microsoft.com/office/powerpoint/2010/main" val="4018481977"/>
+        <p14:creationId xmlns:p14="http://schemas.microsoft.com/office/powerpoint/2010/main" val="3519697008"/>
       </p:ext>
     </p:extLst>
   </p:cSld>

</xml_diff>

<commit_message>
Se realizan modificaciones en el df, para aplicar el neuralnet. A artir de ello poder avanzar en el proyecto
</commit_message>
<xml_diff>
--- a/presentación/presentaciónDosMineriaDeDatos.pptx
+++ b/presentación/presentaciónDosMineriaDeDatos.pptx
@@ -13,8 +13,8 @@
     <p:sldId id="303" r:id="rId4"/>
     <p:sldId id="317" r:id="rId5"/>
     <p:sldId id="307" r:id="rId6"/>
-    <p:sldId id="304" r:id="rId7"/>
-    <p:sldId id="312" r:id="rId8"/>
+    <p:sldId id="312" r:id="rId7"/>
+    <p:sldId id="304" r:id="rId8"/>
     <p:sldId id="311" r:id="rId9"/>
     <p:sldId id="310" r:id="rId10"/>
     <p:sldId id="309" r:id="rId11"/>
@@ -133,7 +133,7 @@
 <file path=ppt/revisionInfo.xml><?xml version="1.0" encoding="utf-8"?>
 <p1510:revInfo xmlns:a="http://schemas.openxmlformats.org/drawingml/2006/main" xmlns:r="http://schemas.openxmlformats.org/officeDocument/2006/relationships" xmlns:p1510="http://schemas.microsoft.com/office/powerpoint/2015/10/main">
   <p1510:revLst>
-    <p1510:client id="{0C7D88AA-1E6B-DAD5-588B-E8E99FD28D85}" v="2694" dt="2024-05-26T22:01:25.942"/>
+    <p1510:client id="{0C7D88AA-1E6B-DAD5-588B-E8E99FD28D85}" v="3488" dt="2024-05-26T23:01:33.101"/>
     <p1510:client id="{8CBB8C90-6B1F-4992-B562-0E68CFD0F3DC}" v="5" dt="2024-05-26T21:24:52.958"/>
   </p1510:revLst>
 </p1510:revInfo>
@@ -1920,8 +1920,8 @@
   </pc:docChgLst>
   <pc:docChgLst>
     <pc:chgData name="PEREZ VERGARA MELANY" userId="S::m.perezvergara@uandresbello.edu::d95698a7-632e-4c03-ab0f-564477513d69" providerId="AD" clId="Web-{0C7D88AA-1E6B-DAD5-588B-E8E99FD28D85}"/>
-    <pc:docChg chg="addSld modSld sldOrd">
-      <pc:chgData name="PEREZ VERGARA MELANY" userId="S::m.perezvergara@uandresbello.edu::d95698a7-632e-4c03-ab0f-564477513d69" providerId="AD" clId="Web-{0C7D88AA-1E6B-DAD5-588B-E8E99FD28D85}" dt="2024-05-26T22:01:25.911" v="1639" actId="20577"/>
+    <pc:docChg chg="addSld delSld modSld sldOrd">
+      <pc:chgData name="PEREZ VERGARA MELANY" userId="S::m.perezvergara@uandresbello.edu::d95698a7-632e-4c03-ab0f-564477513d69" providerId="AD" clId="Web-{0C7D88AA-1E6B-DAD5-588B-E8E99FD28D85}" dt="2024-05-26T23:01:33.101" v="2059" actId="1076"/>
       <pc:docMkLst>
         <pc:docMk/>
       </pc:docMkLst>
@@ -2082,26 +2082,175 @@
           </ac:spMkLst>
         </pc:spChg>
       </pc:sldChg>
-      <pc:sldChg chg="addSp modSp ord">
-        <pc:chgData name="PEREZ VERGARA MELANY" userId="S::m.perezvergara@uandresbello.edu::d95698a7-632e-4c03-ab0f-564477513d69" providerId="AD" clId="Web-{0C7D88AA-1E6B-DAD5-588B-E8E99FD28D85}" dt="2024-05-26T22:01:25.911" v="1639" actId="20577"/>
+      <pc:sldChg chg="addSp delSp modSp ord">
+        <pc:chgData name="PEREZ VERGARA MELANY" userId="S::m.perezvergara@uandresbello.edu::d95698a7-632e-4c03-ab0f-564477513d69" providerId="AD" clId="Web-{0C7D88AA-1E6B-DAD5-588B-E8E99FD28D85}" dt="2024-05-26T23:01:33.101" v="2059" actId="1076"/>
         <pc:sldMkLst>
           <pc:docMk/>
           <pc:sldMk cId="2146413309" sldId="307"/>
         </pc:sldMkLst>
         <pc:spChg chg="add mod">
-          <ac:chgData name="PEREZ VERGARA MELANY" userId="S::m.perezvergara@uandresbello.edu::d95698a7-632e-4c03-ab0f-564477513d69" providerId="AD" clId="Web-{0C7D88AA-1E6B-DAD5-588B-E8E99FD28D85}" dt="2024-05-26T22:01:25.911" v="1639" actId="20577"/>
+          <ac:chgData name="PEREZ VERGARA MELANY" userId="S::m.perezvergara@uandresbello.edu::d95698a7-632e-4c03-ab0f-564477513d69" providerId="AD" clId="Web-{0C7D88AA-1E6B-DAD5-588B-E8E99FD28D85}" dt="2024-05-26T23:00:36.067" v="2040" actId="14100"/>
           <ac:spMkLst>
             <pc:docMk/>
             <pc:sldMk cId="2146413309" sldId="307"/>
             <ac:spMk id="3" creationId="{0BAEEE35-569A-C1B1-3DE8-7187348AFB7D}"/>
           </ac:spMkLst>
         </pc:spChg>
+        <pc:spChg chg="add mod">
+          <ac:chgData name="PEREZ VERGARA MELANY" userId="S::m.perezvergara@uandresbello.edu::d95698a7-632e-4c03-ab0f-564477513d69" providerId="AD" clId="Web-{0C7D88AA-1E6B-DAD5-588B-E8E99FD28D85}" dt="2024-05-26T23:00:26.770" v="2038" actId="14100"/>
+          <ac:spMkLst>
+            <pc:docMk/>
+            <pc:sldMk cId="2146413309" sldId="307"/>
+            <ac:spMk id="4" creationId="{5B7B5083-F57A-B985-7ADB-21826FFA6E75}"/>
+          </ac:spMkLst>
+        </pc:spChg>
+        <pc:spChg chg="add mod">
+          <ac:chgData name="PEREZ VERGARA MELANY" userId="S::m.perezvergara@uandresbello.edu::d95698a7-632e-4c03-ab0f-564477513d69" providerId="AD" clId="Web-{0C7D88AA-1E6B-DAD5-588B-E8E99FD28D85}" dt="2024-05-26T23:00:23.676" v="2037" actId="14100"/>
+          <ac:spMkLst>
+            <pc:docMk/>
+            <pc:sldMk cId="2146413309" sldId="307"/>
+            <ac:spMk id="5" creationId="{63B915FF-A735-D93C-6AAE-86AF5336C87F}"/>
+          </ac:spMkLst>
+        </pc:spChg>
+        <pc:spChg chg="add mod">
+          <ac:chgData name="PEREZ VERGARA MELANY" userId="S::m.perezvergara@uandresbello.edu::d95698a7-632e-4c03-ab0f-564477513d69" providerId="AD" clId="Web-{0C7D88AA-1E6B-DAD5-588B-E8E99FD28D85}" dt="2024-05-26T22:59:27.877" v="2022" actId="20577"/>
+          <ac:spMkLst>
+            <pc:docMk/>
+            <pc:sldMk cId="2146413309" sldId="307"/>
+            <ac:spMk id="6" creationId="{C4A2F7C9-0AF4-129F-070F-6E5756021AD2}"/>
+          </ac:spMkLst>
+        </pc:spChg>
+        <pc:picChg chg="add mod">
+          <ac:chgData name="PEREZ VERGARA MELANY" userId="S::m.perezvergara@uandresbello.edu::d95698a7-632e-4c03-ab0f-564477513d69" providerId="AD" clId="Web-{0C7D88AA-1E6B-DAD5-588B-E8E99FD28D85}" dt="2024-05-26T23:01:19.428" v="2056" actId="1076"/>
+          <ac:picMkLst>
+            <pc:docMk/>
+            <pc:sldMk cId="2146413309" sldId="307"/>
+            <ac:picMk id="8" creationId="{B1A89EE9-E8D2-1219-B80A-D87D46B51C10}"/>
+          </ac:picMkLst>
+        </pc:picChg>
+        <pc:picChg chg="add del mod">
+          <ac:chgData name="PEREZ VERGARA MELANY" userId="S::m.perezvergara@uandresbello.edu::d95698a7-632e-4c03-ab0f-564477513d69" providerId="AD" clId="Web-{0C7D88AA-1E6B-DAD5-588B-E8E99FD28D85}" dt="2024-05-26T23:01:12.912" v="2053"/>
+          <ac:picMkLst>
+            <pc:docMk/>
+            <pc:sldMk cId="2146413309" sldId="307"/>
+            <ac:picMk id="9" creationId="{9F8F5E79-7C8E-8F2F-F598-06BBE131F474}"/>
+          </ac:picMkLst>
+        </pc:picChg>
+        <pc:picChg chg="add del mod">
+          <ac:chgData name="PEREZ VERGARA MELANY" userId="S::m.perezvergara@uandresbello.edu::d95698a7-632e-4c03-ab0f-564477513d69" providerId="AD" clId="Web-{0C7D88AA-1E6B-DAD5-588B-E8E99FD28D85}" dt="2024-05-26T23:01:12.131" v="2052"/>
+          <ac:picMkLst>
+            <pc:docMk/>
+            <pc:sldMk cId="2146413309" sldId="307"/>
+            <ac:picMk id="10" creationId="{4C08CF47-A4CB-E7CF-09F9-53F8CD9D9E1E}"/>
+          </ac:picMkLst>
+        </pc:picChg>
+        <pc:picChg chg="add del mod">
+          <ac:chgData name="PEREZ VERGARA MELANY" userId="S::m.perezvergara@uandresbello.edu::d95698a7-632e-4c03-ab0f-564477513d69" providerId="AD" clId="Web-{0C7D88AA-1E6B-DAD5-588B-E8E99FD28D85}" dt="2024-05-26T23:00:56.084" v="2047"/>
+          <ac:picMkLst>
+            <pc:docMk/>
+            <pc:sldMk cId="2146413309" sldId="307"/>
+            <ac:picMk id="11" creationId="{536E4126-7476-84B8-E1E0-C935CF7650A3}"/>
+          </ac:picMkLst>
+        </pc:picChg>
+        <pc:picChg chg="add mod">
+          <ac:chgData name="PEREZ VERGARA MELANY" userId="S::m.perezvergara@uandresbello.edu::d95698a7-632e-4c03-ab0f-564477513d69" providerId="AD" clId="Web-{0C7D88AA-1E6B-DAD5-588B-E8E99FD28D85}" dt="2024-05-26T23:01:29.710" v="2057"/>
+          <ac:picMkLst>
+            <pc:docMk/>
+            <pc:sldMk cId="2146413309" sldId="307"/>
+            <ac:picMk id="12" creationId="{358731CA-9DDB-8429-7152-EF2F915F03A6}"/>
+          </ac:picMkLst>
+        </pc:picChg>
+        <pc:picChg chg="add mod">
+          <ac:chgData name="PEREZ VERGARA MELANY" userId="S::m.perezvergara@uandresbello.edu::d95698a7-632e-4c03-ab0f-564477513d69" providerId="AD" clId="Web-{0C7D88AA-1E6B-DAD5-588B-E8E99FD28D85}" dt="2024-05-26T23:01:33.101" v="2059" actId="1076"/>
+          <ac:picMkLst>
+            <pc:docMk/>
+            <pc:sldMk cId="2146413309" sldId="307"/>
+            <ac:picMk id="13" creationId="{B2E51727-3148-CD7B-EDE9-2BA4043B24B7}"/>
+          </ac:picMkLst>
+        </pc:picChg>
       </pc:sldChg>
-      <pc:sldChg chg="add ord replId">
-        <pc:chgData name="PEREZ VERGARA MELANY" userId="S::m.perezvergara@uandresbello.edu::d95698a7-632e-4c03-ab0f-564477513d69" providerId="AD" clId="Web-{0C7D88AA-1E6B-DAD5-588B-E8E99FD28D85}" dt="2024-05-26T20:58:09.266" v="486"/>
+      <pc:sldChg chg="addSp delSp modSp">
+        <pc:chgData name="PEREZ VERGARA MELANY" userId="S::m.perezvergara@uandresbello.edu::d95698a7-632e-4c03-ab0f-564477513d69" providerId="AD" clId="Web-{0C7D88AA-1E6B-DAD5-588B-E8E99FD28D85}" dt="2024-05-26T22:59:18.299" v="2020"/>
+        <pc:sldMkLst>
+          <pc:docMk/>
+          <pc:sldMk cId="3699663989" sldId="311"/>
+        </pc:sldMkLst>
+        <pc:spChg chg="add">
+          <ac:chgData name="PEREZ VERGARA MELANY" userId="S::m.perezvergara@uandresbello.edu::d95698a7-632e-4c03-ab0f-564477513d69" providerId="AD" clId="Web-{0C7D88AA-1E6B-DAD5-588B-E8E99FD28D85}" dt="2024-05-26T22:58:35.984" v="2007"/>
+          <ac:spMkLst>
+            <pc:docMk/>
+            <pc:sldMk cId="3699663989" sldId="311"/>
+            <ac:spMk id="4" creationId="{71226EC2-9380-CB10-DF4C-32CCBC68E4D3}"/>
+          </ac:spMkLst>
+        </pc:spChg>
+        <pc:picChg chg="add del mod">
+          <ac:chgData name="PEREZ VERGARA MELANY" userId="S::m.perezvergara@uandresbello.edu::d95698a7-632e-4c03-ab0f-564477513d69" providerId="AD" clId="Web-{0C7D88AA-1E6B-DAD5-588B-E8E99FD28D85}" dt="2024-05-26T22:59:18.299" v="2020"/>
+          <ac:picMkLst>
+            <pc:docMk/>
+            <pc:sldMk cId="3699663989" sldId="311"/>
+            <ac:picMk id="5" creationId="{3AE5E017-3F3C-C296-E208-02AE7E1439A2}"/>
+          </ac:picMkLst>
+        </pc:picChg>
+        <pc:picChg chg="add del mod">
+          <ac:chgData name="PEREZ VERGARA MELANY" userId="S::m.perezvergara@uandresbello.edu::d95698a7-632e-4c03-ab0f-564477513d69" providerId="AD" clId="Web-{0C7D88AA-1E6B-DAD5-588B-E8E99FD28D85}" dt="2024-05-26T22:59:18.299" v="2019"/>
+          <ac:picMkLst>
+            <pc:docMk/>
+            <pc:sldMk cId="3699663989" sldId="311"/>
+            <ac:picMk id="6" creationId="{33B2EF7C-6296-D1A4-67A9-DD38D7506D12}"/>
+          </ac:picMkLst>
+        </pc:picChg>
+        <pc:picChg chg="add del mod">
+          <ac:chgData name="PEREZ VERGARA MELANY" userId="S::m.perezvergara@uandresbello.edu::d95698a7-632e-4c03-ab0f-564477513d69" providerId="AD" clId="Web-{0C7D88AA-1E6B-DAD5-588B-E8E99FD28D85}" dt="2024-05-26T22:59:18.299" v="2018"/>
+          <ac:picMkLst>
+            <pc:docMk/>
+            <pc:sldMk cId="3699663989" sldId="311"/>
+            <ac:picMk id="8" creationId="{F4ABB164-2093-0243-7331-B951E79F9F2C}"/>
+          </ac:picMkLst>
+        </pc:picChg>
+      </pc:sldChg>
+      <pc:sldChg chg="addSp delSp modSp ord">
+        <pc:chgData name="PEREZ VERGARA MELANY" userId="S::m.perezvergara@uandresbello.edu::d95698a7-632e-4c03-ab0f-564477513d69" providerId="AD" clId="Web-{0C7D88AA-1E6B-DAD5-588B-E8E99FD28D85}" dt="2024-05-26T22:38:52.033" v="2004"/>
+        <pc:sldMkLst>
+          <pc:docMk/>
+          <pc:sldMk cId="2361542432" sldId="312"/>
+        </pc:sldMkLst>
+        <pc:spChg chg="add del mod">
+          <ac:chgData name="PEREZ VERGARA MELANY" userId="S::m.perezvergara@uandresbello.edu::d95698a7-632e-4c03-ab0f-564477513d69" providerId="AD" clId="Web-{0C7D88AA-1E6B-DAD5-588B-E8E99FD28D85}" dt="2024-05-26T22:38:40.580" v="2002"/>
+          <ac:spMkLst>
+            <pc:docMk/>
+            <pc:sldMk cId="2361542432" sldId="312"/>
+            <ac:spMk id="3" creationId="{EC757A01-89A9-D4E9-171D-F0CCC5E23239}"/>
+          </ac:spMkLst>
+        </pc:spChg>
+        <pc:spChg chg="add mod">
+          <ac:chgData name="PEREZ VERGARA MELANY" userId="S::m.perezvergara@uandresbello.edu::d95698a7-632e-4c03-ab0f-564477513d69" providerId="AD" clId="Web-{0C7D88AA-1E6B-DAD5-588B-E8E99FD28D85}" dt="2024-05-26T22:38:44.549" v="2003" actId="14100"/>
+          <ac:spMkLst>
+            <pc:docMk/>
+            <pc:sldMk cId="2361542432" sldId="312"/>
+            <ac:spMk id="4" creationId="{2484D71F-6E0D-7556-D02A-80D20B19BFE9}"/>
+          </ac:spMkLst>
+        </pc:spChg>
+      </pc:sldChg>
+      <pc:sldChg chg="modSp add ord replId">
+        <pc:chgData name="PEREZ VERGARA MELANY" userId="S::m.perezvergara@uandresbello.edu::d95698a7-632e-4c03-ab0f-564477513d69" providerId="AD" clId="Web-{0C7D88AA-1E6B-DAD5-588B-E8E99FD28D85}" dt="2024-05-26T22:56:57.012" v="2006" actId="20577"/>
         <pc:sldMkLst>
           <pc:docMk/>
           <pc:sldMk cId="923601911" sldId="317"/>
+        </pc:sldMkLst>
+        <pc:spChg chg="mod">
+          <ac:chgData name="PEREZ VERGARA MELANY" userId="S::m.perezvergara@uandresbello.edu::d95698a7-632e-4c03-ab0f-564477513d69" providerId="AD" clId="Web-{0C7D88AA-1E6B-DAD5-588B-E8E99FD28D85}" dt="2024-05-26T22:56:57.012" v="2006" actId="20577"/>
+          <ac:spMkLst>
+            <pc:docMk/>
+            <pc:sldMk cId="923601911" sldId="317"/>
+            <ac:spMk id="3" creationId="{23480A74-8042-3918-FB57-0ABA427747B4}"/>
+          </ac:spMkLst>
+        </pc:spChg>
+      </pc:sldChg>
+      <pc:sldChg chg="add del replId">
+        <pc:chgData name="PEREZ VERGARA MELANY" userId="S::m.perezvergara@uandresbello.edu::d95698a7-632e-4c03-ab0f-564477513d69" providerId="AD" clId="Web-{0C7D88AA-1E6B-DAD5-588B-E8E99FD28D85}" dt="2024-05-26T22:29:02.792" v="1808"/>
+        <pc:sldMkLst>
+          <pc:docMk/>
+          <pc:sldMk cId="119170407" sldId="318"/>
         </pc:sldMkLst>
       </pc:sldChg>
     </pc:docChg>
@@ -3485,7 +3634,7 @@
           <a:p>
             <a:fld id="{80AD1966-643A-ED45-BFF9-B0FE18A32E2B}" type="slidenum">
               <a:rPr lang="es-ES_tradnl" smtClean="0"/>
-              <a:t>‹Nº›</a:t>
+              <a:t>‹#›</a:t>
             </a:fld>
             <a:endParaRPr lang="es-ES_tradnl"/>
           </a:p>
@@ -4672,18 +4821,7 @@
           <a:bodyPr/>
           <a:lstStyle/>
           <a:p>
-            <a:r>
-              <a:rPr lang="es-ES_tradnl"/>
-              <a:t>Primer mach con las conclusiones anteriores, de preferencia mostrar aquí lo </a:t>
-            </a:r>
-            <a:r>
-              <a:rPr lang="es-ES_tradnl" err="1"/>
-              <a:t>faaltante</a:t>
-            </a:r>
-            <a:r>
-              <a:rPr lang="es-ES_tradnl"/>
-              <a:t> de la presentación 1 (LA REGRESION LINEAL)</a:t>
-            </a:r>
+            <a:endParaRPr lang="es-ES_tradnl"/>
           </a:p>
         </p:txBody>
       </p:sp>
@@ -4704,7 +4842,7 @@
           <a:p>
             <a:fld id="{80AD1966-643A-ED45-BFF9-B0FE18A32E2B}" type="slidenum">
               <a:rPr lang="es-ES_tradnl" smtClean="0"/>
-              <a:t>6</a:t>
+              <a:t>7</a:t>
             </a:fld>
             <a:endParaRPr lang="es-ES_tradnl"/>
           </a:p>
@@ -4713,7 +4851,7 @@
     </p:spTree>
     <p:extLst>
       <p:ext uri="{BB962C8B-B14F-4D97-AF65-F5344CB8AC3E}">
-        <p14:creationId xmlns:p14="http://schemas.microsoft.com/office/powerpoint/2010/main" val="1915245970"/>
+        <p14:creationId xmlns:p14="http://schemas.microsoft.com/office/powerpoint/2010/main" val="3081660808"/>
       </p:ext>
     </p:extLst>
   </p:cSld>
@@ -4767,7 +4905,18 @@
           <a:bodyPr/>
           <a:lstStyle/>
           <a:p>
-            <a:endParaRPr lang="es-ES_tradnl"/>
+            <a:r>
+              <a:rPr lang="es-ES_tradnl"/>
+              <a:t>Primer mach con las conclusiones anteriores, de preferencia mostrar aquí lo </a:t>
+            </a:r>
+            <a:r>
+              <a:rPr lang="es-ES_tradnl" err="1"/>
+              <a:t>faaltante</a:t>
+            </a:r>
+            <a:r>
+              <a:rPr lang="es-ES_tradnl"/>
+              <a:t> de la presentación 1 (LA REGRESION LINEAL)</a:t>
+            </a:r>
           </a:p>
         </p:txBody>
       </p:sp>
@@ -4788,7 +4937,7 @@
           <a:p>
             <a:fld id="{80AD1966-643A-ED45-BFF9-B0FE18A32E2B}" type="slidenum">
               <a:rPr lang="es-ES_tradnl" smtClean="0"/>
-              <a:t>7</a:t>
+              <a:t>6</a:t>
             </a:fld>
             <a:endParaRPr lang="es-ES_tradnl"/>
           </a:p>
@@ -4797,7 +4946,7 @@
     </p:spTree>
     <p:extLst>
       <p:ext uri="{BB962C8B-B14F-4D97-AF65-F5344CB8AC3E}">
-        <p14:creationId xmlns:p14="http://schemas.microsoft.com/office/powerpoint/2010/main" val="3081660808"/>
+        <p14:creationId xmlns:p14="http://schemas.microsoft.com/office/powerpoint/2010/main" val="1915245970"/>
       </p:ext>
     </p:extLst>
   </p:cSld>
@@ -5148,7 +5297,7 @@
           <a:p>
             <a:fld id="{3352F6F5-E16D-F340-A90C-ABCF032D59B6}" type="slidenum">
               <a:rPr lang="es-ES_tradnl" smtClean="0"/>
-              <a:t>‹Nº›</a:t>
+              <a:t>‹#›</a:t>
             </a:fld>
             <a:endParaRPr lang="es-ES_tradnl"/>
           </a:p>
@@ -5313,7 +5462,7 @@
           <a:p>
             <a:fld id="{3352F6F5-E16D-F340-A90C-ABCF032D59B6}" type="slidenum">
               <a:rPr lang="es-ES_tradnl" smtClean="0"/>
-              <a:t>‹Nº›</a:t>
+              <a:t>‹#›</a:t>
             </a:fld>
             <a:endParaRPr lang="es-ES_tradnl"/>
           </a:p>
@@ -5488,7 +5637,7 @@
           <a:p>
             <a:fld id="{3352F6F5-E16D-F340-A90C-ABCF032D59B6}" type="slidenum">
               <a:rPr lang="es-ES_tradnl" smtClean="0"/>
-              <a:t>‹Nº›</a:t>
+              <a:t>‹#›</a:t>
             </a:fld>
             <a:endParaRPr lang="es-ES_tradnl"/>
           </a:p>
@@ -5653,7 +5802,7 @@
           <a:p>
             <a:fld id="{3352F6F5-E16D-F340-A90C-ABCF032D59B6}" type="slidenum">
               <a:rPr lang="es-ES_tradnl" smtClean="0"/>
-              <a:t>‹Nº›</a:t>
+              <a:t>‹#›</a:t>
             </a:fld>
             <a:endParaRPr lang="es-ES_tradnl"/>
           </a:p>
@@ -5892,7 +6041,7 @@
           <a:p>
             <a:fld id="{3352F6F5-E16D-F340-A90C-ABCF032D59B6}" type="slidenum">
               <a:rPr lang="es-ES_tradnl" smtClean="0"/>
-              <a:t>‹Nº›</a:t>
+              <a:t>‹#›</a:t>
             </a:fld>
             <a:endParaRPr lang="es-ES_tradnl"/>
           </a:p>
@@ -6119,7 +6268,7 @@
           <a:p>
             <a:fld id="{3352F6F5-E16D-F340-A90C-ABCF032D59B6}" type="slidenum">
               <a:rPr lang="es-ES_tradnl" smtClean="0"/>
-              <a:t>‹Nº›</a:t>
+              <a:t>‹#›</a:t>
             </a:fld>
             <a:endParaRPr lang="es-ES_tradnl"/>
           </a:p>
@@ -6481,7 +6630,7 @@
           <a:p>
             <a:fld id="{3352F6F5-E16D-F340-A90C-ABCF032D59B6}" type="slidenum">
               <a:rPr lang="es-ES_tradnl" smtClean="0"/>
-              <a:t>‹Nº›</a:t>
+              <a:t>‹#›</a:t>
             </a:fld>
             <a:endParaRPr lang="es-ES_tradnl"/>
           </a:p>
@@ -6594,7 +6743,7 @@
           <a:p>
             <a:fld id="{3352F6F5-E16D-F340-A90C-ABCF032D59B6}" type="slidenum">
               <a:rPr lang="es-ES_tradnl" smtClean="0"/>
-              <a:t>‹Nº›</a:t>
+              <a:t>‹#›</a:t>
             </a:fld>
             <a:endParaRPr lang="es-ES_tradnl"/>
           </a:p>
@@ -6684,7 +6833,7 @@
           <a:p>
             <a:fld id="{3352F6F5-E16D-F340-A90C-ABCF032D59B6}" type="slidenum">
               <a:rPr lang="es-ES_tradnl" smtClean="0"/>
-              <a:t>‹Nº›</a:t>
+              <a:t>‹#›</a:t>
             </a:fld>
             <a:endParaRPr lang="es-ES_tradnl"/>
           </a:p>
@@ -6956,7 +7105,7 @@
           <a:p>
             <a:fld id="{3352F6F5-E16D-F340-A90C-ABCF032D59B6}" type="slidenum">
               <a:rPr lang="es-ES_tradnl" smtClean="0"/>
-              <a:t>‹Nº›</a:t>
+              <a:t>‹#›</a:t>
             </a:fld>
             <a:endParaRPr lang="es-ES_tradnl"/>
           </a:p>
@@ -7208,7 +7357,7 @@
           <a:p>
             <a:fld id="{3352F6F5-E16D-F340-A90C-ABCF032D59B6}" type="slidenum">
               <a:rPr lang="es-ES_tradnl" smtClean="0"/>
-              <a:t>‹Nº›</a:t>
+              <a:t>‹#›</a:t>
             </a:fld>
             <a:endParaRPr lang="es-ES_tradnl"/>
           </a:p>
@@ -7452,7 +7601,7 @@
           <a:p>
             <a:fld id="{3352F6F5-E16D-F340-A90C-ABCF032D59B6}" type="slidenum">
               <a:rPr lang="es-ES_tradnl" smtClean="0"/>
-              <a:t>‹Nº›</a:t>
+              <a:t>‹#›</a:t>
             </a:fld>
             <a:endParaRPr lang="es-ES_tradnl"/>
           </a:p>
@@ -11570,7 +11719,7 @@
           <a:lstStyle/>
           <a:p>
             <a:r>
-              <a:rPr lang="es-CL" sz="2400">
+              <a:rPr lang="es-CL" sz="2400" dirty="0">
                 <a:solidFill>
                   <a:srgbClr val="19202E"/>
                 </a:solidFill>
@@ -11578,32 +11727,10 @@
                 <a:ea typeface="Calibri"/>
                 <a:cs typeface="Segoe UI"/>
               </a:rPr>
-              <a:t>Es una </a:t>
-            </a:r>
-            <a:r>
-              <a:rPr lang="es-CL" sz="2400" err="1">
-                <a:solidFill>
-                  <a:srgbClr val="19202E"/>
-                </a:solidFill>
-                <a:latin typeface="Segoe UI"/>
-                <a:ea typeface="Calibri"/>
-                <a:cs typeface="Segoe UI"/>
-              </a:rPr>
-              <a:t>tecnica</a:t>
-            </a:r>
-            <a:r>
-              <a:rPr lang="es-CL" sz="2400">
-                <a:solidFill>
-                  <a:srgbClr val="19202E"/>
-                </a:solidFill>
-                <a:latin typeface="Segoe UI"/>
-                <a:ea typeface="Calibri"/>
-                <a:cs typeface="Segoe UI"/>
-              </a:rPr>
-              <a:t> aplicada en la rama del Machine </a:t>
-            </a:r>
-            <a:r>
-              <a:rPr lang="es-CL" sz="2400" err="1">
+              <a:t>Es una técnica aplicada en la rama del Machine </a:t>
+            </a:r>
+            <a:r>
+              <a:rPr lang="es-CL" sz="2400" dirty="0" err="1">
                 <a:solidFill>
                   <a:srgbClr val="19202E"/>
                 </a:solidFill>
@@ -11614,7 +11741,7 @@
               <a:t>Learning</a:t>
             </a:r>
             <a:r>
-              <a:rPr lang="es-CL" sz="2400">
+              <a:rPr lang="es-CL" sz="2400" dirty="0">
                 <a:solidFill>
                   <a:srgbClr val="19202E"/>
                 </a:solidFill>
@@ -11625,7 +11752,7 @@
               <a:t> en la que se aplican el uso de algoritmos definiendo que debe o no aprender en una serie de datos etiquetados </a:t>
             </a:r>
             <a:r>
-              <a:rPr lang="es-CL" sz="2400" err="1">
+              <a:rPr lang="es-CL" sz="2400" dirty="0" err="1">
                 <a:solidFill>
                   <a:srgbClr val="19202E"/>
                 </a:solidFill>
@@ -11636,7 +11763,7 @@
               <a:t>tambien</a:t>
             </a:r>
             <a:r>
-              <a:rPr lang="es-CL" sz="2400">
+              <a:rPr lang="es-CL" sz="2400" dirty="0">
                 <a:solidFill>
                   <a:srgbClr val="19202E"/>
                 </a:solidFill>
@@ -11647,7 +11774,7 @@
               <a:t> llamados conjunto de entrenamiento que permiten definir una </a:t>
             </a:r>
             <a:r>
-              <a:rPr lang="es-CL" sz="2400" err="1">
+              <a:rPr lang="es-CL" sz="2400" dirty="0" err="1">
                 <a:solidFill>
                   <a:srgbClr val="19202E"/>
                 </a:solidFill>
@@ -11658,7 +11785,7 @@
               <a:t>funcion</a:t>
             </a:r>
             <a:r>
-              <a:rPr lang="es-CL" sz="2400">
+              <a:rPr lang="es-CL" sz="2400" dirty="0">
                 <a:solidFill>
                   <a:srgbClr val="19202E"/>
                 </a:solidFill>
@@ -11669,7 +11796,7 @@
               <a:t> predictiva y enseñar al modelo a predecir los resultados con </a:t>
             </a:r>
             <a:r>
-              <a:rPr lang="es-CL" sz="2400" err="1">
+              <a:rPr lang="es-CL" sz="2400" dirty="0" err="1">
                 <a:solidFill>
                   <a:srgbClr val="19202E"/>
                 </a:solidFill>
@@ -11680,7 +11807,7 @@
               <a:t>precision</a:t>
             </a:r>
             <a:r>
-              <a:rPr lang="es-CL" sz="2400">
+              <a:rPr lang="es-CL" sz="2400" dirty="0">
                 <a:solidFill>
                   <a:srgbClr val="19202E"/>
                 </a:solidFill>
@@ -11936,8 +12063,8 @@
         </p:nvSpPr>
         <p:spPr>
           <a:xfrm>
-            <a:off x="973101" y="1083913"/>
-            <a:ext cx="6846427" cy="3785652"/>
+            <a:off x="-4559" y="810743"/>
+            <a:ext cx="3007672" cy="5234225"/>
           </a:xfrm>
           <a:prstGeom prst="rect">
             <a:avLst/>
@@ -12047,8 +12174,12 @@
             </a:lvl9pPr>
           </a:lstStyle>
           <a:p>
-            <a:r>
-              <a:rPr lang="es-CL" sz="2400">
+            <a:pPr marL="342900" indent="-342900">
+              <a:buFont typeface="Arial"/>
+              <a:buChar char="•"/>
+            </a:pPr>
+            <a:r>
+              <a:rPr lang="es-CL" sz="2400" b="1" dirty="0">
                 <a:solidFill>
                   <a:srgbClr val="19202E"/>
                 </a:solidFill>
@@ -12056,11 +12187,56 @@
                 <a:ea typeface="Calibri"/>
                 <a:cs typeface="Segoe UI"/>
               </a:rPr>
-              <a:t>En el caso de estudio presente trabajamos un modelo de Regresión lineal, para el cual aplicamos los siguientes algoritmos:</a:t>
-            </a:r>
-          </a:p>
-          <a:p>
-            <a:endParaRPr lang="es-CL" sz="2400">
+              <a:t>Regresión lineal </a:t>
+            </a:r>
+            <a:r>
+              <a:rPr lang="es-CL" sz="2400" b="1" err="1">
+                <a:solidFill>
+                  <a:srgbClr val="19202E"/>
+                </a:solidFill>
+                <a:latin typeface="Segoe UI"/>
+                <a:ea typeface="Calibri"/>
+                <a:cs typeface="Segoe UI"/>
+              </a:rPr>
+              <a:t>multiple</a:t>
+            </a:r>
+            <a:r>
+              <a:rPr lang="es-CL" sz="2400" dirty="0">
+                <a:solidFill>
+                  <a:srgbClr val="19202E"/>
+                </a:solidFill>
+                <a:latin typeface="Segoe UI"/>
+                <a:ea typeface="Calibri"/>
+                <a:cs typeface="Segoe UI"/>
+              </a:rPr>
+              <a:t>: Modela la relación entre una variable dependiente y una o mas independientes mediante una </a:t>
+            </a:r>
+            <a:r>
+              <a:rPr lang="es-CL" sz="2400" err="1">
+                <a:solidFill>
+                  <a:srgbClr val="19202E"/>
+                </a:solidFill>
+                <a:latin typeface="Segoe UI"/>
+                <a:ea typeface="Calibri"/>
+                <a:cs typeface="Segoe UI"/>
+              </a:rPr>
+              <a:t>linea</a:t>
+            </a:r>
+            <a:r>
+              <a:rPr lang="es-CL" sz="2400" dirty="0">
+                <a:solidFill>
+                  <a:srgbClr val="19202E"/>
+                </a:solidFill>
+                <a:latin typeface="Segoe UI"/>
+                <a:ea typeface="Calibri"/>
+                <a:cs typeface="Segoe UI"/>
+              </a:rPr>
+              <a:t> recta, permite predecir valores continuos basado en datos observados. </a:t>
+            </a:r>
+            <a:endParaRPr lang="en-US"/>
+          </a:p>
+          <a:p>
+            <a:endParaRPr lang="es-CL" sz="2400" dirty="0">
               <a:solidFill>
                 <a:srgbClr val="19202E"/>
               </a:solidFill>
@@ -12069,80 +12245,422 @@
               <a:cs typeface="Segoe UI"/>
             </a:endParaRPr>
           </a:p>
-          <a:p>
-            <a:r>
-              <a:rPr lang="es-CL" sz="2400">
+        </p:txBody>
+      </p:sp>
+      <p:sp>
+        <p:nvSpPr>
+          <p:cNvPr id="4" name="TextBox 3">
+            <a:extLst>
+              <a:ext uri="{FF2B5EF4-FFF2-40B4-BE49-F238E27FC236}">
+                <a16:creationId xmlns:a16="http://schemas.microsoft.com/office/drawing/2014/main" id="{5B7B5083-F57A-B985-7ADB-21826FFA6E75}"/>
+              </a:ext>
+            </a:extLst>
+          </p:cNvPr>
+          <p:cNvSpPr txBox="1"/>
+          <p:nvPr/>
+        </p:nvSpPr>
+        <p:spPr>
+          <a:xfrm>
+            <a:off x="2797834" y="813759"/>
+            <a:ext cx="3217652" cy="4524315"/>
+          </a:xfrm>
+          <a:prstGeom prst="rect">
+            <a:avLst/>
+          </a:prstGeom>
+          <a:noFill/>
+        </p:spPr>
+        <p:txBody>
+          <a:bodyPr rot="0" spcFirstLastPara="0" vertOverflow="overflow" horzOverflow="overflow" vert="horz" wrap="square" lIns="91440" tIns="45720" rIns="91440" bIns="45720" numCol="1" spcCol="0" rtlCol="0" fromWordArt="0" anchor="t" anchorCtr="0" forceAA="0" compatLnSpc="1">
+            <a:prstTxWarp prst="textNoShape">
+              <a:avLst/>
+            </a:prstTxWarp>
+            <a:spAutoFit/>
+          </a:bodyPr>
+          <a:lstStyle/>
+          <a:p>
+            <a:pPr marL="342900" indent="-342900">
+              <a:buFont typeface="Arial"/>
+              <a:buChar char="•"/>
+            </a:pPr>
+            <a:r>
+              <a:rPr lang="es-CL" sz="2400" b="1" dirty="0" err="1">
                 <a:solidFill>
                   <a:srgbClr val="19202E"/>
                 </a:solidFill>
                 <a:latin typeface="Segoe UI"/>
-                <a:ea typeface="Calibri"/>
-                <a:cs typeface="Segoe UI"/>
-              </a:rPr>
-              <a:t>Regresión lineal </a:t>
-            </a:r>
-            <a:r>
-              <a:rPr lang="es-CL" sz="2400" err="1">
-                <a:solidFill>
-                  <a:srgbClr val="19202E"/>
-                </a:solidFill>
-                <a:latin typeface="Segoe UI"/>
-                <a:ea typeface="Calibri"/>
-                <a:cs typeface="Segoe UI"/>
-              </a:rPr>
-              <a:t>multiple</a:t>
-            </a:r>
-            <a:r>
-              <a:rPr lang="es-CL" sz="2400">
-                <a:solidFill>
-                  <a:srgbClr val="19202E"/>
-                </a:solidFill>
-                <a:latin typeface="Segoe UI"/>
-                <a:ea typeface="Calibri"/>
-                <a:cs typeface="Segoe UI"/>
-              </a:rPr>
-              <a:t>: Modela la relación entre una variable dependiente y una o mas independientes mediante una linea recta, permite </a:t>
-            </a:r>
-          </a:p>
-          <a:p>
-            <a:r>
-              <a:rPr lang="es-CL" sz="2400" err="1">
-                <a:solidFill>
-                  <a:srgbClr val="19202E"/>
-                </a:solidFill>
-                <a:latin typeface="Segoe UI"/>
-                <a:ea typeface="Calibri"/>
-                <a:cs typeface="Segoe UI"/>
               </a:rPr>
               <a:t>Arbol</a:t>
             </a:r>
             <a:r>
-              <a:rPr lang="es-CL" sz="2400">
+              <a:rPr lang="es-CL" sz="2400" b="1" dirty="0">
                 <a:solidFill>
                   <a:srgbClr val="19202E"/>
                 </a:solidFill>
                 <a:latin typeface="Segoe UI"/>
-                <a:ea typeface="Calibri"/>
-                <a:cs typeface="Segoe UI"/>
               </a:rPr>
-              <a:t> de decisón:</a:t>
-            </a:r>
-          </a:p>
-          <a:p>
-            <a:r>
-              <a:rPr lang="es-CL" sz="2400">
+              <a:t> de </a:t>
+            </a:r>
+            <a:r>
+              <a:rPr lang="es-CL" sz="2400" b="1" dirty="0" err="1">
                 <a:solidFill>
                   <a:srgbClr val="19202E"/>
                 </a:solidFill>
                 <a:latin typeface="Segoe UI"/>
-                <a:ea typeface="Calibri"/>
-                <a:cs typeface="Segoe UI"/>
               </a:rPr>
-              <a:t>Redes Neuronales:</a:t>
-            </a:r>
+              <a:t>decisón</a:t>
+            </a:r>
+            <a:r>
+              <a:rPr lang="es-CL" sz="2400" b="1" dirty="0">
+                <a:solidFill>
+                  <a:srgbClr val="19202E"/>
+                </a:solidFill>
+                <a:latin typeface="Segoe UI"/>
+              </a:rPr>
+              <a:t>:</a:t>
+            </a:r>
+            <a:r>
+              <a:rPr lang="es-CL" sz="2400" dirty="0">
+                <a:solidFill>
+                  <a:srgbClr val="19202E"/>
+                </a:solidFill>
+                <a:latin typeface="Segoe UI"/>
+              </a:rPr>
+              <a:t> modelo no paramétrico con estructura en forma de </a:t>
+            </a:r>
+            <a:r>
+              <a:rPr lang="es-CL" sz="2400" dirty="0" err="1">
+                <a:solidFill>
+                  <a:srgbClr val="19202E"/>
+                </a:solidFill>
+                <a:latin typeface="Segoe UI"/>
+              </a:rPr>
+              <a:t>arbol</a:t>
+            </a:r>
+            <a:r>
+              <a:rPr lang="es-CL" sz="2400" dirty="0">
+                <a:solidFill>
+                  <a:srgbClr val="19202E"/>
+                </a:solidFill>
+                <a:latin typeface="Segoe UI"/>
+              </a:rPr>
+              <a:t> </a:t>
+            </a:r>
+            <a:r>
+              <a:rPr lang="es-CL" sz="2400" dirty="0" err="1">
+                <a:solidFill>
+                  <a:srgbClr val="19202E"/>
+                </a:solidFill>
+                <a:latin typeface="Segoe UI"/>
+              </a:rPr>
+              <a:t>qudonde</a:t>
+            </a:r>
+            <a:r>
+              <a:rPr lang="es-CL" sz="2400" dirty="0">
+                <a:solidFill>
+                  <a:srgbClr val="19202E"/>
+                </a:solidFill>
+                <a:latin typeface="Segoe UI"/>
+              </a:rPr>
+              <a:t> se crean reglas de </a:t>
+            </a:r>
+            <a:r>
+              <a:rPr lang="es-CL" sz="2400" dirty="0" err="1">
+                <a:solidFill>
+                  <a:srgbClr val="19202E"/>
+                </a:solidFill>
+                <a:latin typeface="Segoe UI"/>
+              </a:rPr>
+              <a:t>decision</a:t>
+            </a:r>
+            <a:r>
+              <a:rPr lang="es-CL" sz="2400" dirty="0">
+                <a:solidFill>
+                  <a:srgbClr val="19202E"/>
+                </a:solidFill>
+                <a:latin typeface="Segoe UI"/>
+              </a:rPr>
+              <a:t> y clasifica o predice valores a partir de datos mediante la </a:t>
+            </a:r>
+            <a:r>
+              <a:rPr lang="es-CL" sz="2400" dirty="0" err="1">
+                <a:solidFill>
+                  <a:srgbClr val="19202E"/>
+                </a:solidFill>
+                <a:latin typeface="Segoe UI"/>
+              </a:rPr>
+              <a:t>division</a:t>
+            </a:r>
+            <a:r>
+              <a:rPr lang="es-CL" sz="2400" dirty="0">
+                <a:solidFill>
+                  <a:srgbClr val="19202E"/>
+                </a:solidFill>
+                <a:latin typeface="Segoe UI"/>
+              </a:rPr>
+              <a:t> recursiva del </a:t>
+            </a:r>
+            <a:r>
+              <a:rPr lang="es-CL" sz="2400" dirty="0" err="1">
+                <a:solidFill>
+                  <a:srgbClr val="19202E"/>
+                </a:solidFill>
+                <a:latin typeface="Segoe UI"/>
+              </a:rPr>
+              <a:t>cojunto</a:t>
+            </a:r>
+            <a:r>
+              <a:rPr lang="es-CL" sz="2400" dirty="0">
+                <a:solidFill>
+                  <a:srgbClr val="19202E"/>
+                </a:solidFill>
+                <a:latin typeface="Segoe UI"/>
+              </a:rPr>
+              <a:t>.</a:t>
+            </a:r>
+            <a:endParaRPr lang="en-US" dirty="0">
+              <a:cs typeface="Calibri" panose="020F0502020204030204"/>
+            </a:endParaRPr>
           </a:p>
         </p:txBody>
       </p:sp>
+      <p:sp>
+        <p:nvSpPr>
+          <p:cNvPr id="5" name="TextBox 4">
+            <a:extLst>
+              <a:ext uri="{FF2B5EF4-FFF2-40B4-BE49-F238E27FC236}">
+                <a16:creationId xmlns:a16="http://schemas.microsoft.com/office/drawing/2014/main" id="{63B915FF-A735-D93C-6AAE-86AF5336C87F}"/>
+              </a:ext>
+            </a:extLst>
+          </p:cNvPr>
+          <p:cNvSpPr txBox="1"/>
+          <p:nvPr/>
+        </p:nvSpPr>
+        <p:spPr>
+          <a:xfrm>
+            <a:off x="6162136" y="799381"/>
+            <a:ext cx="2987615" cy="5228156"/>
+          </a:xfrm>
+          <a:prstGeom prst="rect">
+            <a:avLst/>
+          </a:prstGeom>
+          <a:noFill/>
+        </p:spPr>
+        <p:txBody>
+          <a:bodyPr rot="0" spcFirstLastPara="0" vertOverflow="overflow" horzOverflow="overflow" vert="horz" wrap="square" lIns="91440" tIns="45720" rIns="91440" bIns="45720" numCol="1" spcCol="0" rtlCol="0" fromWordArt="0" anchor="t" anchorCtr="0" forceAA="0" compatLnSpc="1">
+            <a:prstTxWarp prst="textNoShape">
+              <a:avLst/>
+            </a:prstTxWarp>
+            <a:spAutoFit/>
+          </a:bodyPr>
+          <a:lstStyle/>
+          <a:p>
+            <a:r>
+              <a:rPr lang="es-CL" sz="2400" b="1" dirty="0">
+                <a:solidFill>
+                  <a:srgbClr val="19202E"/>
+                </a:solidFill>
+                <a:latin typeface="Segoe UI"/>
+              </a:rPr>
+              <a:t>Redes Neuronales: </a:t>
+            </a:r>
+            <a:r>
+              <a:rPr lang="es-CL" sz="2400" dirty="0">
+                <a:solidFill>
+                  <a:srgbClr val="19202E"/>
+                </a:solidFill>
+                <a:latin typeface="Segoe UI"/>
+              </a:rPr>
+              <a:t>Modelo de Aprendizaje </a:t>
+            </a:r>
+            <a:r>
+              <a:rPr lang="es-CL" sz="2400" dirty="0" err="1">
+                <a:solidFill>
+                  <a:srgbClr val="19202E"/>
+                </a:solidFill>
+                <a:latin typeface="Segoe UI"/>
+              </a:rPr>
+              <a:t>automatico</a:t>
+            </a:r>
+            <a:r>
+              <a:rPr lang="es-CL" sz="2400" dirty="0">
+                <a:solidFill>
+                  <a:srgbClr val="19202E"/>
+                </a:solidFill>
+                <a:latin typeface="Segoe UI"/>
+              </a:rPr>
+              <a:t> que imita el funcionamiento </a:t>
+            </a:r>
+            <a:r>
+              <a:rPr lang="es-CL" sz="2400" dirty="0" err="1">
+                <a:solidFill>
+                  <a:srgbClr val="19202E"/>
+                </a:solidFill>
+                <a:latin typeface="Segoe UI"/>
+              </a:rPr>
+              <a:t>dle</a:t>
+            </a:r>
+            <a:r>
+              <a:rPr lang="es-CL" sz="2400" dirty="0">
+                <a:solidFill>
+                  <a:srgbClr val="19202E"/>
+                </a:solidFill>
+                <a:latin typeface="Segoe UI"/>
+              </a:rPr>
+              <a:t> cerebro humano, aplica unidades de procesamiento que se organizan en capas interconectadas.</a:t>
+            </a:r>
+            <a:endParaRPr lang="es-CL" sz="2400" dirty="0">
+              <a:solidFill>
+                <a:srgbClr val="000000"/>
+              </a:solidFill>
+              <a:latin typeface="Segoe UI"/>
+              <a:cs typeface="Segoe UI"/>
+            </a:endParaRPr>
+          </a:p>
+          <a:p>
+            <a:endParaRPr lang="en-US">
+              <a:cs typeface="Calibri"/>
+            </a:endParaRPr>
+          </a:p>
+        </p:txBody>
+      </p:sp>
+      <p:sp>
+        <p:nvSpPr>
+          <p:cNvPr id="6" name="TextBox 5">
+            <a:extLst>
+              <a:ext uri="{FF2B5EF4-FFF2-40B4-BE49-F238E27FC236}">
+                <a16:creationId xmlns:a16="http://schemas.microsoft.com/office/drawing/2014/main" id="{C4A2F7C9-0AF4-129F-070F-6E5756021AD2}"/>
+              </a:ext>
+            </a:extLst>
+          </p:cNvPr>
+          <p:cNvSpPr txBox="1"/>
+          <p:nvPr/>
+        </p:nvSpPr>
+        <p:spPr>
+          <a:xfrm>
+            <a:off x="8628" y="8627"/>
+            <a:ext cx="9026104" cy="769441"/>
+          </a:xfrm>
+          <a:prstGeom prst="rect">
+            <a:avLst/>
+          </a:prstGeom>
+          <a:noFill/>
+        </p:spPr>
+        <p:txBody>
+          <a:bodyPr rot="0" spcFirstLastPara="0" vertOverflow="overflow" horzOverflow="overflow" vert="horz" wrap="square" lIns="91440" tIns="45720" rIns="91440" bIns="45720" numCol="1" spcCol="0" rtlCol="0" fromWordArt="0" anchor="t" anchorCtr="0" forceAA="0" compatLnSpc="1">
+            <a:prstTxWarp prst="textNoShape">
+              <a:avLst/>
+            </a:prstTxWarp>
+            <a:spAutoFit/>
+          </a:bodyPr>
+          <a:lstStyle/>
+          <a:p>
+            <a:r>
+              <a:rPr lang="es-CL" sz="2200" b="1" dirty="0">
+                <a:solidFill>
+                  <a:schemeClr val="bg1"/>
+                </a:solidFill>
+                <a:latin typeface="Segoe UI"/>
+              </a:rPr>
+              <a:t>En el caso de estudio presente trabajamos un modelo de Regresión lineal, para el cual aplicamos los siguientes algoritmos:</a:t>
+            </a:r>
+            <a:endParaRPr lang="en-US" sz="2200" b="1" dirty="0">
+              <a:solidFill>
+                <a:schemeClr val="bg1"/>
+              </a:solidFill>
+            </a:endParaRPr>
+          </a:p>
+        </p:txBody>
+      </p:sp>
+      <p:pic>
+        <p:nvPicPr>
+          <p:cNvPr id="8" name="Picture 7" descr="A network with colored dots and lines&#10;&#10;Description automatically generated">
+            <a:extLst>
+              <a:ext uri="{FF2B5EF4-FFF2-40B4-BE49-F238E27FC236}">
+                <a16:creationId xmlns:a16="http://schemas.microsoft.com/office/drawing/2014/main" id="{B1A89EE9-E8D2-1219-B80A-D87D46B51C10}"/>
+              </a:ext>
+            </a:extLst>
+          </p:cNvPr>
+          <p:cNvPicPr>
+            <a:picLocks noChangeAspect="1"/>
+          </p:cNvPicPr>
+          <p:nvPr/>
+        </p:nvPicPr>
+        <p:blipFill>
+          <a:blip r:embed="rId5"/>
+          <a:stretch>
+            <a:fillRect/>
+          </a:stretch>
+        </p:blipFill>
+        <p:spPr>
+          <a:xfrm>
+            <a:off x="6009735" y="4812551"/>
+            <a:ext cx="3939398" cy="2049313"/>
+          </a:xfrm>
+          <a:prstGeom prst="rect">
+            <a:avLst/>
+          </a:prstGeom>
+        </p:spPr>
+      </p:pic>
+      <p:pic>
+        <p:nvPicPr>
+          <p:cNvPr id="12" name="Picture 11" descr="A red arrow pointing up&#10;&#10;Description automatically generated">
+            <a:extLst>
+              <a:ext uri="{FF2B5EF4-FFF2-40B4-BE49-F238E27FC236}">
+                <a16:creationId xmlns:a16="http://schemas.microsoft.com/office/drawing/2014/main" id="{358731CA-9DDB-8429-7152-EF2F915F03A6}"/>
+              </a:ext>
+            </a:extLst>
+          </p:cNvPr>
+          <p:cNvPicPr>
+            <a:picLocks noChangeAspect="1"/>
+          </p:cNvPicPr>
+          <p:nvPr/>
+        </p:nvPicPr>
+        <p:blipFill>
+          <a:blip r:embed="rId6"/>
+          <a:stretch>
+            <a:fillRect/>
+          </a:stretch>
+        </p:blipFill>
+        <p:spPr>
+          <a:xfrm>
+            <a:off x="7831248" y="4187228"/>
+            <a:ext cx="4572000" cy="2571750"/>
+          </a:xfrm>
+          <a:prstGeom prst="rect">
+            <a:avLst/>
+          </a:prstGeom>
+        </p:spPr>
+      </p:pic>
+      <p:pic>
+        <p:nvPicPr>
+          <p:cNvPr id="13" name="Picture 12" descr="A group of colorful dots&#10;&#10;Description automatically generated">
+            <a:extLst>
+              <a:ext uri="{FF2B5EF4-FFF2-40B4-BE49-F238E27FC236}">
+                <a16:creationId xmlns:a16="http://schemas.microsoft.com/office/drawing/2014/main" id="{B2E51727-3148-CD7B-EDE9-2BA4043B24B7}"/>
+              </a:ext>
+            </a:extLst>
+          </p:cNvPr>
+          <p:cNvPicPr>
+            <a:picLocks noChangeAspect="1"/>
+          </p:cNvPicPr>
+          <p:nvPr/>
+        </p:nvPicPr>
+        <p:blipFill>
+          <a:blip r:embed="rId7"/>
+          <a:stretch>
+            <a:fillRect/>
+          </a:stretch>
+        </p:blipFill>
+        <p:spPr>
+          <a:xfrm>
+            <a:off x="2285181" y="4550256"/>
+            <a:ext cx="4572000" cy="2571750"/>
+          </a:xfrm>
+          <a:prstGeom prst="rect">
+            <a:avLst/>
+          </a:prstGeom>
+        </p:spPr>
+      </p:pic>
     </p:spTree>
     <p:extLst>
       <p:ext uri="{BB962C8B-B14F-4D97-AF65-F5344CB8AC3E}">
@@ -12234,10 +12752,10 @@
       </p:pic>
       <p:sp>
         <p:nvSpPr>
-          <p:cNvPr id="3" name="TextBox 2">
+          <p:cNvPr id="4" name="TextBox 3">
             <a:extLst>
               <a:ext uri="{FF2B5EF4-FFF2-40B4-BE49-F238E27FC236}">
-                <a16:creationId xmlns:a16="http://schemas.microsoft.com/office/drawing/2014/main" id="{70866F9F-102C-0AFC-BCE5-4E8C73321E74}"/>
+                <a16:creationId xmlns:a16="http://schemas.microsoft.com/office/drawing/2014/main" id="{2484D71F-6E0D-7556-D02A-80D20B19BFE9}"/>
               </a:ext>
             </a:extLst>
           </p:cNvPr>
@@ -12246,8 +12764,8 @@
         </p:nvSpPr>
         <p:spPr>
           <a:xfrm>
-            <a:off x="973101" y="1083913"/>
-            <a:ext cx="6846427" cy="5170646"/>
+            <a:off x="914400" y="799381"/>
+            <a:ext cx="5000445" cy="3046988"/>
           </a:xfrm>
           <a:prstGeom prst="rect">
             <a:avLst/>
@@ -12264,130 +12782,83 @@
           <a:lstStyle/>
           <a:p>
             <a:r>
-              <a:rPr lang="es-CL" sz="2400" err="1">
+              <a:rPr lang="es-CL" sz="2400" dirty="0">
                 <a:solidFill>
                   <a:srgbClr val="19202E"/>
                 </a:solidFill>
                 <a:latin typeface="Segoe UI"/>
                 <a:cs typeface="Segoe UI"/>
               </a:rPr>
-              <a:t>Slide</a:t>
-            </a:r>
-            <a:r>
-              <a:rPr lang="es-CL" sz="2400">
+              <a:t>En el caso de conjunto de datos de diamantes, donde la variable de precio es dependiente y las </a:t>
+            </a:r>
+            <a:r>
+              <a:rPr lang="es-CL" sz="2400" dirty="0" err="1">
                 <a:solidFill>
                   <a:srgbClr val="19202E"/>
                 </a:solidFill>
                 <a:latin typeface="Segoe UI"/>
                 <a:cs typeface="Segoe UI"/>
               </a:rPr>
-              <a:t> 1: Logo de la universidad, facultad, Carrera, Nombre de integrantes del grupo.</a:t>
-            </a:r>
-            <a:endParaRPr lang="en-US" sz="2400">
-              <a:solidFill>
-                <a:srgbClr val="19202E"/>
-              </a:solidFill>
-              <a:latin typeface="Segoe UI"/>
-              <a:cs typeface="Segoe UI"/>
-            </a:endParaRPr>
-          </a:p>
-          <a:p>
-            <a:r>
-              <a:rPr lang="es-CL" sz="2400" err="1">
+              <a:t>demas</a:t>
+            </a:r>
+            <a:r>
+              <a:rPr lang="es-CL" sz="2400" dirty="0">
                 <a:solidFill>
                   <a:srgbClr val="19202E"/>
                 </a:solidFill>
                 <a:latin typeface="Segoe UI"/>
                 <a:cs typeface="Segoe UI"/>
               </a:rPr>
-              <a:t>Slide</a:t>
-            </a:r>
-            <a:r>
-              <a:rPr lang="es-CL" sz="2400">
+              <a:t> son independientes, el tipo de problema a resolver s el de regresión, se busca </a:t>
+            </a:r>
+            <a:r>
+              <a:rPr lang="es-CL" sz="2400" dirty="0" err="1">
                 <a:solidFill>
                   <a:srgbClr val="19202E"/>
                 </a:solidFill>
                 <a:latin typeface="Segoe UI"/>
                 <a:cs typeface="Segoe UI"/>
               </a:rPr>
-              <a:t> 2, 3, 4: Introducción: de una breve reseña del contenido del trabajo; explicación en qué consiste el aprendizaje supervisado y breve explicación de los algoritmos utilizados, objetivos del estudio.</a:t>
-            </a:r>
-            <a:endParaRPr lang="en-US" sz="2400">
-              <a:solidFill>
-                <a:srgbClr val="19202E"/>
-              </a:solidFill>
-              <a:latin typeface="Segoe UI"/>
-              <a:cs typeface="Segoe UI"/>
-            </a:endParaRPr>
-          </a:p>
-          <a:p>
-            <a:r>
-              <a:rPr lang="es-CL" sz="2400" err="1">
+              <a:t>predeci</a:t>
+            </a:r>
+            <a:r>
+              <a:rPr lang="es-CL" sz="2400" dirty="0">
                 <a:solidFill>
                   <a:srgbClr val="19202E"/>
                 </a:solidFill>
                 <a:latin typeface="Segoe UI"/>
                 <a:cs typeface="Segoe UI"/>
               </a:rPr>
-              <a:t>Slide</a:t>
-            </a:r>
-            <a:r>
-              <a:rPr lang="es-CL" sz="2400">
+              <a:t> el valor numérico del precio del diamante en </a:t>
+            </a:r>
+            <a:r>
+              <a:rPr lang="es-CL" sz="2400" dirty="0" err="1">
                 <a:solidFill>
                   <a:srgbClr val="19202E"/>
                 </a:solidFill>
                 <a:latin typeface="Segoe UI"/>
                 <a:cs typeface="Segoe UI"/>
               </a:rPr>
-              <a:t> 5: Defina variable dependiente y variables independientes; y justifique si tiene que utilizar algoritmos de regresión o clasificación.</a:t>
-            </a:r>
-            <a:endParaRPr lang="en-US" sz="2400">
-              <a:solidFill>
-                <a:srgbClr val="19202E"/>
-              </a:solidFill>
-              <a:latin typeface="Segoe UI"/>
-              <a:cs typeface="Segoe UI"/>
-            </a:endParaRPr>
-          </a:p>
-          <a:p>
-            <a:r>
-              <a:rPr lang="es-CL" sz="2400" err="1">
+              <a:t>funcion</a:t>
+            </a:r>
+            <a:r>
+              <a:rPr lang="es-CL" sz="2400" dirty="0">
                 <a:solidFill>
                   <a:srgbClr val="19202E"/>
                 </a:solidFill>
                 <a:latin typeface="Segoe UI"/>
                 <a:cs typeface="Segoe UI"/>
               </a:rPr>
-              <a:t>Slide</a:t>
-            </a:r>
-            <a:r>
-              <a:rPr lang="es-CL" sz="2400">
-                <a:solidFill>
-                  <a:srgbClr val="19202E"/>
-                </a:solidFill>
-                <a:latin typeface="Segoe UI"/>
-                <a:cs typeface="Segoe UI"/>
-              </a:rPr>
-              <a:t> 6: Tiempo de entrenamiento en la validación cruzada para cada algoritmo de cada estudiante del grupo</a:t>
-            </a:r>
-            <a:endParaRPr lang="en-US" sz="2400">
-              <a:ea typeface="Calibri"/>
-              <a:cs typeface="Calibri"/>
-            </a:endParaRPr>
-          </a:p>
-          <a:p>
-            <a:pPr algn="l"/>
-            <a:endParaRPr lang="en-US">
-              <a:ea typeface="Calibri"/>
-              <a:cs typeface="Calibri"/>
-            </a:endParaRPr>
+              <a:t> de las otras variables.</a:t>
+            </a:r>
+            <a:endParaRPr lang="en-US" dirty="0"/>
           </a:p>
         </p:txBody>
       </p:sp>
     </p:spTree>
     <p:extLst>
       <p:ext uri="{BB962C8B-B14F-4D97-AF65-F5344CB8AC3E}">
-        <p14:creationId xmlns:p14="http://schemas.microsoft.com/office/powerpoint/2010/main" val="3105322462"/>
+        <p14:creationId xmlns:p14="http://schemas.microsoft.com/office/powerpoint/2010/main" val="2361542432"/>
       </p:ext>
     </p:extLst>
   </p:cSld>
@@ -12473,10 +12944,162 @@
           </a:prstGeom>
         </p:spPr>
       </p:pic>
+      <p:sp>
+        <p:nvSpPr>
+          <p:cNvPr id="3" name="TextBox 2">
+            <a:extLst>
+              <a:ext uri="{FF2B5EF4-FFF2-40B4-BE49-F238E27FC236}">
+                <a16:creationId xmlns:a16="http://schemas.microsoft.com/office/drawing/2014/main" id="{70866F9F-102C-0AFC-BCE5-4E8C73321E74}"/>
+              </a:ext>
+            </a:extLst>
+          </p:cNvPr>
+          <p:cNvSpPr txBox="1"/>
+          <p:nvPr/>
+        </p:nvSpPr>
+        <p:spPr>
+          <a:xfrm>
+            <a:off x="973101" y="1083913"/>
+            <a:ext cx="6846427" cy="5170646"/>
+          </a:xfrm>
+          <a:prstGeom prst="rect">
+            <a:avLst/>
+          </a:prstGeom>
+          <a:noFill/>
+        </p:spPr>
+        <p:txBody>
+          <a:bodyPr rot="0" spcFirstLastPara="0" vertOverflow="overflow" horzOverflow="overflow" vert="horz" wrap="square" lIns="91440" tIns="45720" rIns="91440" bIns="45720" numCol="1" spcCol="0" rtlCol="0" fromWordArt="0" anchor="t" anchorCtr="0" forceAA="0" compatLnSpc="1">
+            <a:prstTxWarp prst="textNoShape">
+              <a:avLst/>
+            </a:prstTxWarp>
+            <a:spAutoFit/>
+          </a:bodyPr>
+          <a:lstStyle/>
+          <a:p>
+            <a:r>
+              <a:rPr lang="es-CL" sz="2400" err="1">
+                <a:solidFill>
+                  <a:srgbClr val="19202E"/>
+                </a:solidFill>
+                <a:latin typeface="Segoe UI"/>
+                <a:cs typeface="Segoe UI"/>
+              </a:rPr>
+              <a:t>Slide</a:t>
+            </a:r>
+            <a:r>
+              <a:rPr lang="es-CL" sz="2400">
+                <a:solidFill>
+                  <a:srgbClr val="19202E"/>
+                </a:solidFill>
+                <a:latin typeface="Segoe UI"/>
+                <a:cs typeface="Segoe UI"/>
+              </a:rPr>
+              <a:t> 1: Logo de la universidad, facultad, Carrera, Nombre de integrantes del grupo.</a:t>
+            </a:r>
+            <a:endParaRPr lang="en-US" sz="2400">
+              <a:solidFill>
+                <a:srgbClr val="19202E"/>
+              </a:solidFill>
+              <a:latin typeface="Segoe UI"/>
+              <a:cs typeface="Segoe UI"/>
+            </a:endParaRPr>
+          </a:p>
+          <a:p>
+            <a:r>
+              <a:rPr lang="es-CL" sz="2400" err="1">
+                <a:solidFill>
+                  <a:srgbClr val="19202E"/>
+                </a:solidFill>
+                <a:latin typeface="Segoe UI"/>
+                <a:cs typeface="Segoe UI"/>
+              </a:rPr>
+              <a:t>Slide</a:t>
+            </a:r>
+            <a:r>
+              <a:rPr lang="es-CL" sz="2400">
+                <a:solidFill>
+                  <a:srgbClr val="19202E"/>
+                </a:solidFill>
+                <a:latin typeface="Segoe UI"/>
+                <a:cs typeface="Segoe UI"/>
+              </a:rPr>
+              <a:t> 2, 3, 4: Introducción: de una breve reseña del contenido del trabajo; explicación en qué consiste el aprendizaje supervisado y breve explicación de los algoritmos utilizados, objetivos del estudio.</a:t>
+            </a:r>
+            <a:endParaRPr lang="en-US" sz="2400">
+              <a:solidFill>
+                <a:srgbClr val="19202E"/>
+              </a:solidFill>
+              <a:latin typeface="Segoe UI"/>
+              <a:cs typeface="Segoe UI"/>
+            </a:endParaRPr>
+          </a:p>
+          <a:p>
+            <a:r>
+              <a:rPr lang="es-CL" sz="2400" err="1">
+                <a:solidFill>
+                  <a:srgbClr val="19202E"/>
+                </a:solidFill>
+                <a:latin typeface="Segoe UI"/>
+                <a:cs typeface="Segoe UI"/>
+              </a:rPr>
+              <a:t>Slide</a:t>
+            </a:r>
+            <a:r>
+              <a:rPr lang="es-CL" sz="2400">
+                <a:solidFill>
+                  <a:srgbClr val="19202E"/>
+                </a:solidFill>
+                <a:latin typeface="Segoe UI"/>
+                <a:cs typeface="Segoe UI"/>
+              </a:rPr>
+              <a:t> 5: Defina variable dependiente y variables independientes; y justifique si tiene que utilizar algoritmos de regresión o clasificación.</a:t>
+            </a:r>
+            <a:endParaRPr lang="en-US" sz="2400">
+              <a:solidFill>
+                <a:srgbClr val="19202E"/>
+              </a:solidFill>
+              <a:latin typeface="Segoe UI"/>
+              <a:cs typeface="Segoe UI"/>
+            </a:endParaRPr>
+          </a:p>
+          <a:p>
+            <a:r>
+              <a:rPr lang="es-CL" sz="2400" err="1">
+                <a:solidFill>
+                  <a:srgbClr val="19202E"/>
+                </a:solidFill>
+                <a:latin typeface="Segoe UI"/>
+                <a:cs typeface="Segoe UI"/>
+              </a:rPr>
+              <a:t>Slide</a:t>
+            </a:r>
+            <a:r>
+              <a:rPr lang="es-CL" sz="2400">
+                <a:solidFill>
+                  <a:srgbClr val="19202E"/>
+                </a:solidFill>
+                <a:latin typeface="Segoe UI"/>
+                <a:cs typeface="Segoe UI"/>
+              </a:rPr>
+              <a:t> 6: Tiempo de entrenamiento en la validación cruzada para cada algoritmo de cada estudiante del grupo</a:t>
+            </a:r>
+            <a:endParaRPr lang="en-US" sz="2400">
+              <a:ea typeface="Calibri"/>
+              <a:cs typeface="Calibri"/>
+            </a:endParaRPr>
+          </a:p>
+          <a:p>
+            <a:pPr algn="l"/>
+            <a:endParaRPr lang="en-US">
+              <a:ea typeface="Calibri"/>
+              <a:cs typeface="Calibri"/>
+            </a:endParaRPr>
+          </a:p>
+        </p:txBody>
+      </p:sp>
     </p:spTree>
     <p:extLst>
       <p:ext uri="{BB962C8B-B14F-4D97-AF65-F5344CB8AC3E}">
-        <p14:creationId xmlns:p14="http://schemas.microsoft.com/office/powerpoint/2010/main" val="2361542432"/>
+        <p14:creationId xmlns:p14="http://schemas.microsoft.com/office/powerpoint/2010/main" val="3105322462"/>
       </p:ext>
     </p:extLst>
   </p:cSld>
@@ -12562,6 +13185,111 @@
           </a:prstGeom>
         </p:spPr>
       </p:pic>
+      <p:sp>
+        <p:nvSpPr>
+          <p:cNvPr id="4" name="TextBox 3">
+            <a:extLst>
+              <a:ext uri="{FF2B5EF4-FFF2-40B4-BE49-F238E27FC236}">
+                <a16:creationId xmlns:a16="http://schemas.microsoft.com/office/drawing/2014/main" id="{71226EC2-9380-CB10-DF4C-32CCBC68E4D3}"/>
+              </a:ext>
+            </a:extLst>
+          </p:cNvPr>
+          <p:cNvSpPr txBox="1"/>
+          <p:nvPr/>
+        </p:nvSpPr>
+        <p:spPr>
+          <a:xfrm>
+            <a:off x="914400" y="799381"/>
+            <a:ext cx="5000445" cy="3046988"/>
+          </a:xfrm>
+          <a:prstGeom prst="rect">
+            <a:avLst/>
+          </a:prstGeom>
+          <a:noFill/>
+        </p:spPr>
+        <p:txBody>
+          <a:bodyPr rot="0" spcFirstLastPara="0" vertOverflow="overflow" horzOverflow="overflow" vert="horz" wrap="square" lIns="91440" tIns="45720" rIns="91440" bIns="45720" numCol="1" spcCol="0" rtlCol="0" fromWordArt="0" anchor="t" anchorCtr="0" forceAA="0" compatLnSpc="1">
+            <a:prstTxWarp prst="textNoShape">
+              <a:avLst/>
+            </a:prstTxWarp>
+            <a:spAutoFit/>
+          </a:bodyPr>
+          <a:lstStyle/>
+          <a:p>
+            <a:r>
+              <a:rPr lang="es-CL" sz="2400" dirty="0">
+                <a:solidFill>
+                  <a:srgbClr val="19202E"/>
+                </a:solidFill>
+                <a:latin typeface="Segoe UI"/>
+                <a:cs typeface="Segoe UI"/>
+              </a:rPr>
+              <a:t>En el caso de conjunto de datos de diamantes, donde la variable de precio es dependiente y las </a:t>
+            </a:r>
+            <a:r>
+              <a:rPr lang="es-CL" sz="2400" dirty="0" err="1">
+                <a:solidFill>
+                  <a:srgbClr val="19202E"/>
+                </a:solidFill>
+                <a:latin typeface="Segoe UI"/>
+                <a:cs typeface="Segoe UI"/>
+              </a:rPr>
+              <a:t>demas</a:t>
+            </a:r>
+            <a:r>
+              <a:rPr lang="es-CL" sz="2400" dirty="0">
+                <a:solidFill>
+                  <a:srgbClr val="19202E"/>
+                </a:solidFill>
+                <a:latin typeface="Segoe UI"/>
+                <a:cs typeface="Segoe UI"/>
+              </a:rPr>
+              <a:t> son independientes, el tipo de problema a resolver s el de regresión, se busca </a:t>
+            </a:r>
+            <a:r>
+              <a:rPr lang="es-CL" sz="2400" dirty="0" err="1">
+                <a:solidFill>
+                  <a:srgbClr val="19202E"/>
+                </a:solidFill>
+                <a:latin typeface="Segoe UI"/>
+                <a:cs typeface="Segoe UI"/>
+              </a:rPr>
+              <a:t>predeci</a:t>
+            </a:r>
+            <a:r>
+              <a:rPr lang="es-CL" sz="2400" dirty="0">
+                <a:solidFill>
+                  <a:srgbClr val="19202E"/>
+                </a:solidFill>
+                <a:latin typeface="Segoe UI"/>
+                <a:cs typeface="Segoe UI"/>
+              </a:rPr>
+              <a:t> el valor numérico del precio del diamante en </a:t>
+            </a:r>
+            <a:r>
+              <a:rPr lang="es-CL" sz="2400" dirty="0" err="1">
+                <a:solidFill>
+                  <a:srgbClr val="19202E"/>
+                </a:solidFill>
+                <a:latin typeface="Segoe UI"/>
+                <a:cs typeface="Segoe UI"/>
+              </a:rPr>
+              <a:t>funcion</a:t>
+            </a:r>
+            <a:r>
+              <a:rPr lang="es-CL" sz="2400" dirty="0">
+                <a:solidFill>
+                  <a:srgbClr val="19202E"/>
+                </a:solidFill>
+                <a:latin typeface="Segoe UI"/>
+                <a:cs typeface="Segoe UI"/>
+              </a:rPr>
+              <a:t> de las otras variables.</a:t>
+            </a:r>
+            <a:endParaRPr lang="en-US" dirty="0"/>
+          </a:p>
+        </p:txBody>
+      </p:sp>
     </p:spTree>
     <p:extLst>
       <p:ext uri="{BB962C8B-B14F-4D97-AF65-F5344CB8AC3E}">

</xml_diff>